<commit_message>
clean up sets.pptx, record relations.pptx, minor edit induction
</commit_message>
<xml_diff>
--- a/spring12/slidesS12/relations.pptx
+++ b/spring12/slidesS12/relations.pptx
@@ -956,49 +956,21 @@
       </p:grpSpPr>
       <p:sp>
         <p:nvSpPr>
-          <p:cNvPr id="7" name="Rectangle 7"/>
+          <p:cNvPr id="2" name="Slide Image Placeholder 1"/>
           <p:cNvSpPr>
-            <a:spLocks noGrp="1" noChangeArrowheads="1"/>
-          </p:cNvSpPr>
-          <p:nvPr>
-            <p:ph type="sldNum" sz="quarter" idx="5"/>
-          </p:nvPr>
-        </p:nvSpPr>
-        <p:spPr>
-          <a:ln/>
-        </p:spPr>
-        <p:txBody>
-          <a:bodyPr/>
-          <a:lstStyle/>
-          <a:p>
-            <a:fld id="{0FC7384A-F489-4586-B03E-486116E88A31}" type="slidenum">
-              <a:rPr lang="en-US"/>
-              <a:pPr/>
-              <a:t>21</a:t>
-            </a:fld>
-            <a:endParaRPr lang="en-US"/>
-          </a:p>
-        </p:txBody>
-      </p:sp>
-      <p:sp>
-        <p:nvSpPr>
-          <p:cNvPr id="688130" name="Rectangle 2"/>
-          <p:cNvSpPr>
-            <a:spLocks noGrp="1" noRot="1" noChangeAspect="1" noChangeArrowheads="1" noTextEdit="1"/>
+            <a:spLocks noGrp="1" noRot="1" noChangeAspect="1"/>
           </p:cNvSpPr>
           <p:nvPr>
             <p:ph type="sldImg"/>
           </p:nvPr>
         </p:nvSpPr>
-        <p:spPr>
-          <a:ln/>
-        </p:spPr>
-      </p:sp>
-      <p:sp>
-        <p:nvSpPr>
-          <p:cNvPr id="688131" name="Rectangle 3"/>
+        <p:spPr/>
+      </p:sp>
+      <p:sp>
+        <p:nvSpPr>
+          <p:cNvPr id="3" name="Notes Placeholder 2"/>
           <p:cNvSpPr>
-            <a:spLocks noGrp="1" noChangeArrowheads="1"/>
+            <a:spLocks noGrp="1"/>
           </p:cNvSpPr>
           <p:nvPr>
             <p:ph type="body" idx="1"/>
@@ -1013,7 +985,36 @@
           </a:p>
         </p:txBody>
       </p:sp>
+      <p:sp>
+        <p:nvSpPr>
+          <p:cNvPr id="4" name="Slide Number Placeholder 3"/>
+          <p:cNvSpPr>
+            <a:spLocks noGrp="1"/>
+          </p:cNvSpPr>
+          <p:nvPr>
+            <p:ph type="sldNum" sz="quarter" idx="10"/>
+          </p:nvPr>
+        </p:nvSpPr>
+        <p:spPr/>
+        <p:txBody>
+          <a:bodyPr/>
+          <a:lstStyle/>
+          <a:p>
+            <a:fld id="{A02B9F3F-3042-489F-AF35-1A733968F079}" type="slidenum">
+              <a:rPr lang="en-US" smtClean="0"/>
+              <a:pPr/>
+              <a:t>10</a:t>
+            </a:fld>
+            <a:endParaRPr lang="en-US"/>
+          </a:p>
+        </p:txBody>
+      </p:sp>
     </p:spTree>
+    <p:extLst>
+      <p:ext uri="{BB962C8B-B14F-4D97-AF65-F5344CB8AC3E}">
+        <p14:creationId xmlns:p14="http://schemas.microsoft.com/office/powerpoint/2010/main" val="3955973350"/>
+      </p:ext>
+    </p:extLst>
   </p:cSld>
   <p:clrMapOvr>
     <a:masterClrMapping/>
@@ -1040,49 +1041,21 @@
       </p:grpSpPr>
       <p:sp>
         <p:nvSpPr>
-          <p:cNvPr id="7" name="Rectangle 7"/>
+          <p:cNvPr id="2" name="Slide Image Placeholder 1"/>
           <p:cNvSpPr>
-            <a:spLocks noGrp="1" noChangeArrowheads="1"/>
-          </p:cNvSpPr>
-          <p:nvPr>
-            <p:ph type="sldNum" sz="quarter" idx="5"/>
-          </p:nvPr>
-        </p:nvSpPr>
-        <p:spPr>
-          <a:ln/>
-        </p:spPr>
-        <p:txBody>
-          <a:bodyPr/>
-          <a:lstStyle/>
-          <a:p>
-            <a:fld id="{0FC7384A-F489-4586-B03E-486116E88A31}" type="slidenum">
-              <a:rPr lang="en-US"/>
-              <a:pPr/>
-              <a:t>24</a:t>
-            </a:fld>
-            <a:endParaRPr lang="en-US"/>
-          </a:p>
-        </p:txBody>
-      </p:sp>
-      <p:sp>
-        <p:nvSpPr>
-          <p:cNvPr id="688130" name="Rectangle 2"/>
-          <p:cNvSpPr>
-            <a:spLocks noGrp="1" noRot="1" noChangeAspect="1" noChangeArrowheads="1" noTextEdit="1"/>
+            <a:spLocks noGrp="1" noRot="1" noChangeAspect="1"/>
           </p:cNvSpPr>
           <p:nvPr>
             <p:ph type="sldImg"/>
           </p:nvPr>
         </p:nvSpPr>
-        <p:spPr>
-          <a:ln/>
-        </p:spPr>
-      </p:sp>
-      <p:sp>
-        <p:nvSpPr>
-          <p:cNvPr id="688131" name="Rectangle 3"/>
+        <p:spPr/>
+      </p:sp>
+      <p:sp>
+        <p:nvSpPr>
+          <p:cNvPr id="3" name="Notes Placeholder 2"/>
           <p:cNvSpPr>
-            <a:spLocks noGrp="1" noChangeArrowheads="1"/>
+            <a:spLocks noGrp="1"/>
           </p:cNvSpPr>
           <p:nvPr>
             <p:ph type="body" idx="1"/>
@@ -1097,7 +1070,36 @@
           </a:p>
         </p:txBody>
       </p:sp>
+      <p:sp>
+        <p:nvSpPr>
+          <p:cNvPr id="4" name="Slide Number Placeholder 3"/>
+          <p:cNvSpPr>
+            <a:spLocks noGrp="1"/>
+          </p:cNvSpPr>
+          <p:nvPr>
+            <p:ph type="sldNum" sz="quarter" idx="10"/>
+          </p:nvPr>
+        </p:nvSpPr>
+        <p:spPr/>
+        <p:txBody>
+          <a:bodyPr/>
+          <a:lstStyle/>
+          <a:p>
+            <a:fld id="{A02B9F3F-3042-489F-AF35-1A733968F079}" type="slidenum">
+              <a:rPr lang="en-US" smtClean="0"/>
+              <a:pPr/>
+              <a:t>11</a:t>
+            </a:fld>
+            <a:endParaRPr lang="en-US"/>
+          </a:p>
+        </p:txBody>
+      </p:sp>
     </p:spTree>
+    <p:extLst>
+      <p:ext uri="{BB962C8B-B14F-4D97-AF65-F5344CB8AC3E}">
+        <p14:creationId xmlns:p14="http://schemas.microsoft.com/office/powerpoint/2010/main" val="3053357886"/>
+      </p:ext>
+    </p:extLst>
   </p:cSld>
   <p:clrMapOvr>
     <a:masterClrMapping/>
@@ -1142,7 +1144,7 @@
             <a:fld id="{0FC7384A-F489-4586-B03E-486116E88A31}" type="slidenum">
               <a:rPr lang="en-US"/>
               <a:pPr/>
-              <a:t>25</a:t>
+              <a:t>12</a:t>
             </a:fld>
             <a:endParaRPr lang="en-US"/>
           </a:p>
@@ -1233,7 +1235,7 @@
           <a:bodyPr/>
           <a:lstStyle/>
           <a:p>
-            <a:endParaRPr lang="en-US" dirty="0"/>
+            <a:endParaRPr lang="en-US"/>
           </a:p>
         </p:txBody>
       </p:sp>
@@ -1255,7 +1257,7 @@
             <a:fld id="{A02B9F3F-3042-489F-AF35-1A733968F079}" type="slidenum">
               <a:rPr lang="en-US" smtClean="0"/>
               <a:pPr/>
-              <a:t>27</a:t>
+              <a:t>13</a:t>
             </a:fld>
             <a:endParaRPr lang="en-US"/>
           </a:p>
@@ -1264,7 +1266,7 @@
     </p:spTree>
     <p:extLst>
       <p:ext uri="{BB962C8B-B14F-4D97-AF65-F5344CB8AC3E}">
-        <p14:creationId xmlns:p14="http://schemas.microsoft.com/office/powerpoint/2010/main" val="3329130683"/>
+        <p14:creationId xmlns:p14="http://schemas.microsoft.com/office/powerpoint/2010/main" val="3164098399"/>
       </p:ext>
     </p:extLst>
   </p:cSld>
@@ -1293,49 +1295,21 @@
       </p:grpSpPr>
       <p:sp>
         <p:nvSpPr>
-          <p:cNvPr id="7" name="Rectangle 7"/>
+          <p:cNvPr id="2" name="Slide Image Placeholder 1"/>
           <p:cNvSpPr>
-            <a:spLocks noGrp="1" noChangeArrowheads="1"/>
-          </p:cNvSpPr>
-          <p:nvPr>
-            <p:ph type="sldNum" sz="quarter" idx="5"/>
-          </p:nvPr>
-        </p:nvSpPr>
-        <p:spPr>
-          <a:ln/>
-        </p:spPr>
-        <p:txBody>
-          <a:bodyPr/>
-          <a:lstStyle/>
-          <a:p>
-            <a:fld id="{0FC7384A-F489-4586-B03E-486116E88A31}" type="slidenum">
-              <a:rPr lang="en-US"/>
-              <a:pPr/>
-              <a:t>31</a:t>
-            </a:fld>
-            <a:endParaRPr lang="en-US"/>
-          </a:p>
-        </p:txBody>
-      </p:sp>
-      <p:sp>
-        <p:nvSpPr>
-          <p:cNvPr id="688130" name="Rectangle 2"/>
-          <p:cNvSpPr>
-            <a:spLocks noGrp="1" noRot="1" noChangeAspect="1" noChangeArrowheads="1" noTextEdit="1"/>
+            <a:spLocks noGrp="1" noRot="1" noChangeAspect="1"/>
           </p:cNvSpPr>
           <p:nvPr>
             <p:ph type="sldImg"/>
           </p:nvPr>
         </p:nvSpPr>
-        <p:spPr>
-          <a:ln/>
-        </p:spPr>
-      </p:sp>
-      <p:sp>
-        <p:nvSpPr>
-          <p:cNvPr id="688131" name="Rectangle 3"/>
+        <p:spPr/>
+      </p:sp>
+      <p:sp>
+        <p:nvSpPr>
+          <p:cNvPr id="3" name="Notes Placeholder 2"/>
           <p:cNvSpPr>
-            <a:spLocks noGrp="1" noChangeArrowheads="1"/>
+            <a:spLocks noGrp="1"/>
           </p:cNvSpPr>
           <p:nvPr>
             <p:ph type="body" idx="1"/>
@@ -1350,7 +1324,36 @@
           </a:p>
         </p:txBody>
       </p:sp>
+      <p:sp>
+        <p:nvSpPr>
+          <p:cNvPr id="4" name="Slide Number Placeholder 3"/>
+          <p:cNvSpPr>
+            <a:spLocks noGrp="1"/>
+          </p:cNvSpPr>
+          <p:nvPr>
+            <p:ph type="sldNum" sz="quarter" idx="10"/>
+          </p:nvPr>
+        </p:nvSpPr>
+        <p:spPr/>
+        <p:txBody>
+          <a:bodyPr/>
+          <a:lstStyle/>
+          <a:p>
+            <a:fld id="{A02B9F3F-3042-489F-AF35-1A733968F079}" type="slidenum">
+              <a:rPr lang="en-US" smtClean="0"/>
+              <a:pPr/>
+              <a:t>14</a:t>
+            </a:fld>
+            <a:endParaRPr lang="en-US"/>
+          </a:p>
+        </p:txBody>
+      </p:sp>
     </p:spTree>
+    <p:extLst>
+      <p:ext uri="{BB962C8B-B14F-4D97-AF65-F5344CB8AC3E}">
+        <p14:creationId xmlns:p14="http://schemas.microsoft.com/office/powerpoint/2010/main" val="4106999084"/>
+      </p:ext>
+    </p:extLst>
   </p:cSld>
   <p:clrMapOvr>
     <a:masterClrMapping/>
@@ -1395,7 +1398,7 @@
             <a:fld id="{0FC7384A-F489-4586-B03E-486116E88A31}" type="slidenum">
               <a:rPr lang="en-US"/>
               <a:pPr/>
-              <a:t>32</a:t>
+              <a:t>15</a:t>
             </a:fld>
             <a:endParaRPr lang="en-US"/>
           </a:p>
@@ -1479,7 +1482,7 @@
             <a:fld id="{0FC7384A-F489-4586-B03E-486116E88A31}" type="slidenum">
               <a:rPr lang="en-US"/>
               <a:pPr/>
-              <a:t>33</a:t>
+              <a:t>16</a:t>
             </a:fld>
             <a:endParaRPr lang="en-US"/>
           </a:p>
@@ -1545,49 +1548,21 @@
       </p:grpSpPr>
       <p:sp>
         <p:nvSpPr>
-          <p:cNvPr id="7" name="Rectangle 7"/>
+          <p:cNvPr id="2" name="Slide Image Placeholder 1"/>
           <p:cNvSpPr>
-            <a:spLocks noGrp="1" noChangeArrowheads="1"/>
-          </p:cNvSpPr>
-          <p:nvPr>
-            <p:ph type="sldNum" sz="quarter" idx="5"/>
-          </p:nvPr>
-        </p:nvSpPr>
-        <p:spPr>
-          <a:ln/>
-        </p:spPr>
-        <p:txBody>
-          <a:bodyPr/>
-          <a:lstStyle/>
-          <a:p>
-            <a:fld id="{0FC7384A-F489-4586-B03E-486116E88A31}" type="slidenum">
-              <a:rPr lang="en-US"/>
-              <a:pPr/>
-              <a:t>35</a:t>
-            </a:fld>
-            <a:endParaRPr lang="en-US"/>
-          </a:p>
-        </p:txBody>
-      </p:sp>
-      <p:sp>
-        <p:nvSpPr>
-          <p:cNvPr id="688130" name="Rectangle 2"/>
-          <p:cNvSpPr>
-            <a:spLocks noGrp="1" noRot="1" noChangeAspect="1" noChangeArrowheads="1" noTextEdit="1"/>
+            <a:spLocks noGrp="1" noRot="1" noChangeAspect="1"/>
           </p:cNvSpPr>
           <p:nvPr>
             <p:ph type="sldImg"/>
           </p:nvPr>
         </p:nvSpPr>
-        <p:spPr>
-          <a:ln/>
-        </p:spPr>
-      </p:sp>
-      <p:sp>
-        <p:nvSpPr>
-          <p:cNvPr id="688131" name="Rectangle 3"/>
+        <p:spPr/>
+      </p:sp>
+      <p:sp>
+        <p:nvSpPr>
+          <p:cNvPr id="3" name="Notes Placeholder 2"/>
           <p:cNvSpPr>
-            <a:spLocks noGrp="1" noChangeArrowheads="1"/>
+            <a:spLocks noGrp="1"/>
           </p:cNvSpPr>
           <p:nvPr>
             <p:ph type="body" idx="1"/>
@@ -1602,7 +1577,36 @@
           </a:p>
         </p:txBody>
       </p:sp>
+      <p:sp>
+        <p:nvSpPr>
+          <p:cNvPr id="4" name="Slide Number Placeholder 3"/>
+          <p:cNvSpPr>
+            <a:spLocks noGrp="1"/>
+          </p:cNvSpPr>
+          <p:nvPr>
+            <p:ph type="sldNum" sz="quarter" idx="10"/>
+          </p:nvPr>
+        </p:nvSpPr>
+        <p:spPr/>
+        <p:txBody>
+          <a:bodyPr/>
+          <a:lstStyle/>
+          <a:p>
+            <a:fld id="{A02B9F3F-3042-489F-AF35-1A733968F079}" type="slidenum">
+              <a:rPr lang="en-US" smtClean="0"/>
+              <a:pPr/>
+              <a:t>17</a:t>
+            </a:fld>
+            <a:endParaRPr lang="en-US"/>
+          </a:p>
+        </p:txBody>
+      </p:sp>
     </p:spTree>
+    <p:extLst>
+      <p:ext uri="{BB962C8B-B14F-4D97-AF65-F5344CB8AC3E}">
+        <p14:creationId xmlns:p14="http://schemas.microsoft.com/office/powerpoint/2010/main" val="1557202548"/>
+      </p:ext>
+    </p:extLst>
   </p:cSld>
   <p:clrMapOvr>
     <a:masterClrMapping/>
@@ -1644,10 +1648,10 @@
           <a:bodyPr/>
           <a:lstStyle/>
           <a:p>
-            <a:fld id="{AC4AE66D-7FFE-44CD-99A4-BAF99F9C97DC}" type="slidenum">
+            <a:fld id="{0FC7384A-F489-4586-B03E-486116E88A31}" type="slidenum">
               <a:rPr lang="en-US"/>
               <a:pPr/>
-              <a:t>38</a:t>
+              <a:t>18</a:t>
             </a:fld>
             <a:endParaRPr lang="en-US"/>
           </a:p>
@@ -1655,7 +1659,7 @@
       </p:sp>
       <p:sp>
         <p:nvSpPr>
-          <p:cNvPr id="201730" name="Rectangle 2"/>
+          <p:cNvPr id="688130" name="Rectangle 2"/>
           <p:cNvSpPr>
             <a:spLocks noGrp="1" noRot="1" noChangeAspect="1" noChangeArrowheads="1" noTextEdit="1"/>
           </p:cNvSpPr>
@@ -1669,7 +1673,7 @@
       </p:sp>
       <p:sp>
         <p:nvSpPr>
-          <p:cNvPr id="201731" name="Rectangle 3"/>
+          <p:cNvPr id="688131" name="Rectangle 3"/>
           <p:cNvSpPr>
             <a:spLocks noGrp="1" noChangeArrowheads="1"/>
           </p:cNvSpPr>
@@ -1713,49 +1717,21 @@
       </p:grpSpPr>
       <p:sp>
         <p:nvSpPr>
-          <p:cNvPr id="7" name="Rectangle 7"/>
+          <p:cNvPr id="2" name="Slide Image Placeholder 1"/>
           <p:cNvSpPr>
-            <a:spLocks noGrp="1" noChangeArrowheads="1"/>
-          </p:cNvSpPr>
-          <p:nvPr>
-            <p:ph type="sldNum" sz="quarter" idx="5"/>
-          </p:nvPr>
-        </p:nvSpPr>
-        <p:spPr>
-          <a:ln/>
-        </p:spPr>
-        <p:txBody>
-          <a:bodyPr/>
-          <a:lstStyle/>
-          <a:p>
-            <a:fld id="{E2E94AE0-741A-4B43-B2AA-0D434C70A0E0}" type="slidenum">
-              <a:rPr lang="en-US"/>
-              <a:pPr/>
-              <a:t>39</a:t>
-            </a:fld>
-            <a:endParaRPr lang="en-US"/>
-          </a:p>
-        </p:txBody>
-      </p:sp>
-      <p:sp>
-        <p:nvSpPr>
-          <p:cNvPr id="687106" name="Rectangle 2"/>
-          <p:cNvSpPr>
-            <a:spLocks noGrp="1" noRot="1" noChangeAspect="1" noChangeArrowheads="1" noTextEdit="1"/>
+            <a:spLocks noGrp="1" noRot="1" noChangeAspect="1"/>
           </p:cNvSpPr>
           <p:nvPr>
             <p:ph type="sldImg"/>
           </p:nvPr>
         </p:nvSpPr>
-        <p:spPr>
-          <a:ln/>
-        </p:spPr>
-      </p:sp>
-      <p:sp>
-        <p:nvSpPr>
-          <p:cNvPr id="687107" name="Rectangle 3"/>
+        <p:spPr/>
+      </p:sp>
+      <p:sp>
+        <p:nvSpPr>
+          <p:cNvPr id="3" name="Notes Placeholder 2"/>
           <p:cNvSpPr>
-            <a:spLocks noGrp="1" noChangeArrowheads="1"/>
+            <a:spLocks noGrp="1"/>
           </p:cNvSpPr>
           <p:nvPr>
             <p:ph type="body" idx="1"/>
@@ -1770,7 +1746,36 @@
           </a:p>
         </p:txBody>
       </p:sp>
+      <p:sp>
+        <p:nvSpPr>
+          <p:cNvPr id="4" name="Slide Number Placeholder 3"/>
+          <p:cNvSpPr>
+            <a:spLocks noGrp="1"/>
+          </p:cNvSpPr>
+          <p:nvPr>
+            <p:ph type="sldNum" sz="quarter" idx="10"/>
+          </p:nvPr>
+        </p:nvSpPr>
+        <p:spPr/>
+        <p:txBody>
+          <a:bodyPr/>
+          <a:lstStyle/>
+          <a:p>
+            <a:fld id="{A02B9F3F-3042-489F-AF35-1A733968F079}" type="slidenum">
+              <a:rPr lang="en-US" smtClean="0"/>
+              <a:pPr/>
+              <a:t>19</a:t>
+            </a:fld>
+            <a:endParaRPr lang="en-US"/>
+          </a:p>
+        </p:txBody>
+      </p:sp>
     </p:spTree>
+    <p:extLst>
+      <p:ext uri="{BB962C8B-B14F-4D97-AF65-F5344CB8AC3E}">
+        <p14:creationId xmlns:p14="http://schemas.microsoft.com/office/powerpoint/2010/main" val="1995563582"/>
+      </p:ext>
+    </p:extLst>
   </p:cSld>
   <p:clrMapOvr>
     <a:masterClrMapping/>
@@ -1881,49 +1886,21 @@
       </p:grpSpPr>
       <p:sp>
         <p:nvSpPr>
-          <p:cNvPr id="7" name="Rectangle 7"/>
+          <p:cNvPr id="2" name="Slide Image Placeholder 1"/>
           <p:cNvSpPr>
-            <a:spLocks noGrp="1" noChangeArrowheads="1"/>
-          </p:cNvSpPr>
-          <p:nvPr>
-            <p:ph type="sldNum" sz="quarter" idx="5"/>
-          </p:nvPr>
-        </p:nvSpPr>
-        <p:spPr>
-          <a:ln/>
-        </p:spPr>
-        <p:txBody>
-          <a:bodyPr/>
-          <a:lstStyle/>
-          <a:p>
-            <a:fld id="{E2E94AE0-741A-4B43-B2AA-0D434C70A0E0}" type="slidenum">
-              <a:rPr lang="en-US"/>
-              <a:pPr/>
-              <a:t>40</a:t>
-            </a:fld>
-            <a:endParaRPr lang="en-US"/>
-          </a:p>
-        </p:txBody>
-      </p:sp>
-      <p:sp>
-        <p:nvSpPr>
-          <p:cNvPr id="687106" name="Rectangle 2"/>
-          <p:cNvSpPr>
-            <a:spLocks noGrp="1" noRot="1" noChangeAspect="1" noChangeArrowheads="1" noTextEdit="1"/>
+            <a:spLocks noGrp="1" noRot="1" noChangeAspect="1"/>
           </p:cNvSpPr>
           <p:nvPr>
             <p:ph type="sldImg"/>
           </p:nvPr>
         </p:nvSpPr>
-        <p:spPr>
-          <a:ln/>
-        </p:spPr>
-      </p:sp>
-      <p:sp>
-        <p:nvSpPr>
-          <p:cNvPr id="687107" name="Rectangle 3"/>
+        <p:spPr/>
+      </p:sp>
+      <p:sp>
+        <p:nvSpPr>
+          <p:cNvPr id="3" name="Notes Placeholder 2"/>
           <p:cNvSpPr>
-            <a:spLocks noGrp="1" noChangeArrowheads="1"/>
+            <a:spLocks noGrp="1"/>
           </p:cNvSpPr>
           <p:nvPr>
             <p:ph type="body" idx="1"/>
@@ -1938,7 +1915,36 @@
           </a:p>
         </p:txBody>
       </p:sp>
+      <p:sp>
+        <p:nvSpPr>
+          <p:cNvPr id="4" name="Slide Number Placeholder 3"/>
+          <p:cNvSpPr>
+            <a:spLocks noGrp="1"/>
+          </p:cNvSpPr>
+          <p:nvPr>
+            <p:ph type="sldNum" sz="quarter" idx="10"/>
+          </p:nvPr>
+        </p:nvSpPr>
+        <p:spPr/>
+        <p:txBody>
+          <a:bodyPr/>
+          <a:lstStyle/>
+          <a:p>
+            <a:fld id="{A02B9F3F-3042-489F-AF35-1A733968F079}" type="slidenum">
+              <a:rPr lang="en-US" smtClean="0"/>
+              <a:pPr/>
+              <a:t>20</a:t>
+            </a:fld>
+            <a:endParaRPr lang="en-US"/>
+          </a:p>
+        </p:txBody>
+      </p:sp>
     </p:spTree>
+    <p:extLst>
+      <p:ext uri="{BB962C8B-B14F-4D97-AF65-F5344CB8AC3E}">
+        <p14:creationId xmlns:p14="http://schemas.microsoft.com/office/powerpoint/2010/main" val="167261567"/>
+      </p:ext>
+    </p:extLst>
   </p:cSld>
   <p:clrMapOvr>
     <a:masterClrMapping/>
@@ -1980,10 +1986,10 @@
           <a:bodyPr/>
           <a:lstStyle/>
           <a:p>
-            <a:fld id="{E2E94AE0-741A-4B43-B2AA-0D434C70A0E0}" type="slidenum">
+            <a:fld id="{0FC7384A-F489-4586-B03E-486116E88A31}" type="slidenum">
               <a:rPr lang="en-US"/>
               <a:pPr/>
-              <a:t>41</a:t>
+              <a:t>21</a:t>
             </a:fld>
             <a:endParaRPr lang="en-US"/>
           </a:p>
@@ -1991,7 +1997,7 @@
       </p:sp>
       <p:sp>
         <p:nvSpPr>
-          <p:cNvPr id="687106" name="Rectangle 2"/>
+          <p:cNvPr id="688130" name="Rectangle 2"/>
           <p:cNvSpPr>
             <a:spLocks noGrp="1" noRot="1" noChangeAspect="1" noChangeArrowheads="1" noTextEdit="1"/>
           </p:cNvSpPr>
@@ -2005,7 +2011,7 @@
       </p:sp>
       <p:sp>
         <p:nvSpPr>
-          <p:cNvPr id="687107" name="Rectangle 3"/>
+          <p:cNvPr id="688131" name="Rectangle 3"/>
           <p:cNvSpPr>
             <a:spLocks noGrp="1" noChangeArrowheads="1"/>
           </p:cNvSpPr>
@@ -2049,49 +2055,21 @@
       </p:grpSpPr>
       <p:sp>
         <p:nvSpPr>
-          <p:cNvPr id="7" name="Rectangle 7"/>
+          <p:cNvPr id="2" name="Slide Image Placeholder 1"/>
           <p:cNvSpPr>
-            <a:spLocks noGrp="1" noChangeArrowheads="1"/>
-          </p:cNvSpPr>
-          <p:nvPr>
-            <p:ph type="sldNum" sz="quarter" idx="5"/>
-          </p:nvPr>
-        </p:nvSpPr>
-        <p:spPr>
-          <a:ln/>
-        </p:spPr>
-        <p:txBody>
-          <a:bodyPr/>
-          <a:lstStyle/>
-          <a:p>
-            <a:fld id="{E2E94AE0-741A-4B43-B2AA-0D434C70A0E0}" type="slidenum">
-              <a:rPr lang="en-US"/>
-              <a:pPr/>
-              <a:t>43</a:t>
-            </a:fld>
-            <a:endParaRPr lang="en-US"/>
-          </a:p>
-        </p:txBody>
-      </p:sp>
-      <p:sp>
-        <p:nvSpPr>
-          <p:cNvPr id="687106" name="Rectangle 2"/>
-          <p:cNvSpPr>
-            <a:spLocks noGrp="1" noRot="1" noChangeAspect="1" noChangeArrowheads="1" noTextEdit="1"/>
+            <a:spLocks noGrp="1" noRot="1" noChangeAspect="1"/>
           </p:cNvSpPr>
           <p:nvPr>
             <p:ph type="sldImg"/>
           </p:nvPr>
         </p:nvSpPr>
-        <p:spPr>
-          <a:ln/>
-        </p:spPr>
-      </p:sp>
-      <p:sp>
-        <p:nvSpPr>
-          <p:cNvPr id="687107" name="Rectangle 3"/>
+        <p:spPr/>
+      </p:sp>
+      <p:sp>
+        <p:nvSpPr>
+          <p:cNvPr id="3" name="Notes Placeholder 2"/>
           <p:cNvSpPr>
-            <a:spLocks noGrp="1" noChangeArrowheads="1"/>
+            <a:spLocks noGrp="1"/>
           </p:cNvSpPr>
           <p:nvPr>
             <p:ph type="body" idx="1"/>
@@ -2106,7 +2084,36 @@
           </a:p>
         </p:txBody>
       </p:sp>
+      <p:sp>
+        <p:nvSpPr>
+          <p:cNvPr id="4" name="Slide Number Placeholder 3"/>
+          <p:cNvSpPr>
+            <a:spLocks noGrp="1"/>
+          </p:cNvSpPr>
+          <p:nvPr>
+            <p:ph type="sldNum" sz="quarter" idx="10"/>
+          </p:nvPr>
+        </p:nvSpPr>
+        <p:spPr/>
+        <p:txBody>
+          <a:bodyPr/>
+          <a:lstStyle/>
+          <a:p>
+            <a:fld id="{A02B9F3F-3042-489F-AF35-1A733968F079}" type="slidenum">
+              <a:rPr lang="en-US" smtClean="0"/>
+              <a:pPr/>
+              <a:t>22</a:t>
+            </a:fld>
+            <a:endParaRPr lang="en-US"/>
+          </a:p>
+        </p:txBody>
+      </p:sp>
     </p:spTree>
+    <p:extLst>
+      <p:ext uri="{BB962C8B-B14F-4D97-AF65-F5344CB8AC3E}">
+        <p14:creationId xmlns:p14="http://schemas.microsoft.com/office/powerpoint/2010/main" val="2557445004"/>
+      </p:ext>
+    </p:extLst>
   </p:cSld>
   <p:clrMapOvr>
     <a:masterClrMapping/>
@@ -2133,49 +2140,21 @@
       </p:grpSpPr>
       <p:sp>
         <p:nvSpPr>
-          <p:cNvPr id="7" name="Rectangle 7"/>
+          <p:cNvPr id="2" name="Slide Image Placeholder 1"/>
           <p:cNvSpPr>
-            <a:spLocks noGrp="1" noChangeArrowheads="1"/>
-          </p:cNvSpPr>
-          <p:nvPr>
-            <p:ph type="sldNum" sz="quarter" idx="5"/>
-          </p:nvPr>
-        </p:nvSpPr>
-        <p:spPr>
-          <a:ln/>
-        </p:spPr>
-        <p:txBody>
-          <a:bodyPr/>
-          <a:lstStyle/>
-          <a:p>
-            <a:fld id="{AC4AE66D-7FFE-44CD-99A4-BAF99F9C97DC}" type="slidenum">
-              <a:rPr lang="en-US"/>
-              <a:pPr/>
-              <a:t>46</a:t>
-            </a:fld>
-            <a:endParaRPr lang="en-US"/>
-          </a:p>
-        </p:txBody>
-      </p:sp>
-      <p:sp>
-        <p:nvSpPr>
-          <p:cNvPr id="201730" name="Rectangle 2"/>
-          <p:cNvSpPr>
-            <a:spLocks noGrp="1" noRot="1" noChangeAspect="1" noChangeArrowheads="1" noTextEdit="1"/>
+            <a:spLocks noGrp="1" noRot="1" noChangeAspect="1"/>
           </p:cNvSpPr>
           <p:nvPr>
             <p:ph type="sldImg"/>
           </p:nvPr>
         </p:nvSpPr>
-        <p:spPr>
-          <a:ln/>
-        </p:spPr>
-      </p:sp>
-      <p:sp>
-        <p:nvSpPr>
-          <p:cNvPr id="201731" name="Rectangle 3"/>
+        <p:spPr/>
+      </p:sp>
+      <p:sp>
+        <p:nvSpPr>
+          <p:cNvPr id="3" name="Notes Placeholder 2"/>
           <p:cNvSpPr>
-            <a:spLocks noGrp="1" noChangeArrowheads="1"/>
+            <a:spLocks noGrp="1"/>
           </p:cNvSpPr>
           <p:nvPr>
             <p:ph type="body" idx="1"/>
@@ -2190,7 +2169,36 @@
           </a:p>
         </p:txBody>
       </p:sp>
+      <p:sp>
+        <p:nvSpPr>
+          <p:cNvPr id="4" name="Slide Number Placeholder 3"/>
+          <p:cNvSpPr>
+            <a:spLocks noGrp="1"/>
+          </p:cNvSpPr>
+          <p:nvPr>
+            <p:ph type="sldNum" sz="quarter" idx="10"/>
+          </p:nvPr>
+        </p:nvSpPr>
+        <p:spPr/>
+        <p:txBody>
+          <a:bodyPr/>
+          <a:lstStyle/>
+          <a:p>
+            <a:fld id="{A02B9F3F-3042-489F-AF35-1A733968F079}" type="slidenum">
+              <a:rPr lang="en-US" smtClean="0"/>
+              <a:pPr/>
+              <a:t>23</a:t>
+            </a:fld>
+            <a:endParaRPr lang="en-US"/>
+          </a:p>
+        </p:txBody>
+      </p:sp>
     </p:spTree>
+    <p:extLst>
+      <p:ext uri="{BB962C8B-B14F-4D97-AF65-F5344CB8AC3E}">
+        <p14:creationId xmlns:p14="http://schemas.microsoft.com/office/powerpoint/2010/main" val="1728884020"/>
+      </p:ext>
+    </p:extLst>
   </p:cSld>
   <p:clrMapOvr>
     <a:masterClrMapping/>
@@ -2232,10 +2240,10 @@
           <a:bodyPr/>
           <a:lstStyle/>
           <a:p>
-            <a:fld id="{0A3D9CB9-3A48-4BB0-A01C-8270696DC00B}" type="slidenum">
+            <a:fld id="{0FC7384A-F489-4586-B03E-486116E88A31}" type="slidenum">
               <a:rPr lang="en-US"/>
               <a:pPr/>
-              <a:t>47</a:t>
+              <a:t>24</a:t>
             </a:fld>
             <a:endParaRPr lang="en-US"/>
           </a:p>
@@ -2243,7 +2251,7 @@
       </p:sp>
       <p:sp>
         <p:nvSpPr>
-          <p:cNvPr id="206850" name="Rectangle 2"/>
+          <p:cNvPr id="688130" name="Rectangle 2"/>
           <p:cNvSpPr>
             <a:spLocks noGrp="1" noRot="1" noChangeAspect="1" noChangeArrowheads="1" noTextEdit="1"/>
           </p:cNvSpPr>
@@ -2257,7 +2265,7 @@
       </p:sp>
       <p:sp>
         <p:nvSpPr>
-          <p:cNvPr id="206851" name="Rectangle 3"/>
+          <p:cNvPr id="688131" name="Rectangle 3"/>
           <p:cNvSpPr>
             <a:spLocks noGrp="1" noChangeArrowheads="1"/>
           </p:cNvSpPr>
@@ -2316,10 +2324,10 @@
           <a:bodyPr/>
           <a:lstStyle/>
           <a:p>
-            <a:fld id="{0A3D9CB9-3A48-4BB0-A01C-8270696DC00B}" type="slidenum">
+            <a:fld id="{0FC7384A-F489-4586-B03E-486116E88A31}" type="slidenum">
               <a:rPr lang="en-US"/>
               <a:pPr/>
-              <a:t>48</a:t>
+              <a:t>25</a:t>
             </a:fld>
             <a:endParaRPr lang="en-US"/>
           </a:p>
@@ -2327,7 +2335,7 @@
       </p:sp>
       <p:sp>
         <p:nvSpPr>
-          <p:cNvPr id="206850" name="Rectangle 2"/>
+          <p:cNvPr id="688130" name="Rectangle 2"/>
           <p:cNvSpPr>
             <a:spLocks noGrp="1" noRot="1" noChangeAspect="1" noChangeArrowheads="1" noTextEdit="1"/>
           </p:cNvSpPr>
@@ -2341,7 +2349,7 @@
       </p:sp>
       <p:sp>
         <p:nvSpPr>
-          <p:cNvPr id="206851" name="Rectangle 3"/>
+          <p:cNvPr id="688131" name="Rectangle 3"/>
           <p:cNvSpPr>
             <a:spLocks noGrp="1" noChangeArrowheads="1"/>
           </p:cNvSpPr>
@@ -2385,49 +2393,21 @@
       </p:grpSpPr>
       <p:sp>
         <p:nvSpPr>
-          <p:cNvPr id="7" name="Rectangle 7"/>
+          <p:cNvPr id="2" name="Slide Image Placeholder 1"/>
           <p:cNvSpPr>
-            <a:spLocks noGrp="1" noChangeArrowheads="1"/>
-          </p:cNvSpPr>
-          <p:nvPr>
-            <p:ph type="sldNum" sz="quarter" idx="5"/>
-          </p:nvPr>
-        </p:nvSpPr>
-        <p:spPr>
-          <a:ln/>
-        </p:spPr>
-        <p:txBody>
-          <a:bodyPr/>
-          <a:lstStyle/>
-          <a:p>
-            <a:fld id="{0A3D9CB9-3A48-4BB0-A01C-8270696DC00B}" type="slidenum">
-              <a:rPr lang="en-US"/>
-              <a:pPr/>
-              <a:t>49</a:t>
-            </a:fld>
-            <a:endParaRPr lang="en-US"/>
-          </a:p>
-        </p:txBody>
-      </p:sp>
-      <p:sp>
-        <p:nvSpPr>
-          <p:cNvPr id="206850" name="Rectangle 2"/>
-          <p:cNvSpPr>
-            <a:spLocks noGrp="1" noRot="1" noChangeAspect="1" noChangeArrowheads="1" noTextEdit="1"/>
+            <a:spLocks noGrp="1" noRot="1" noChangeAspect="1"/>
           </p:cNvSpPr>
           <p:nvPr>
             <p:ph type="sldImg"/>
           </p:nvPr>
         </p:nvSpPr>
-        <p:spPr>
-          <a:ln/>
-        </p:spPr>
-      </p:sp>
-      <p:sp>
-        <p:nvSpPr>
-          <p:cNvPr id="206851" name="Rectangle 3"/>
+        <p:spPr/>
+      </p:sp>
+      <p:sp>
+        <p:nvSpPr>
+          <p:cNvPr id="3" name="Notes Placeholder 2"/>
           <p:cNvSpPr>
-            <a:spLocks noGrp="1" noChangeArrowheads="1"/>
+            <a:spLocks noGrp="1"/>
           </p:cNvSpPr>
           <p:nvPr>
             <p:ph type="body" idx="1"/>
@@ -2438,11 +2418,40 @@
           <a:bodyPr/>
           <a:lstStyle/>
           <a:p>
+            <a:endParaRPr lang="en-US" dirty="0"/>
+          </a:p>
+        </p:txBody>
+      </p:sp>
+      <p:sp>
+        <p:nvSpPr>
+          <p:cNvPr id="4" name="Slide Number Placeholder 3"/>
+          <p:cNvSpPr>
+            <a:spLocks noGrp="1"/>
+          </p:cNvSpPr>
+          <p:nvPr>
+            <p:ph type="sldNum" sz="quarter" idx="10"/>
+          </p:nvPr>
+        </p:nvSpPr>
+        <p:spPr/>
+        <p:txBody>
+          <a:bodyPr/>
+          <a:lstStyle/>
+          <a:p>
+            <a:fld id="{A02B9F3F-3042-489F-AF35-1A733968F079}" type="slidenum">
+              <a:rPr lang="en-US" smtClean="0"/>
+              <a:pPr/>
+              <a:t>27</a:t>
+            </a:fld>
             <a:endParaRPr lang="en-US"/>
           </a:p>
         </p:txBody>
       </p:sp>
     </p:spTree>
+    <p:extLst>
+      <p:ext uri="{BB962C8B-B14F-4D97-AF65-F5344CB8AC3E}">
+        <p14:creationId xmlns:p14="http://schemas.microsoft.com/office/powerpoint/2010/main" val="3329130683"/>
+      </p:ext>
+    </p:extLst>
   </p:cSld>
   <p:clrMapOvr>
     <a:masterClrMapping/>
@@ -2469,49 +2478,21 @@
       </p:grpSpPr>
       <p:sp>
         <p:nvSpPr>
-          <p:cNvPr id="7" name="Rectangle 7"/>
+          <p:cNvPr id="2" name="Slide Image Placeholder 1"/>
           <p:cNvSpPr>
-            <a:spLocks noGrp="1" noChangeArrowheads="1"/>
-          </p:cNvSpPr>
-          <p:nvPr>
-            <p:ph type="sldNum" sz="quarter" idx="5"/>
-          </p:nvPr>
-        </p:nvSpPr>
-        <p:spPr>
-          <a:ln/>
-        </p:spPr>
-        <p:txBody>
-          <a:bodyPr/>
-          <a:lstStyle/>
-          <a:p>
-            <a:fld id="{0A3D9CB9-3A48-4BB0-A01C-8270696DC00B}" type="slidenum">
-              <a:rPr lang="en-US"/>
-              <a:pPr/>
-              <a:t>51</a:t>
-            </a:fld>
-            <a:endParaRPr lang="en-US"/>
-          </a:p>
-        </p:txBody>
-      </p:sp>
-      <p:sp>
-        <p:nvSpPr>
-          <p:cNvPr id="206850" name="Rectangle 2"/>
-          <p:cNvSpPr>
-            <a:spLocks noGrp="1" noRot="1" noChangeAspect="1" noChangeArrowheads="1" noTextEdit="1"/>
+            <a:spLocks noGrp="1" noRot="1" noChangeAspect="1"/>
           </p:cNvSpPr>
           <p:nvPr>
             <p:ph type="sldImg"/>
           </p:nvPr>
         </p:nvSpPr>
-        <p:spPr>
-          <a:ln/>
-        </p:spPr>
-      </p:sp>
-      <p:sp>
-        <p:nvSpPr>
-          <p:cNvPr id="206851" name="Rectangle 3"/>
+        <p:spPr/>
+      </p:sp>
+      <p:sp>
+        <p:nvSpPr>
+          <p:cNvPr id="3" name="Notes Placeholder 2"/>
           <p:cNvSpPr>
-            <a:spLocks noGrp="1" noChangeArrowheads="1"/>
+            <a:spLocks noGrp="1"/>
           </p:cNvSpPr>
           <p:nvPr>
             <p:ph type="body" idx="1"/>
@@ -2526,7 +2507,36 @@
           </a:p>
         </p:txBody>
       </p:sp>
+      <p:sp>
+        <p:nvSpPr>
+          <p:cNvPr id="4" name="Slide Number Placeholder 3"/>
+          <p:cNvSpPr>
+            <a:spLocks noGrp="1"/>
+          </p:cNvSpPr>
+          <p:nvPr>
+            <p:ph type="sldNum" sz="quarter" idx="10"/>
+          </p:nvPr>
+        </p:nvSpPr>
+        <p:spPr/>
+        <p:txBody>
+          <a:bodyPr/>
+          <a:lstStyle/>
+          <a:p>
+            <a:fld id="{A02B9F3F-3042-489F-AF35-1A733968F079}" type="slidenum">
+              <a:rPr lang="en-US" smtClean="0"/>
+              <a:pPr/>
+              <a:t>28</a:t>
+            </a:fld>
+            <a:endParaRPr lang="en-US"/>
+          </a:p>
+        </p:txBody>
+      </p:sp>
     </p:spTree>
+    <p:extLst>
+      <p:ext uri="{BB962C8B-B14F-4D97-AF65-F5344CB8AC3E}">
+        <p14:creationId xmlns:p14="http://schemas.microsoft.com/office/powerpoint/2010/main" val="3636387659"/>
+      </p:ext>
+    </p:extLst>
   </p:cSld>
   <p:clrMapOvr>
     <a:masterClrMapping/>
@@ -2553,49 +2563,21 @@
       </p:grpSpPr>
       <p:sp>
         <p:nvSpPr>
-          <p:cNvPr id="7" name="Rectangle 7"/>
+          <p:cNvPr id="2" name="Slide Image Placeholder 1"/>
           <p:cNvSpPr>
-            <a:spLocks noGrp="1" noChangeArrowheads="1"/>
-          </p:cNvSpPr>
-          <p:nvPr>
-            <p:ph type="sldNum" sz="quarter" idx="5"/>
-          </p:nvPr>
-        </p:nvSpPr>
-        <p:spPr>
-          <a:ln/>
-        </p:spPr>
-        <p:txBody>
-          <a:bodyPr/>
-          <a:lstStyle/>
-          <a:p>
-            <a:fld id="{0A3D9CB9-3A48-4BB0-A01C-8270696DC00B}" type="slidenum">
-              <a:rPr lang="en-US"/>
-              <a:pPr/>
-              <a:t>52</a:t>
-            </a:fld>
-            <a:endParaRPr lang="en-US"/>
-          </a:p>
-        </p:txBody>
-      </p:sp>
-      <p:sp>
-        <p:nvSpPr>
-          <p:cNvPr id="206850" name="Rectangle 2"/>
-          <p:cNvSpPr>
-            <a:spLocks noGrp="1" noRot="1" noChangeAspect="1" noChangeArrowheads="1" noTextEdit="1"/>
+            <a:spLocks noGrp="1" noRot="1" noChangeAspect="1"/>
           </p:cNvSpPr>
           <p:nvPr>
             <p:ph type="sldImg"/>
           </p:nvPr>
         </p:nvSpPr>
-        <p:spPr>
-          <a:ln/>
-        </p:spPr>
-      </p:sp>
-      <p:sp>
-        <p:nvSpPr>
-          <p:cNvPr id="206851" name="Rectangle 3"/>
+        <p:spPr/>
+      </p:sp>
+      <p:sp>
+        <p:nvSpPr>
+          <p:cNvPr id="3" name="Notes Placeholder 2"/>
           <p:cNvSpPr>
-            <a:spLocks noGrp="1" noChangeArrowheads="1"/>
+            <a:spLocks noGrp="1"/>
           </p:cNvSpPr>
           <p:nvPr>
             <p:ph type="body" idx="1"/>
@@ -2610,7 +2592,36 @@
           </a:p>
         </p:txBody>
       </p:sp>
+      <p:sp>
+        <p:nvSpPr>
+          <p:cNvPr id="4" name="Slide Number Placeholder 3"/>
+          <p:cNvSpPr>
+            <a:spLocks noGrp="1"/>
+          </p:cNvSpPr>
+          <p:nvPr>
+            <p:ph type="sldNum" sz="quarter" idx="10"/>
+          </p:nvPr>
+        </p:nvSpPr>
+        <p:spPr/>
+        <p:txBody>
+          <a:bodyPr/>
+          <a:lstStyle/>
+          <a:p>
+            <a:fld id="{A02B9F3F-3042-489F-AF35-1A733968F079}" type="slidenum">
+              <a:rPr lang="en-US" smtClean="0"/>
+              <a:pPr/>
+              <a:t>29</a:t>
+            </a:fld>
+            <a:endParaRPr lang="en-US"/>
+          </a:p>
+        </p:txBody>
+      </p:sp>
     </p:spTree>
+    <p:extLst>
+      <p:ext uri="{BB962C8B-B14F-4D97-AF65-F5344CB8AC3E}">
+        <p14:creationId xmlns:p14="http://schemas.microsoft.com/office/powerpoint/2010/main" val="2716430218"/>
+      </p:ext>
+    </p:extLst>
   </p:cSld>
   <p:clrMapOvr>
     <a:masterClrMapping/>
@@ -2637,49 +2648,21 @@
       </p:grpSpPr>
       <p:sp>
         <p:nvSpPr>
-          <p:cNvPr id="7" name="Rectangle 7"/>
+          <p:cNvPr id="2" name="Slide Image Placeholder 1"/>
           <p:cNvSpPr>
-            <a:spLocks noGrp="1" noChangeArrowheads="1"/>
-          </p:cNvSpPr>
-          <p:nvPr>
-            <p:ph type="sldNum" sz="quarter" idx="5"/>
-          </p:nvPr>
-        </p:nvSpPr>
-        <p:spPr>
-          <a:ln/>
-        </p:spPr>
-        <p:txBody>
-          <a:bodyPr/>
-          <a:lstStyle/>
-          <a:p>
-            <a:fld id="{0A3D9CB9-3A48-4BB0-A01C-8270696DC00B}" type="slidenum">
-              <a:rPr lang="en-US"/>
-              <a:pPr/>
-              <a:t>53</a:t>
-            </a:fld>
-            <a:endParaRPr lang="en-US"/>
-          </a:p>
-        </p:txBody>
-      </p:sp>
-      <p:sp>
-        <p:nvSpPr>
-          <p:cNvPr id="206850" name="Rectangle 2"/>
-          <p:cNvSpPr>
-            <a:spLocks noGrp="1" noRot="1" noChangeAspect="1" noChangeArrowheads="1" noTextEdit="1"/>
+            <a:spLocks noGrp="1" noRot="1" noChangeAspect="1"/>
           </p:cNvSpPr>
           <p:nvPr>
             <p:ph type="sldImg"/>
           </p:nvPr>
         </p:nvSpPr>
-        <p:spPr>
-          <a:ln/>
-        </p:spPr>
-      </p:sp>
-      <p:sp>
-        <p:nvSpPr>
-          <p:cNvPr id="206851" name="Rectangle 3"/>
+        <p:spPr/>
+      </p:sp>
+      <p:sp>
+        <p:nvSpPr>
+          <p:cNvPr id="3" name="Notes Placeholder 2"/>
           <p:cNvSpPr>
-            <a:spLocks noGrp="1" noChangeArrowheads="1"/>
+            <a:spLocks noGrp="1"/>
           </p:cNvSpPr>
           <p:nvPr>
             <p:ph type="body" idx="1"/>
@@ -2694,7 +2677,36 @@
           </a:p>
         </p:txBody>
       </p:sp>
+      <p:sp>
+        <p:nvSpPr>
+          <p:cNvPr id="4" name="Slide Number Placeholder 3"/>
+          <p:cNvSpPr>
+            <a:spLocks noGrp="1"/>
+          </p:cNvSpPr>
+          <p:nvPr>
+            <p:ph type="sldNum" sz="quarter" idx="10"/>
+          </p:nvPr>
+        </p:nvSpPr>
+        <p:spPr/>
+        <p:txBody>
+          <a:bodyPr/>
+          <a:lstStyle/>
+          <a:p>
+            <a:fld id="{A02B9F3F-3042-489F-AF35-1A733968F079}" type="slidenum">
+              <a:rPr lang="en-US" smtClean="0"/>
+              <a:pPr/>
+              <a:t>30</a:t>
+            </a:fld>
+            <a:endParaRPr lang="en-US"/>
+          </a:p>
+        </p:txBody>
+      </p:sp>
     </p:spTree>
+    <p:extLst>
+      <p:ext uri="{BB962C8B-B14F-4D97-AF65-F5344CB8AC3E}">
+        <p14:creationId xmlns:p14="http://schemas.microsoft.com/office/powerpoint/2010/main" val="2693717698"/>
+      </p:ext>
+    </p:extLst>
   </p:cSld>
   <p:clrMapOvr>
     <a:masterClrMapping/>
@@ -2820,10 +2832,10 @@
           <a:bodyPr/>
           <a:lstStyle/>
           <a:p>
-            <a:fld id="{0A3D9CB9-3A48-4BB0-A01C-8270696DC00B}" type="slidenum">
+            <a:fld id="{0FC7384A-F489-4586-B03E-486116E88A31}" type="slidenum">
               <a:rPr lang="en-US"/>
               <a:pPr/>
-              <a:t>54</a:t>
+              <a:t>31</a:t>
             </a:fld>
             <a:endParaRPr lang="en-US"/>
           </a:p>
@@ -2831,7 +2843,7 @@
       </p:sp>
       <p:sp>
         <p:nvSpPr>
-          <p:cNvPr id="206850" name="Rectangle 2"/>
+          <p:cNvPr id="688130" name="Rectangle 2"/>
           <p:cNvSpPr>
             <a:spLocks noGrp="1" noRot="1" noChangeAspect="1" noChangeArrowheads="1" noTextEdit="1"/>
           </p:cNvSpPr>
@@ -2845,7 +2857,7 @@
       </p:sp>
       <p:sp>
         <p:nvSpPr>
-          <p:cNvPr id="206851" name="Rectangle 3"/>
+          <p:cNvPr id="688131" name="Rectangle 3"/>
           <p:cNvSpPr>
             <a:spLocks noGrp="1" noChangeArrowheads="1"/>
           </p:cNvSpPr>
@@ -2904,10 +2916,10 @@
           <a:bodyPr/>
           <a:lstStyle/>
           <a:p>
-            <a:fld id="{1240EC72-EB67-4546-B7C3-5744BDE3AD4D}" type="slidenum">
+            <a:fld id="{0FC7384A-F489-4586-B03E-486116E88A31}" type="slidenum">
               <a:rPr lang="en-US"/>
               <a:pPr/>
-              <a:t>55</a:t>
+              <a:t>32</a:t>
             </a:fld>
             <a:endParaRPr lang="en-US"/>
           </a:p>
@@ -2915,7 +2927,7 @@
       </p:sp>
       <p:sp>
         <p:nvSpPr>
-          <p:cNvPr id="203778" name="Rectangle 2"/>
+          <p:cNvPr id="688130" name="Rectangle 2"/>
           <p:cNvSpPr>
             <a:spLocks noGrp="1" noRot="1" noChangeAspect="1" noChangeArrowheads="1" noTextEdit="1"/>
           </p:cNvSpPr>
@@ -2929,7 +2941,7 @@
       </p:sp>
       <p:sp>
         <p:nvSpPr>
-          <p:cNvPr id="203779" name="Rectangle 3"/>
+          <p:cNvPr id="688131" name="Rectangle 3"/>
           <p:cNvSpPr>
             <a:spLocks noGrp="1" noChangeArrowheads="1"/>
           </p:cNvSpPr>
@@ -2988,10 +3000,10 @@
           <a:bodyPr/>
           <a:lstStyle/>
           <a:p>
-            <a:fld id="{1240EC72-EB67-4546-B7C3-5744BDE3AD4D}" type="slidenum">
+            <a:fld id="{0FC7384A-F489-4586-B03E-486116E88A31}" type="slidenum">
               <a:rPr lang="en-US"/>
               <a:pPr/>
-              <a:t>56</a:t>
+              <a:t>33</a:t>
             </a:fld>
             <a:endParaRPr lang="en-US"/>
           </a:p>
@@ -2999,7 +3011,7 @@
       </p:sp>
       <p:sp>
         <p:nvSpPr>
-          <p:cNvPr id="203778" name="Rectangle 2"/>
+          <p:cNvPr id="688130" name="Rectangle 2"/>
           <p:cNvSpPr>
             <a:spLocks noGrp="1" noRot="1" noChangeAspect="1" noChangeArrowheads="1" noTextEdit="1"/>
           </p:cNvSpPr>
@@ -3013,7 +3025,598 @@
       </p:sp>
       <p:sp>
         <p:nvSpPr>
-          <p:cNvPr id="203779" name="Rectangle 3"/>
+          <p:cNvPr id="688131" name="Rectangle 3"/>
+          <p:cNvSpPr>
+            <a:spLocks noGrp="1" noChangeArrowheads="1"/>
+          </p:cNvSpPr>
+          <p:nvPr>
+            <p:ph type="body" idx="1"/>
+          </p:nvPr>
+        </p:nvSpPr>
+        <p:spPr/>
+        <p:txBody>
+          <a:bodyPr/>
+          <a:lstStyle/>
+          <a:p>
+            <a:endParaRPr lang="en-US"/>
+          </a:p>
+        </p:txBody>
+      </p:sp>
+    </p:spTree>
+  </p:cSld>
+  <p:clrMapOvr>
+    <a:masterClrMapping/>
+  </p:clrMapOvr>
+</p:notes>
+</file>
+
+<file path=ppt/notesSlides/notesSlide33.xml><?xml version="1.0" encoding="utf-8"?>
+<p:notes xmlns:a="http://schemas.openxmlformats.org/drawingml/2006/main" xmlns:r="http://schemas.openxmlformats.org/officeDocument/2006/relationships" xmlns:p="http://schemas.openxmlformats.org/presentationml/2006/main">
+  <p:cSld>
+    <p:spTree>
+      <p:nvGrpSpPr>
+        <p:cNvPr id="1" name=""/>
+        <p:cNvGrpSpPr/>
+        <p:nvPr/>
+      </p:nvGrpSpPr>
+      <p:grpSpPr>
+        <a:xfrm>
+          <a:off x="0" y="0"/>
+          <a:ext cx="0" cy="0"/>
+          <a:chOff x="0" y="0"/>
+          <a:chExt cx="0" cy="0"/>
+        </a:xfrm>
+      </p:grpSpPr>
+      <p:sp>
+        <p:nvSpPr>
+          <p:cNvPr id="2" name="Slide Image Placeholder 1"/>
+          <p:cNvSpPr>
+            <a:spLocks noGrp="1" noRot="1" noChangeAspect="1"/>
+          </p:cNvSpPr>
+          <p:nvPr>
+            <p:ph type="sldImg"/>
+          </p:nvPr>
+        </p:nvSpPr>
+        <p:spPr/>
+      </p:sp>
+      <p:sp>
+        <p:nvSpPr>
+          <p:cNvPr id="3" name="Notes Placeholder 2"/>
+          <p:cNvSpPr>
+            <a:spLocks noGrp="1"/>
+          </p:cNvSpPr>
+          <p:nvPr>
+            <p:ph type="body" idx="1"/>
+          </p:nvPr>
+        </p:nvSpPr>
+        <p:spPr/>
+        <p:txBody>
+          <a:bodyPr/>
+          <a:lstStyle/>
+          <a:p>
+            <a:endParaRPr lang="en-US"/>
+          </a:p>
+        </p:txBody>
+      </p:sp>
+      <p:sp>
+        <p:nvSpPr>
+          <p:cNvPr id="4" name="Slide Number Placeholder 3"/>
+          <p:cNvSpPr>
+            <a:spLocks noGrp="1"/>
+          </p:cNvSpPr>
+          <p:nvPr>
+            <p:ph type="sldNum" sz="quarter" idx="10"/>
+          </p:nvPr>
+        </p:nvSpPr>
+        <p:spPr/>
+        <p:txBody>
+          <a:bodyPr/>
+          <a:lstStyle/>
+          <a:p>
+            <a:fld id="{A02B9F3F-3042-489F-AF35-1A733968F079}" type="slidenum">
+              <a:rPr lang="en-US" smtClean="0"/>
+              <a:pPr/>
+              <a:t>34</a:t>
+            </a:fld>
+            <a:endParaRPr lang="en-US"/>
+          </a:p>
+        </p:txBody>
+      </p:sp>
+    </p:spTree>
+    <p:extLst>
+      <p:ext uri="{BB962C8B-B14F-4D97-AF65-F5344CB8AC3E}">
+        <p14:creationId xmlns:p14="http://schemas.microsoft.com/office/powerpoint/2010/main" val="2196645854"/>
+      </p:ext>
+    </p:extLst>
+  </p:cSld>
+  <p:clrMapOvr>
+    <a:masterClrMapping/>
+  </p:clrMapOvr>
+</p:notes>
+</file>
+
+<file path=ppt/notesSlides/notesSlide34.xml><?xml version="1.0" encoding="utf-8"?>
+<p:notes xmlns:a="http://schemas.openxmlformats.org/drawingml/2006/main" xmlns:r="http://schemas.openxmlformats.org/officeDocument/2006/relationships" xmlns:p="http://schemas.openxmlformats.org/presentationml/2006/main">
+  <p:cSld>
+    <p:spTree>
+      <p:nvGrpSpPr>
+        <p:cNvPr id="1" name=""/>
+        <p:cNvGrpSpPr/>
+        <p:nvPr/>
+      </p:nvGrpSpPr>
+      <p:grpSpPr>
+        <a:xfrm>
+          <a:off x="0" y="0"/>
+          <a:ext cx="0" cy="0"/>
+          <a:chOff x="0" y="0"/>
+          <a:chExt cx="0" cy="0"/>
+        </a:xfrm>
+      </p:grpSpPr>
+      <p:sp>
+        <p:nvSpPr>
+          <p:cNvPr id="7" name="Rectangle 7"/>
+          <p:cNvSpPr>
+            <a:spLocks noGrp="1" noChangeArrowheads="1"/>
+          </p:cNvSpPr>
+          <p:nvPr>
+            <p:ph type="sldNum" sz="quarter" idx="5"/>
+          </p:nvPr>
+        </p:nvSpPr>
+        <p:spPr>
+          <a:ln/>
+        </p:spPr>
+        <p:txBody>
+          <a:bodyPr/>
+          <a:lstStyle/>
+          <a:p>
+            <a:fld id="{0FC7384A-F489-4586-B03E-486116E88A31}" type="slidenum">
+              <a:rPr lang="en-US"/>
+              <a:pPr/>
+              <a:t>35</a:t>
+            </a:fld>
+            <a:endParaRPr lang="en-US"/>
+          </a:p>
+        </p:txBody>
+      </p:sp>
+      <p:sp>
+        <p:nvSpPr>
+          <p:cNvPr id="688130" name="Rectangle 2"/>
+          <p:cNvSpPr>
+            <a:spLocks noGrp="1" noRot="1" noChangeAspect="1" noChangeArrowheads="1" noTextEdit="1"/>
+          </p:cNvSpPr>
+          <p:nvPr>
+            <p:ph type="sldImg"/>
+          </p:nvPr>
+        </p:nvSpPr>
+        <p:spPr>
+          <a:ln/>
+        </p:spPr>
+      </p:sp>
+      <p:sp>
+        <p:nvSpPr>
+          <p:cNvPr id="688131" name="Rectangle 3"/>
+          <p:cNvSpPr>
+            <a:spLocks noGrp="1" noChangeArrowheads="1"/>
+          </p:cNvSpPr>
+          <p:nvPr>
+            <p:ph type="body" idx="1"/>
+          </p:nvPr>
+        </p:nvSpPr>
+        <p:spPr/>
+        <p:txBody>
+          <a:bodyPr/>
+          <a:lstStyle/>
+          <a:p>
+            <a:endParaRPr lang="en-US"/>
+          </a:p>
+        </p:txBody>
+      </p:sp>
+    </p:spTree>
+  </p:cSld>
+  <p:clrMapOvr>
+    <a:masterClrMapping/>
+  </p:clrMapOvr>
+</p:notes>
+</file>
+
+<file path=ppt/notesSlides/notesSlide35.xml><?xml version="1.0" encoding="utf-8"?>
+<p:notes xmlns:a="http://schemas.openxmlformats.org/drawingml/2006/main" xmlns:r="http://schemas.openxmlformats.org/officeDocument/2006/relationships" xmlns:p="http://schemas.openxmlformats.org/presentationml/2006/main">
+  <p:cSld>
+    <p:spTree>
+      <p:nvGrpSpPr>
+        <p:cNvPr id="1" name=""/>
+        <p:cNvGrpSpPr/>
+        <p:nvPr/>
+      </p:nvGrpSpPr>
+      <p:grpSpPr>
+        <a:xfrm>
+          <a:off x="0" y="0"/>
+          <a:ext cx="0" cy="0"/>
+          <a:chOff x="0" y="0"/>
+          <a:chExt cx="0" cy="0"/>
+        </a:xfrm>
+      </p:grpSpPr>
+      <p:sp>
+        <p:nvSpPr>
+          <p:cNvPr id="2" name="Slide Image Placeholder 1"/>
+          <p:cNvSpPr>
+            <a:spLocks noGrp="1" noRot="1" noChangeAspect="1"/>
+          </p:cNvSpPr>
+          <p:nvPr>
+            <p:ph type="sldImg"/>
+          </p:nvPr>
+        </p:nvSpPr>
+        <p:spPr/>
+      </p:sp>
+      <p:sp>
+        <p:nvSpPr>
+          <p:cNvPr id="3" name="Notes Placeholder 2"/>
+          <p:cNvSpPr>
+            <a:spLocks noGrp="1"/>
+          </p:cNvSpPr>
+          <p:nvPr>
+            <p:ph type="body" idx="1"/>
+          </p:nvPr>
+        </p:nvSpPr>
+        <p:spPr/>
+        <p:txBody>
+          <a:bodyPr/>
+          <a:lstStyle/>
+          <a:p>
+            <a:endParaRPr lang="en-US"/>
+          </a:p>
+        </p:txBody>
+      </p:sp>
+      <p:sp>
+        <p:nvSpPr>
+          <p:cNvPr id="4" name="Slide Number Placeholder 3"/>
+          <p:cNvSpPr>
+            <a:spLocks noGrp="1"/>
+          </p:cNvSpPr>
+          <p:nvPr>
+            <p:ph type="sldNum" sz="quarter" idx="10"/>
+          </p:nvPr>
+        </p:nvSpPr>
+        <p:spPr/>
+        <p:txBody>
+          <a:bodyPr/>
+          <a:lstStyle/>
+          <a:p>
+            <a:fld id="{A02B9F3F-3042-489F-AF35-1A733968F079}" type="slidenum">
+              <a:rPr lang="en-US" smtClean="0"/>
+              <a:pPr/>
+              <a:t>36</a:t>
+            </a:fld>
+            <a:endParaRPr lang="en-US"/>
+          </a:p>
+        </p:txBody>
+      </p:sp>
+    </p:spTree>
+    <p:extLst>
+      <p:ext uri="{BB962C8B-B14F-4D97-AF65-F5344CB8AC3E}">
+        <p14:creationId xmlns:p14="http://schemas.microsoft.com/office/powerpoint/2010/main" val="2304623978"/>
+      </p:ext>
+    </p:extLst>
+  </p:cSld>
+  <p:clrMapOvr>
+    <a:masterClrMapping/>
+  </p:clrMapOvr>
+</p:notes>
+</file>
+
+<file path=ppt/notesSlides/notesSlide36.xml><?xml version="1.0" encoding="utf-8"?>
+<p:notes xmlns:a="http://schemas.openxmlformats.org/drawingml/2006/main" xmlns:r="http://schemas.openxmlformats.org/officeDocument/2006/relationships" xmlns:p="http://schemas.openxmlformats.org/presentationml/2006/main">
+  <p:cSld>
+    <p:spTree>
+      <p:nvGrpSpPr>
+        <p:cNvPr id="1" name=""/>
+        <p:cNvGrpSpPr/>
+        <p:nvPr/>
+      </p:nvGrpSpPr>
+      <p:grpSpPr>
+        <a:xfrm>
+          <a:off x="0" y="0"/>
+          <a:ext cx="0" cy="0"/>
+          <a:chOff x="0" y="0"/>
+          <a:chExt cx="0" cy="0"/>
+        </a:xfrm>
+      </p:grpSpPr>
+      <p:sp>
+        <p:nvSpPr>
+          <p:cNvPr id="2" name="Slide Image Placeholder 1"/>
+          <p:cNvSpPr>
+            <a:spLocks noGrp="1" noRot="1" noChangeAspect="1"/>
+          </p:cNvSpPr>
+          <p:nvPr>
+            <p:ph type="sldImg"/>
+          </p:nvPr>
+        </p:nvSpPr>
+        <p:spPr/>
+      </p:sp>
+      <p:sp>
+        <p:nvSpPr>
+          <p:cNvPr id="3" name="Notes Placeholder 2"/>
+          <p:cNvSpPr>
+            <a:spLocks noGrp="1"/>
+          </p:cNvSpPr>
+          <p:nvPr>
+            <p:ph type="body" idx="1"/>
+          </p:nvPr>
+        </p:nvSpPr>
+        <p:spPr/>
+        <p:txBody>
+          <a:bodyPr/>
+          <a:lstStyle/>
+          <a:p>
+            <a:endParaRPr lang="en-US"/>
+          </a:p>
+        </p:txBody>
+      </p:sp>
+      <p:sp>
+        <p:nvSpPr>
+          <p:cNvPr id="4" name="Slide Number Placeholder 3"/>
+          <p:cNvSpPr>
+            <a:spLocks noGrp="1"/>
+          </p:cNvSpPr>
+          <p:nvPr>
+            <p:ph type="sldNum" sz="quarter" idx="10"/>
+          </p:nvPr>
+        </p:nvSpPr>
+        <p:spPr/>
+        <p:txBody>
+          <a:bodyPr/>
+          <a:lstStyle/>
+          <a:p>
+            <a:fld id="{A02B9F3F-3042-489F-AF35-1A733968F079}" type="slidenum">
+              <a:rPr lang="en-US" smtClean="0"/>
+              <a:pPr/>
+              <a:t>37</a:t>
+            </a:fld>
+            <a:endParaRPr lang="en-US"/>
+          </a:p>
+        </p:txBody>
+      </p:sp>
+    </p:spTree>
+    <p:extLst>
+      <p:ext uri="{BB962C8B-B14F-4D97-AF65-F5344CB8AC3E}">
+        <p14:creationId xmlns:p14="http://schemas.microsoft.com/office/powerpoint/2010/main" val="1966336569"/>
+      </p:ext>
+    </p:extLst>
+  </p:cSld>
+  <p:clrMapOvr>
+    <a:masterClrMapping/>
+  </p:clrMapOvr>
+</p:notes>
+</file>
+
+<file path=ppt/notesSlides/notesSlide37.xml><?xml version="1.0" encoding="utf-8"?>
+<p:notes xmlns:a="http://schemas.openxmlformats.org/drawingml/2006/main" xmlns:r="http://schemas.openxmlformats.org/officeDocument/2006/relationships" xmlns:p="http://schemas.openxmlformats.org/presentationml/2006/main">
+  <p:cSld>
+    <p:spTree>
+      <p:nvGrpSpPr>
+        <p:cNvPr id="1" name=""/>
+        <p:cNvGrpSpPr/>
+        <p:nvPr/>
+      </p:nvGrpSpPr>
+      <p:grpSpPr>
+        <a:xfrm>
+          <a:off x="0" y="0"/>
+          <a:ext cx="0" cy="0"/>
+          <a:chOff x="0" y="0"/>
+          <a:chExt cx="0" cy="0"/>
+        </a:xfrm>
+      </p:grpSpPr>
+      <p:sp>
+        <p:nvSpPr>
+          <p:cNvPr id="7" name="Rectangle 7"/>
+          <p:cNvSpPr>
+            <a:spLocks noGrp="1" noChangeArrowheads="1"/>
+          </p:cNvSpPr>
+          <p:nvPr>
+            <p:ph type="sldNum" sz="quarter" idx="5"/>
+          </p:nvPr>
+        </p:nvSpPr>
+        <p:spPr>
+          <a:ln/>
+        </p:spPr>
+        <p:txBody>
+          <a:bodyPr/>
+          <a:lstStyle/>
+          <a:p>
+            <a:fld id="{AC4AE66D-7FFE-44CD-99A4-BAF99F9C97DC}" type="slidenum">
+              <a:rPr lang="en-US"/>
+              <a:pPr/>
+              <a:t>38</a:t>
+            </a:fld>
+            <a:endParaRPr lang="en-US"/>
+          </a:p>
+        </p:txBody>
+      </p:sp>
+      <p:sp>
+        <p:nvSpPr>
+          <p:cNvPr id="201730" name="Rectangle 2"/>
+          <p:cNvSpPr>
+            <a:spLocks noGrp="1" noRot="1" noChangeAspect="1" noChangeArrowheads="1" noTextEdit="1"/>
+          </p:cNvSpPr>
+          <p:nvPr>
+            <p:ph type="sldImg"/>
+          </p:nvPr>
+        </p:nvSpPr>
+        <p:spPr>
+          <a:ln/>
+        </p:spPr>
+      </p:sp>
+      <p:sp>
+        <p:nvSpPr>
+          <p:cNvPr id="201731" name="Rectangle 3"/>
+          <p:cNvSpPr>
+            <a:spLocks noGrp="1" noChangeArrowheads="1"/>
+          </p:cNvSpPr>
+          <p:nvPr>
+            <p:ph type="body" idx="1"/>
+          </p:nvPr>
+        </p:nvSpPr>
+        <p:spPr/>
+        <p:txBody>
+          <a:bodyPr/>
+          <a:lstStyle/>
+          <a:p>
+            <a:endParaRPr lang="en-US"/>
+          </a:p>
+        </p:txBody>
+      </p:sp>
+    </p:spTree>
+  </p:cSld>
+  <p:clrMapOvr>
+    <a:masterClrMapping/>
+  </p:clrMapOvr>
+</p:notes>
+</file>
+
+<file path=ppt/notesSlides/notesSlide38.xml><?xml version="1.0" encoding="utf-8"?>
+<p:notes xmlns:a="http://schemas.openxmlformats.org/drawingml/2006/main" xmlns:r="http://schemas.openxmlformats.org/officeDocument/2006/relationships" xmlns:p="http://schemas.openxmlformats.org/presentationml/2006/main">
+  <p:cSld>
+    <p:spTree>
+      <p:nvGrpSpPr>
+        <p:cNvPr id="1" name=""/>
+        <p:cNvGrpSpPr/>
+        <p:nvPr/>
+      </p:nvGrpSpPr>
+      <p:grpSpPr>
+        <a:xfrm>
+          <a:off x="0" y="0"/>
+          <a:ext cx="0" cy="0"/>
+          <a:chOff x="0" y="0"/>
+          <a:chExt cx="0" cy="0"/>
+        </a:xfrm>
+      </p:grpSpPr>
+      <p:sp>
+        <p:nvSpPr>
+          <p:cNvPr id="7" name="Rectangle 7"/>
+          <p:cNvSpPr>
+            <a:spLocks noGrp="1" noChangeArrowheads="1"/>
+          </p:cNvSpPr>
+          <p:nvPr>
+            <p:ph type="sldNum" sz="quarter" idx="5"/>
+          </p:nvPr>
+        </p:nvSpPr>
+        <p:spPr>
+          <a:ln/>
+        </p:spPr>
+        <p:txBody>
+          <a:bodyPr/>
+          <a:lstStyle/>
+          <a:p>
+            <a:fld id="{E2E94AE0-741A-4B43-B2AA-0D434C70A0E0}" type="slidenum">
+              <a:rPr lang="en-US"/>
+              <a:pPr/>
+              <a:t>39</a:t>
+            </a:fld>
+            <a:endParaRPr lang="en-US"/>
+          </a:p>
+        </p:txBody>
+      </p:sp>
+      <p:sp>
+        <p:nvSpPr>
+          <p:cNvPr id="687106" name="Rectangle 2"/>
+          <p:cNvSpPr>
+            <a:spLocks noGrp="1" noRot="1" noChangeAspect="1" noChangeArrowheads="1" noTextEdit="1"/>
+          </p:cNvSpPr>
+          <p:nvPr>
+            <p:ph type="sldImg"/>
+          </p:nvPr>
+        </p:nvSpPr>
+        <p:spPr>
+          <a:ln/>
+        </p:spPr>
+      </p:sp>
+      <p:sp>
+        <p:nvSpPr>
+          <p:cNvPr id="687107" name="Rectangle 3"/>
+          <p:cNvSpPr>
+            <a:spLocks noGrp="1" noChangeArrowheads="1"/>
+          </p:cNvSpPr>
+          <p:nvPr>
+            <p:ph type="body" idx="1"/>
+          </p:nvPr>
+        </p:nvSpPr>
+        <p:spPr/>
+        <p:txBody>
+          <a:bodyPr/>
+          <a:lstStyle/>
+          <a:p>
+            <a:endParaRPr lang="en-US"/>
+          </a:p>
+        </p:txBody>
+      </p:sp>
+    </p:spTree>
+  </p:cSld>
+  <p:clrMapOvr>
+    <a:masterClrMapping/>
+  </p:clrMapOvr>
+</p:notes>
+</file>
+
+<file path=ppt/notesSlides/notesSlide39.xml><?xml version="1.0" encoding="utf-8"?>
+<p:notes xmlns:a="http://schemas.openxmlformats.org/drawingml/2006/main" xmlns:r="http://schemas.openxmlformats.org/officeDocument/2006/relationships" xmlns:p="http://schemas.openxmlformats.org/presentationml/2006/main">
+  <p:cSld>
+    <p:spTree>
+      <p:nvGrpSpPr>
+        <p:cNvPr id="1" name=""/>
+        <p:cNvGrpSpPr/>
+        <p:nvPr/>
+      </p:nvGrpSpPr>
+      <p:grpSpPr>
+        <a:xfrm>
+          <a:off x="0" y="0"/>
+          <a:ext cx="0" cy="0"/>
+          <a:chOff x="0" y="0"/>
+          <a:chExt cx="0" cy="0"/>
+        </a:xfrm>
+      </p:grpSpPr>
+      <p:sp>
+        <p:nvSpPr>
+          <p:cNvPr id="7" name="Rectangle 7"/>
+          <p:cNvSpPr>
+            <a:spLocks noGrp="1" noChangeArrowheads="1"/>
+          </p:cNvSpPr>
+          <p:nvPr>
+            <p:ph type="sldNum" sz="quarter" idx="5"/>
+          </p:nvPr>
+        </p:nvSpPr>
+        <p:spPr>
+          <a:ln/>
+        </p:spPr>
+        <p:txBody>
+          <a:bodyPr/>
+          <a:lstStyle/>
+          <a:p>
+            <a:fld id="{E2E94AE0-741A-4B43-B2AA-0D434C70A0E0}" type="slidenum">
+              <a:rPr lang="en-US"/>
+              <a:pPr/>
+              <a:t>40</a:t>
+            </a:fld>
+            <a:endParaRPr lang="en-US"/>
+          </a:p>
+        </p:txBody>
+      </p:sp>
+      <p:sp>
+        <p:nvSpPr>
+          <p:cNvPr id="687106" name="Rectangle 2"/>
+          <p:cNvSpPr>
+            <a:spLocks noGrp="1" noRot="1" noChangeAspect="1" noChangeArrowheads="1" noTextEdit="1"/>
+          </p:cNvSpPr>
+          <p:nvPr>
+            <p:ph type="sldImg"/>
+          </p:nvPr>
+        </p:nvSpPr>
+        <p:spPr>
+          <a:ln/>
+        </p:spPr>
+      </p:sp>
+      <p:sp>
+        <p:nvSpPr>
+          <p:cNvPr id="687107" name="Rectangle 3"/>
           <p:cNvSpPr>
             <a:spLocks noGrp="1" noChangeArrowheads="1"/>
           </p:cNvSpPr>
@@ -3122,6 +3725,848 @@
 </p:notes>
 </file>
 
+<file path=ppt/notesSlides/notesSlide40.xml><?xml version="1.0" encoding="utf-8"?>
+<p:notes xmlns:a="http://schemas.openxmlformats.org/drawingml/2006/main" xmlns:r="http://schemas.openxmlformats.org/officeDocument/2006/relationships" xmlns:p="http://schemas.openxmlformats.org/presentationml/2006/main">
+  <p:cSld>
+    <p:spTree>
+      <p:nvGrpSpPr>
+        <p:cNvPr id="1" name=""/>
+        <p:cNvGrpSpPr/>
+        <p:nvPr/>
+      </p:nvGrpSpPr>
+      <p:grpSpPr>
+        <a:xfrm>
+          <a:off x="0" y="0"/>
+          <a:ext cx="0" cy="0"/>
+          <a:chOff x="0" y="0"/>
+          <a:chExt cx="0" cy="0"/>
+        </a:xfrm>
+      </p:grpSpPr>
+      <p:sp>
+        <p:nvSpPr>
+          <p:cNvPr id="7" name="Rectangle 7"/>
+          <p:cNvSpPr>
+            <a:spLocks noGrp="1" noChangeArrowheads="1"/>
+          </p:cNvSpPr>
+          <p:nvPr>
+            <p:ph type="sldNum" sz="quarter" idx="5"/>
+          </p:nvPr>
+        </p:nvSpPr>
+        <p:spPr>
+          <a:ln/>
+        </p:spPr>
+        <p:txBody>
+          <a:bodyPr/>
+          <a:lstStyle/>
+          <a:p>
+            <a:fld id="{E2E94AE0-741A-4B43-B2AA-0D434C70A0E0}" type="slidenum">
+              <a:rPr lang="en-US"/>
+              <a:pPr/>
+              <a:t>41</a:t>
+            </a:fld>
+            <a:endParaRPr lang="en-US"/>
+          </a:p>
+        </p:txBody>
+      </p:sp>
+      <p:sp>
+        <p:nvSpPr>
+          <p:cNvPr id="687106" name="Rectangle 2"/>
+          <p:cNvSpPr>
+            <a:spLocks noGrp="1" noRot="1" noChangeAspect="1" noChangeArrowheads="1" noTextEdit="1"/>
+          </p:cNvSpPr>
+          <p:nvPr>
+            <p:ph type="sldImg"/>
+          </p:nvPr>
+        </p:nvSpPr>
+        <p:spPr>
+          <a:ln/>
+        </p:spPr>
+      </p:sp>
+      <p:sp>
+        <p:nvSpPr>
+          <p:cNvPr id="687107" name="Rectangle 3"/>
+          <p:cNvSpPr>
+            <a:spLocks noGrp="1" noChangeArrowheads="1"/>
+          </p:cNvSpPr>
+          <p:nvPr>
+            <p:ph type="body" idx="1"/>
+          </p:nvPr>
+        </p:nvSpPr>
+        <p:spPr/>
+        <p:txBody>
+          <a:bodyPr/>
+          <a:lstStyle/>
+          <a:p>
+            <a:endParaRPr lang="en-US"/>
+          </a:p>
+        </p:txBody>
+      </p:sp>
+    </p:spTree>
+  </p:cSld>
+  <p:clrMapOvr>
+    <a:masterClrMapping/>
+  </p:clrMapOvr>
+</p:notes>
+</file>
+
+<file path=ppt/notesSlides/notesSlide41.xml><?xml version="1.0" encoding="utf-8"?>
+<p:notes xmlns:a="http://schemas.openxmlformats.org/drawingml/2006/main" xmlns:r="http://schemas.openxmlformats.org/officeDocument/2006/relationships" xmlns:p="http://schemas.openxmlformats.org/presentationml/2006/main">
+  <p:cSld>
+    <p:spTree>
+      <p:nvGrpSpPr>
+        <p:cNvPr id="1" name=""/>
+        <p:cNvGrpSpPr/>
+        <p:nvPr/>
+      </p:nvGrpSpPr>
+      <p:grpSpPr>
+        <a:xfrm>
+          <a:off x="0" y="0"/>
+          <a:ext cx="0" cy="0"/>
+          <a:chOff x="0" y="0"/>
+          <a:chExt cx="0" cy="0"/>
+        </a:xfrm>
+      </p:grpSpPr>
+      <p:sp>
+        <p:nvSpPr>
+          <p:cNvPr id="2" name="Slide Image Placeholder 1"/>
+          <p:cNvSpPr>
+            <a:spLocks noGrp="1" noRot="1" noChangeAspect="1"/>
+          </p:cNvSpPr>
+          <p:nvPr>
+            <p:ph type="sldImg"/>
+          </p:nvPr>
+        </p:nvSpPr>
+        <p:spPr/>
+      </p:sp>
+      <p:sp>
+        <p:nvSpPr>
+          <p:cNvPr id="3" name="Notes Placeholder 2"/>
+          <p:cNvSpPr>
+            <a:spLocks noGrp="1"/>
+          </p:cNvSpPr>
+          <p:nvPr>
+            <p:ph type="body" idx="1"/>
+          </p:nvPr>
+        </p:nvSpPr>
+        <p:spPr/>
+        <p:txBody>
+          <a:bodyPr/>
+          <a:lstStyle/>
+          <a:p>
+            <a:endParaRPr lang="en-US"/>
+          </a:p>
+        </p:txBody>
+      </p:sp>
+      <p:sp>
+        <p:nvSpPr>
+          <p:cNvPr id="4" name="Slide Number Placeholder 3"/>
+          <p:cNvSpPr>
+            <a:spLocks noGrp="1"/>
+          </p:cNvSpPr>
+          <p:nvPr>
+            <p:ph type="sldNum" sz="quarter" idx="10"/>
+          </p:nvPr>
+        </p:nvSpPr>
+        <p:spPr/>
+        <p:txBody>
+          <a:bodyPr/>
+          <a:lstStyle/>
+          <a:p>
+            <a:fld id="{A02B9F3F-3042-489F-AF35-1A733968F079}" type="slidenum">
+              <a:rPr lang="en-US" smtClean="0"/>
+              <a:pPr/>
+              <a:t>42</a:t>
+            </a:fld>
+            <a:endParaRPr lang="en-US"/>
+          </a:p>
+        </p:txBody>
+      </p:sp>
+    </p:spTree>
+    <p:extLst>
+      <p:ext uri="{BB962C8B-B14F-4D97-AF65-F5344CB8AC3E}">
+        <p14:creationId xmlns:p14="http://schemas.microsoft.com/office/powerpoint/2010/main" val="1709272095"/>
+      </p:ext>
+    </p:extLst>
+  </p:cSld>
+  <p:clrMapOvr>
+    <a:masterClrMapping/>
+  </p:clrMapOvr>
+</p:notes>
+</file>
+
+<file path=ppt/notesSlides/notesSlide42.xml><?xml version="1.0" encoding="utf-8"?>
+<p:notes xmlns:a="http://schemas.openxmlformats.org/drawingml/2006/main" xmlns:r="http://schemas.openxmlformats.org/officeDocument/2006/relationships" xmlns:p="http://schemas.openxmlformats.org/presentationml/2006/main">
+  <p:cSld>
+    <p:spTree>
+      <p:nvGrpSpPr>
+        <p:cNvPr id="1" name=""/>
+        <p:cNvGrpSpPr/>
+        <p:nvPr/>
+      </p:nvGrpSpPr>
+      <p:grpSpPr>
+        <a:xfrm>
+          <a:off x="0" y="0"/>
+          <a:ext cx="0" cy="0"/>
+          <a:chOff x="0" y="0"/>
+          <a:chExt cx="0" cy="0"/>
+        </a:xfrm>
+      </p:grpSpPr>
+      <p:sp>
+        <p:nvSpPr>
+          <p:cNvPr id="7" name="Rectangle 7"/>
+          <p:cNvSpPr>
+            <a:spLocks noGrp="1" noChangeArrowheads="1"/>
+          </p:cNvSpPr>
+          <p:nvPr>
+            <p:ph type="sldNum" sz="quarter" idx="5"/>
+          </p:nvPr>
+        </p:nvSpPr>
+        <p:spPr>
+          <a:ln/>
+        </p:spPr>
+        <p:txBody>
+          <a:bodyPr/>
+          <a:lstStyle/>
+          <a:p>
+            <a:fld id="{E2E94AE0-741A-4B43-B2AA-0D434C70A0E0}" type="slidenum">
+              <a:rPr lang="en-US"/>
+              <a:pPr/>
+              <a:t>43</a:t>
+            </a:fld>
+            <a:endParaRPr lang="en-US"/>
+          </a:p>
+        </p:txBody>
+      </p:sp>
+      <p:sp>
+        <p:nvSpPr>
+          <p:cNvPr id="687106" name="Rectangle 2"/>
+          <p:cNvSpPr>
+            <a:spLocks noGrp="1" noRot="1" noChangeAspect="1" noChangeArrowheads="1" noTextEdit="1"/>
+          </p:cNvSpPr>
+          <p:nvPr>
+            <p:ph type="sldImg"/>
+          </p:nvPr>
+        </p:nvSpPr>
+        <p:spPr>
+          <a:ln/>
+        </p:spPr>
+      </p:sp>
+      <p:sp>
+        <p:nvSpPr>
+          <p:cNvPr id="687107" name="Rectangle 3"/>
+          <p:cNvSpPr>
+            <a:spLocks noGrp="1" noChangeArrowheads="1"/>
+          </p:cNvSpPr>
+          <p:nvPr>
+            <p:ph type="body" idx="1"/>
+          </p:nvPr>
+        </p:nvSpPr>
+        <p:spPr/>
+        <p:txBody>
+          <a:bodyPr/>
+          <a:lstStyle/>
+          <a:p>
+            <a:endParaRPr lang="en-US"/>
+          </a:p>
+        </p:txBody>
+      </p:sp>
+    </p:spTree>
+  </p:cSld>
+  <p:clrMapOvr>
+    <a:masterClrMapping/>
+  </p:clrMapOvr>
+</p:notes>
+</file>
+
+<file path=ppt/notesSlides/notesSlide43.xml><?xml version="1.0" encoding="utf-8"?>
+<p:notes xmlns:a="http://schemas.openxmlformats.org/drawingml/2006/main" xmlns:r="http://schemas.openxmlformats.org/officeDocument/2006/relationships" xmlns:p="http://schemas.openxmlformats.org/presentationml/2006/main">
+  <p:cSld>
+    <p:spTree>
+      <p:nvGrpSpPr>
+        <p:cNvPr id="1" name=""/>
+        <p:cNvGrpSpPr/>
+        <p:nvPr/>
+      </p:nvGrpSpPr>
+      <p:grpSpPr>
+        <a:xfrm>
+          <a:off x="0" y="0"/>
+          <a:ext cx="0" cy="0"/>
+          <a:chOff x="0" y="0"/>
+          <a:chExt cx="0" cy="0"/>
+        </a:xfrm>
+      </p:grpSpPr>
+      <p:sp>
+        <p:nvSpPr>
+          <p:cNvPr id="7" name="Rectangle 7"/>
+          <p:cNvSpPr>
+            <a:spLocks noGrp="1" noChangeArrowheads="1"/>
+          </p:cNvSpPr>
+          <p:nvPr>
+            <p:ph type="sldNum" sz="quarter" idx="5"/>
+          </p:nvPr>
+        </p:nvSpPr>
+        <p:spPr>
+          <a:ln/>
+        </p:spPr>
+        <p:txBody>
+          <a:bodyPr/>
+          <a:lstStyle/>
+          <a:p>
+            <a:fld id="{AC4AE66D-7FFE-44CD-99A4-BAF99F9C97DC}" type="slidenum">
+              <a:rPr lang="en-US"/>
+              <a:pPr/>
+              <a:t>46</a:t>
+            </a:fld>
+            <a:endParaRPr lang="en-US"/>
+          </a:p>
+        </p:txBody>
+      </p:sp>
+      <p:sp>
+        <p:nvSpPr>
+          <p:cNvPr id="201730" name="Rectangle 2"/>
+          <p:cNvSpPr>
+            <a:spLocks noGrp="1" noRot="1" noChangeAspect="1" noChangeArrowheads="1" noTextEdit="1"/>
+          </p:cNvSpPr>
+          <p:nvPr>
+            <p:ph type="sldImg"/>
+          </p:nvPr>
+        </p:nvSpPr>
+        <p:spPr>
+          <a:ln/>
+        </p:spPr>
+      </p:sp>
+      <p:sp>
+        <p:nvSpPr>
+          <p:cNvPr id="201731" name="Rectangle 3"/>
+          <p:cNvSpPr>
+            <a:spLocks noGrp="1" noChangeArrowheads="1"/>
+          </p:cNvSpPr>
+          <p:nvPr>
+            <p:ph type="body" idx="1"/>
+          </p:nvPr>
+        </p:nvSpPr>
+        <p:spPr/>
+        <p:txBody>
+          <a:bodyPr/>
+          <a:lstStyle/>
+          <a:p>
+            <a:endParaRPr lang="en-US"/>
+          </a:p>
+        </p:txBody>
+      </p:sp>
+    </p:spTree>
+  </p:cSld>
+  <p:clrMapOvr>
+    <a:masterClrMapping/>
+  </p:clrMapOvr>
+</p:notes>
+</file>
+
+<file path=ppt/notesSlides/notesSlide44.xml><?xml version="1.0" encoding="utf-8"?>
+<p:notes xmlns:a="http://schemas.openxmlformats.org/drawingml/2006/main" xmlns:r="http://schemas.openxmlformats.org/officeDocument/2006/relationships" xmlns:p="http://schemas.openxmlformats.org/presentationml/2006/main">
+  <p:cSld>
+    <p:spTree>
+      <p:nvGrpSpPr>
+        <p:cNvPr id="1" name=""/>
+        <p:cNvGrpSpPr/>
+        <p:nvPr/>
+      </p:nvGrpSpPr>
+      <p:grpSpPr>
+        <a:xfrm>
+          <a:off x="0" y="0"/>
+          <a:ext cx="0" cy="0"/>
+          <a:chOff x="0" y="0"/>
+          <a:chExt cx="0" cy="0"/>
+        </a:xfrm>
+      </p:grpSpPr>
+      <p:sp>
+        <p:nvSpPr>
+          <p:cNvPr id="7" name="Rectangle 7"/>
+          <p:cNvSpPr>
+            <a:spLocks noGrp="1" noChangeArrowheads="1"/>
+          </p:cNvSpPr>
+          <p:nvPr>
+            <p:ph type="sldNum" sz="quarter" idx="5"/>
+          </p:nvPr>
+        </p:nvSpPr>
+        <p:spPr>
+          <a:ln/>
+        </p:spPr>
+        <p:txBody>
+          <a:bodyPr/>
+          <a:lstStyle/>
+          <a:p>
+            <a:fld id="{0A3D9CB9-3A48-4BB0-A01C-8270696DC00B}" type="slidenum">
+              <a:rPr lang="en-US"/>
+              <a:pPr/>
+              <a:t>47</a:t>
+            </a:fld>
+            <a:endParaRPr lang="en-US"/>
+          </a:p>
+        </p:txBody>
+      </p:sp>
+      <p:sp>
+        <p:nvSpPr>
+          <p:cNvPr id="206850" name="Rectangle 2"/>
+          <p:cNvSpPr>
+            <a:spLocks noGrp="1" noRot="1" noChangeAspect="1" noChangeArrowheads="1" noTextEdit="1"/>
+          </p:cNvSpPr>
+          <p:nvPr>
+            <p:ph type="sldImg"/>
+          </p:nvPr>
+        </p:nvSpPr>
+        <p:spPr>
+          <a:ln/>
+        </p:spPr>
+      </p:sp>
+      <p:sp>
+        <p:nvSpPr>
+          <p:cNvPr id="206851" name="Rectangle 3"/>
+          <p:cNvSpPr>
+            <a:spLocks noGrp="1" noChangeArrowheads="1"/>
+          </p:cNvSpPr>
+          <p:nvPr>
+            <p:ph type="body" idx="1"/>
+          </p:nvPr>
+        </p:nvSpPr>
+        <p:spPr/>
+        <p:txBody>
+          <a:bodyPr/>
+          <a:lstStyle/>
+          <a:p>
+            <a:endParaRPr lang="en-US"/>
+          </a:p>
+        </p:txBody>
+      </p:sp>
+    </p:spTree>
+  </p:cSld>
+  <p:clrMapOvr>
+    <a:masterClrMapping/>
+  </p:clrMapOvr>
+</p:notes>
+</file>
+
+<file path=ppt/notesSlides/notesSlide45.xml><?xml version="1.0" encoding="utf-8"?>
+<p:notes xmlns:a="http://schemas.openxmlformats.org/drawingml/2006/main" xmlns:r="http://schemas.openxmlformats.org/officeDocument/2006/relationships" xmlns:p="http://schemas.openxmlformats.org/presentationml/2006/main">
+  <p:cSld>
+    <p:spTree>
+      <p:nvGrpSpPr>
+        <p:cNvPr id="1" name=""/>
+        <p:cNvGrpSpPr/>
+        <p:nvPr/>
+      </p:nvGrpSpPr>
+      <p:grpSpPr>
+        <a:xfrm>
+          <a:off x="0" y="0"/>
+          <a:ext cx="0" cy="0"/>
+          <a:chOff x="0" y="0"/>
+          <a:chExt cx="0" cy="0"/>
+        </a:xfrm>
+      </p:grpSpPr>
+      <p:sp>
+        <p:nvSpPr>
+          <p:cNvPr id="7" name="Rectangle 7"/>
+          <p:cNvSpPr>
+            <a:spLocks noGrp="1" noChangeArrowheads="1"/>
+          </p:cNvSpPr>
+          <p:nvPr>
+            <p:ph type="sldNum" sz="quarter" idx="5"/>
+          </p:nvPr>
+        </p:nvSpPr>
+        <p:spPr>
+          <a:ln/>
+        </p:spPr>
+        <p:txBody>
+          <a:bodyPr/>
+          <a:lstStyle/>
+          <a:p>
+            <a:fld id="{0A3D9CB9-3A48-4BB0-A01C-8270696DC00B}" type="slidenum">
+              <a:rPr lang="en-US"/>
+              <a:pPr/>
+              <a:t>48</a:t>
+            </a:fld>
+            <a:endParaRPr lang="en-US"/>
+          </a:p>
+        </p:txBody>
+      </p:sp>
+      <p:sp>
+        <p:nvSpPr>
+          <p:cNvPr id="206850" name="Rectangle 2"/>
+          <p:cNvSpPr>
+            <a:spLocks noGrp="1" noRot="1" noChangeAspect="1" noChangeArrowheads="1" noTextEdit="1"/>
+          </p:cNvSpPr>
+          <p:nvPr>
+            <p:ph type="sldImg"/>
+          </p:nvPr>
+        </p:nvSpPr>
+        <p:spPr>
+          <a:ln/>
+        </p:spPr>
+      </p:sp>
+      <p:sp>
+        <p:nvSpPr>
+          <p:cNvPr id="206851" name="Rectangle 3"/>
+          <p:cNvSpPr>
+            <a:spLocks noGrp="1" noChangeArrowheads="1"/>
+          </p:cNvSpPr>
+          <p:nvPr>
+            <p:ph type="body" idx="1"/>
+          </p:nvPr>
+        </p:nvSpPr>
+        <p:spPr/>
+        <p:txBody>
+          <a:bodyPr/>
+          <a:lstStyle/>
+          <a:p>
+            <a:endParaRPr lang="en-US"/>
+          </a:p>
+        </p:txBody>
+      </p:sp>
+    </p:spTree>
+  </p:cSld>
+  <p:clrMapOvr>
+    <a:masterClrMapping/>
+  </p:clrMapOvr>
+</p:notes>
+</file>
+
+<file path=ppt/notesSlides/notesSlide46.xml><?xml version="1.0" encoding="utf-8"?>
+<p:notes xmlns:a="http://schemas.openxmlformats.org/drawingml/2006/main" xmlns:r="http://schemas.openxmlformats.org/officeDocument/2006/relationships" xmlns:p="http://schemas.openxmlformats.org/presentationml/2006/main">
+  <p:cSld>
+    <p:spTree>
+      <p:nvGrpSpPr>
+        <p:cNvPr id="1" name=""/>
+        <p:cNvGrpSpPr/>
+        <p:nvPr/>
+      </p:nvGrpSpPr>
+      <p:grpSpPr>
+        <a:xfrm>
+          <a:off x="0" y="0"/>
+          <a:ext cx="0" cy="0"/>
+          <a:chOff x="0" y="0"/>
+          <a:chExt cx="0" cy="0"/>
+        </a:xfrm>
+      </p:grpSpPr>
+      <p:sp>
+        <p:nvSpPr>
+          <p:cNvPr id="7" name="Rectangle 7"/>
+          <p:cNvSpPr>
+            <a:spLocks noGrp="1" noChangeArrowheads="1"/>
+          </p:cNvSpPr>
+          <p:nvPr>
+            <p:ph type="sldNum" sz="quarter" idx="5"/>
+          </p:nvPr>
+        </p:nvSpPr>
+        <p:spPr>
+          <a:ln/>
+        </p:spPr>
+        <p:txBody>
+          <a:bodyPr/>
+          <a:lstStyle/>
+          <a:p>
+            <a:fld id="{0A3D9CB9-3A48-4BB0-A01C-8270696DC00B}" type="slidenum">
+              <a:rPr lang="en-US"/>
+              <a:pPr/>
+              <a:t>49</a:t>
+            </a:fld>
+            <a:endParaRPr lang="en-US"/>
+          </a:p>
+        </p:txBody>
+      </p:sp>
+      <p:sp>
+        <p:nvSpPr>
+          <p:cNvPr id="206850" name="Rectangle 2"/>
+          <p:cNvSpPr>
+            <a:spLocks noGrp="1" noRot="1" noChangeAspect="1" noChangeArrowheads="1" noTextEdit="1"/>
+          </p:cNvSpPr>
+          <p:nvPr>
+            <p:ph type="sldImg"/>
+          </p:nvPr>
+        </p:nvSpPr>
+        <p:spPr>
+          <a:ln/>
+        </p:spPr>
+      </p:sp>
+      <p:sp>
+        <p:nvSpPr>
+          <p:cNvPr id="206851" name="Rectangle 3"/>
+          <p:cNvSpPr>
+            <a:spLocks noGrp="1" noChangeArrowheads="1"/>
+          </p:cNvSpPr>
+          <p:nvPr>
+            <p:ph type="body" idx="1"/>
+          </p:nvPr>
+        </p:nvSpPr>
+        <p:spPr/>
+        <p:txBody>
+          <a:bodyPr/>
+          <a:lstStyle/>
+          <a:p>
+            <a:endParaRPr lang="en-US"/>
+          </a:p>
+        </p:txBody>
+      </p:sp>
+    </p:spTree>
+  </p:cSld>
+  <p:clrMapOvr>
+    <a:masterClrMapping/>
+  </p:clrMapOvr>
+</p:notes>
+</file>
+
+<file path=ppt/notesSlides/notesSlide47.xml><?xml version="1.0" encoding="utf-8"?>
+<p:notes xmlns:a="http://schemas.openxmlformats.org/drawingml/2006/main" xmlns:r="http://schemas.openxmlformats.org/officeDocument/2006/relationships" xmlns:p="http://schemas.openxmlformats.org/presentationml/2006/main">
+  <p:cSld>
+    <p:spTree>
+      <p:nvGrpSpPr>
+        <p:cNvPr id="1" name=""/>
+        <p:cNvGrpSpPr/>
+        <p:nvPr/>
+      </p:nvGrpSpPr>
+      <p:grpSpPr>
+        <a:xfrm>
+          <a:off x="0" y="0"/>
+          <a:ext cx="0" cy="0"/>
+          <a:chOff x="0" y="0"/>
+          <a:chExt cx="0" cy="0"/>
+        </a:xfrm>
+      </p:grpSpPr>
+      <p:sp>
+        <p:nvSpPr>
+          <p:cNvPr id="2" name="Slide Image Placeholder 1"/>
+          <p:cNvSpPr>
+            <a:spLocks noGrp="1" noRot="1" noChangeAspect="1"/>
+          </p:cNvSpPr>
+          <p:nvPr>
+            <p:ph type="sldImg"/>
+          </p:nvPr>
+        </p:nvSpPr>
+        <p:spPr/>
+      </p:sp>
+      <p:sp>
+        <p:nvSpPr>
+          <p:cNvPr id="3" name="Notes Placeholder 2"/>
+          <p:cNvSpPr>
+            <a:spLocks noGrp="1"/>
+          </p:cNvSpPr>
+          <p:nvPr>
+            <p:ph type="body" idx="1"/>
+          </p:nvPr>
+        </p:nvSpPr>
+        <p:spPr/>
+        <p:txBody>
+          <a:bodyPr/>
+          <a:lstStyle/>
+          <a:p>
+            <a:endParaRPr lang="en-US"/>
+          </a:p>
+        </p:txBody>
+      </p:sp>
+      <p:sp>
+        <p:nvSpPr>
+          <p:cNvPr id="4" name="Slide Number Placeholder 3"/>
+          <p:cNvSpPr>
+            <a:spLocks noGrp="1"/>
+          </p:cNvSpPr>
+          <p:nvPr>
+            <p:ph type="sldNum" sz="quarter" idx="10"/>
+          </p:nvPr>
+        </p:nvSpPr>
+        <p:spPr/>
+        <p:txBody>
+          <a:bodyPr/>
+          <a:lstStyle/>
+          <a:p>
+            <a:fld id="{A02B9F3F-3042-489F-AF35-1A733968F079}" type="slidenum">
+              <a:rPr lang="en-US" smtClean="0"/>
+              <a:pPr/>
+              <a:t>50</a:t>
+            </a:fld>
+            <a:endParaRPr lang="en-US"/>
+          </a:p>
+        </p:txBody>
+      </p:sp>
+    </p:spTree>
+    <p:extLst>
+      <p:ext uri="{BB962C8B-B14F-4D97-AF65-F5344CB8AC3E}">
+        <p14:creationId xmlns:p14="http://schemas.microsoft.com/office/powerpoint/2010/main" val="2431483368"/>
+      </p:ext>
+    </p:extLst>
+  </p:cSld>
+  <p:clrMapOvr>
+    <a:masterClrMapping/>
+  </p:clrMapOvr>
+</p:notes>
+</file>
+
+<file path=ppt/notesSlides/notesSlide48.xml><?xml version="1.0" encoding="utf-8"?>
+<p:notes xmlns:a="http://schemas.openxmlformats.org/drawingml/2006/main" xmlns:r="http://schemas.openxmlformats.org/officeDocument/2006/relationships" xmlns:p="http://schemas.openxmlformats.org/presentationml/2006/main">
+  <p:cSld>
+    <p:spTree>
+      <p:nvGrpSpPr>
+        <p:cNvPr id="1" name=""/>
+        <p:cNvGrpSpPr/>
+        <p:nvPr/>
+      </p:nvGrpSpPr>
+      <p:grpSpPr>
+        <a:xfrm>
+          <a:off x="0" y="0"/>
+          <a:ext cx="0" cy="0"/>
+          <a:chOff x="0" y="0"/>
+          <a:chExt cx="0" cy="0"/>
+        </a:xfrm>
+      </p:grpSpPr>
+      <p:sp>
+        <p:nvSpPr>
+          <p:cNvPr id="7" name="Rectangle 7"/>
+          <p:cNvSpPr>
+            <a:spLocks noGrp="1" noChangeArrowheads="1"/>
+          </p:cNvSpPr>
+          <p:nvPr>
+            <p:ph type="sldNum" sz="quarter" idx="5"/>
+          </p:nvPr>
+        </p:nvSpPr>
+        <p:spPr>
+          <a:ln/>
+        </p:spPr>
+        <p:txBody>
+          <a:bodyPr/>
+          <a:lstStyle/>
+          <a:p>
+            <a:fld id="{0A3D9CB9-3A48-4BB0-A01C-8270696DC00B}" type="slidenum">
+              <a:rPr lang="en-US"/>
+              <a:pPr/>
+              <a:t>51</a:t>
+            </a:fld>
+            <a:endParaRPr lang="en-US"/>
+          </a:p>
+        </p:txBody>
+      </p:sp>
+      <p:sp>
+        <p:nvSpPr>
+          <p:cNvPr id="206850" name="Rectangle 2"/>
+          <p:cNvSpPr>
+            <a:spLocks noGrp="1" noRot="1" noChangeAspect="1" noChangeArrowheads="1" noTextEdit="1"/>
+          </p:cNvSpPr>
+          <p:nvPr>
+            <p:ph type="sldImg"/>
+          </p:nvPr>
+        </p:nvSpPr>
+        <p:spPr>
+          <a:ln/>
+        </p:spPr>
+      </p:sp>
+      <p:sp>
+        <p:nvSpPr>
+          <p:cNvPr id="206851" name="Rectangle 3"/>
+          <p:cNvSpPr>
+            <a:spLocks noGrp="1" noChangeArrowheads="1"/>
+          </p:cNvSpPr>
+          <p:nvPr>
+            <p:ph type="body" idx="1"/>
+          </p:nvPr>
+        </p:nvSpPr>
+        <p:spPr/>
+        <p:txBody>
+          <a:bodyPr/>
+          <a:lstStyle/>
+          <a:p>
+            <a:endParaRPr lang="en-US"/>
+          </a:p>
+        </p:txBody>
+      </p:sp>
+    </p:spTree>
+  </p:cSld>
+  <p:clrMapOvr>
+    <a:masterClrMapping/>
+  </p:clrMapOvr>
+</p:notes>
+</file>
+
+<file path=ppt/notesSlides/notesSlide49.xml><?xml version="1.0" encoding="utf-8"?>
+<p:notes xmlns:a="http://schemas.openxmlformats.org/drawingml/2006/main" xmlns:r="http://schemas.openxmlformats.org/officeDocument/2006/relationships" xmlns:p="http://schemas.openxmlformats.org/presentationml/2006/main">
+  <p:cSld>
+    <p:spTree>
+      <p:nvGrpSpPr>
+        <p:cNvPr id="1" name=""/>
+        <p:cNvGrpSpPr/>
+        <p:nvPr/>
+      </p:nvGrpSpPr>
+      <p:grpSpPr>
+        <a:xfrm>
+          <a:off x="0" y="0"/>
+          <a:ext cx="0" cy="0"/>
+          <a:chOff x="0" y="0"/>
+          <a:chExt cx="0" cy="0"/>
+        </a:xfrm>
+      </p:grpSpPr>
+      <p:sp>
+        <p:nvSpPr>
+          <p:cNvPr id="7" name="Rectangle 7"/>
+          <p:cNvSpPr>
+            <a:spLocks noGrp="1" noChangeArrowheads="1"/>
+          </p:cNvSpPr>
+          <p:nvPr>
+            <p:ph type="sldNum" sz="quarter" idx="5"/>
+          </p:nvPr>
+        </p:nvSpPr>
+        <p:spPr>
+          <a:ln/>
+        </p:spPr>
+        <p:txBody>
+          <a:bodyPr/>
+          <a:lstStyle/>
+          <a:p>
+            <a:fld id="{0A3D9CB9-3A48-4BB0-A01C-8270696DC00B}" type="slidenum">
+              <a:rPr lang="en-US"/>
+              <a:pPr/>
+              <a:t>52</a:t>
+            </a:fld>
+            <a:endParaRPr lang="en-US"/>
+          </a:p>
+        </p:txBody>
+      </p:sp>
+      <p:sp>
+        <p:nvSpPr>
+          <p:cNvPr id="206850" name="Rectangle 2"/>
+          <p:cNvSpPr>
+            <a:spLocks noGrp="1" noRot="1" noChangeAspect="1" noChangeArrowheads="1" noTextEdit="1"/>
+          </p:cNvSpPr>
+          <p:nvPr>
+            <p:ph type="sldImg"/>
+          </p:nvPr>
+        </p:nvSpPr>
+        <p:spPr>
+          <a:ln/>
+        </p:spPr>
+      </p:sp>
+      <p:sp>
+        <p:nvSpPr>
+          <p:cNvPr id="206851" name="Rectangle 3"/>
+          <p:cNvSpPr>
+            <a:spLocks noGrp="1" noChangeArrowheads="1"/>
+          </p:cNvSpPr>
+          <p:nvPr>
+            <p:ph type="body" idx="1"/>
+          </p:nvPr>
+        </p:nvSpPr>
+        <p:spPr/>
+        <p:txBody>
+          <a:bodyPr/>
+          <a:lstStyle/>
+          <a:p>
+            <a:endParaRPr lang="en-US"/>
+          </a:p>
+        </p:txBody>
+      </p:sp>
+    </p:spTree>
+  </p:cSld>
+  <p:clrMapOvr>
+    <a:masterClrMapping/>
+  </p:clrMapOvr>
+</p:notes>
+</file>
+
 <file path=ppt/notesSlides/notesSlide5.xml><?xml version="1.0" encoding="utf-8"?>
 <p:notes xmlns:a="http://schemas.openxmlformats.org/drawingml/2006/main" xmlns:r="http://schemas.openxmlformats.org/officeDocument/2006/relationships" xmlns:p="http://schemas.openxmlformats.org/presentationml/2006/main">
   <p:cSld>
@@ -3141,6 +4586,91 @@
       </p:grpSpPr>
       <p:sp>
         <p:nvSpPr>
+          <p:cNvPr id="2" name="Slide Image Placeholder 1"/>
+          <p:cNvSpPr>
+            <a:spLocks noGrp="1" noRot="1" noChangeAspect="1"/>
+          </p:cNvSpPr>
+          <p:nvPr>
+            <p:ph type="sldImg"/>
+          </p:nvPr>
+        </p:nvSpPr>
+        <p:spPr/>
+      </p:sp>
+      <p:sp>
+        <p:nvSpPr>
+          <p:cNvPr id="3" name="Notes Placeholder 2"/>
+          <p:cNvSpPr>
+            <a:spLocks noGrp="1"/>
+          </p:cNvSpPr>
+          <p:nvPr>
+            <p:ph type="body" idx="1"/>
+          </p:nvPr>
+        </p:nvSpPr>
+        <p:spPr/>
+        <p:txBody>
+          <a:bodyPr/>
+          <a:lstStyle/>
+          <a:p>
+            <a:endParaRPr lang="en-US"/>
+          </a:p>
+        </p:txBody>
+      </p:sp>
+      <p:sp>
+        <p:nvSpPr>
+          <p:cNvPr id="4" name="Slide Number Placeholder 3"/>
+          <p:cNvSpPr>
+            <a:spLocks noGrp="1"/>
+          </p:cNvSpPr>
+          <p:nvPr>
+            <p:ph type="sldNum" sz="quarter" idx="10"/>
+          </p:nvPr>
+        </p:nvSpPr>
+        <p:spPr/>
+        <p:txBody>
+          <a:bodyPr/>
+          <a:lstStyle/>
+          <a:p>
+            <a:fld id="{A02B9F3F-3042-489F-AF35-1A733968F079}" type="slidenum">
+              <a:rPr lang="en-US" smtClean="0"/>
+              <a:pPr/>
+              <a:t>5</a:t>
+            </a:fld>
+            <a:endParaRPr lang="en-US"/>
+          </a:p>
+        </p:txBody>
+      </p:sp>
+    </p:spTree>
+    <p:extLst>
+      <p:ext uri="{BB962C8B-B14F-4D97-AF65-F5344CB8AC3E}">
+        <p14:creationId xmlns:p14="http://schemas.microsoft.com/office/powerpoint/2010/main" val="1374250667"/>
+      </p:ext>
+    </p:extLst>
+  </p:cSld>
+  <p:clrMapOvr>
+    <a:masterClrMapping/>
+  </p:clrMapOvr>
+</p:notes>
+</file>
+
+<file path=ppt/notesSlides/notesSlide50.xml><?xml version="1.0" encoding="utf-8"?>
+<p:notes xmlns:a="http://schemas.openxmlformats.org/drawingml/2006/main" xmlns:r="http://schemas.openxmlformats.org/officeDocument/2006/relationships" xmlns:p="http://schemas.openxmlformats.org/presentationml/2006/main">
+  <p:cSld>
+    <p:spTree>
+      <p:nvGrpSpPr>
+        <p:cNvPr id="1" name=""/>
+        <p:cNvGrpSpPr/>
+        <p:nvPr/>
+      </p:nvGrpSpPr>
+      <p:grpSpPr>
+        <a:xfrm>
+          <a:off x="0" y="0"/>
+          <a:ext cx="0" cy="0"/>
+          <a:chOff x="0" y="0"/>
+          <a:chExt cx="0" cy="0"/>
+        </a:xfrm>
+      </p:grpSpPr>
+      <p:sp>
+        <p:nvSpPr>
           <p:cNvPr id="7" name="Rectangle 7"/>
           <p:cNvSpPr>
             <a:spLocks noGrp="1" noChangeArrowheads="1"/>
@@ -3156,10 +4686,10 @@
           <a:bodyPr/>
           <a:lstStyle/>
           <a:p>
-            <a:fld id="{0FC7384A-F489-4586-B03E-486116E88A31}" type="slidenum">
+            <a:fld id="{0A3D9CB9-3A48-4BB0-A01C-8270696DC00B}" type="slidenum">
               <a:rPr lang="en-US"/>
               <a:pPr/>
-              <a:t>7</a:t>
+              <a:t>53</a:t>
             </a:fld>
             <a:endParaRPr lang="en-US"/>
           </a:p>
@@ -3167,7 +4697,7 @@
       </p:sp>
       <p:sp>
         <p:nvSpPr>
-          <p:cNvPr id="688130" name="Rectangle 2"/>
+          <p:cNvPr id="206850" name="Rectangle 2"/>
           <p:cNvSpPr>
             <a:spLocks noGrp="1" noRot="1" noChangeAspect="1" noChangeArrowheads="1" noTextEdit="1"/>
           </p:cNvSpPr>
@@ -3181,7 +4711,259 @@
       </p:sp>
       <p:sp>
         <p:nvSpPr>
-          <p:cNvPr id="688131" name="Rectangle 3"/>
+          <p:cNvPr id="206851" name="Rectangle 3"/>
+          <p:cNvSpPr>
+            <a:spLocks noGrp="1" noChangeArrowheads="1"/>
+          </p:cNvSpPr>
+          <p:nvPr>
+            <p:ph type="body" idx="1"/>
+          </p:nvPr>
+        </p:nvSpPr>
+        <p:spPr/>
+        <p:txBody>
+          <a:bodyPr/>
+          <a:lstStyle/>
+          <a:p>
+            <a:endParaRPr lang="en-US"/>
+          </a:p>
+        </p:txBody>
+      </p:sp>
+    </p:spTree>
+  </p:cSld>
+  <p:clrMapOvr>
+    <a:masterClrMapping/>
+  </p:clrMapOvr>
+</p:notes>
+</file>
+
+<file path=ppt/notesSlides/notesSlide51.xml><?xml version="1.0" encoding="utf-8"?>
+<p:notes xmlns:a="http://schemas.openxmlformats.org/drawingml/2006/main" xmlns:r="http://schemas.openxmlformats.org/officeDocument/2006/relationships" xmlns:p="http://schemas.openxmlformats.org/presentationml/2006/main">
+  <p:cSld>
+    <p:spTree>
+      <p:nvGrpSpPr>
+        <p:cNvPr id="1" name=""/>
+        <p:cNvGrpSpPr/>
+        <p:nvPr/>
+      </p:nvGrpSpPr>
+      <p:grpSpPr>
+        <a:xfrm>
+          <a:off x="0" y="0"/>
+          <a:ext cx="0" cy="0"/>
+          <a:chOff x="0" y="0"/>
+          <a:chExt cx="0" cy="0"/>
+        </a:xfrm>
+      </p:grpSpPr>
+      <p:sp>
+        <p:nvSpPr>
+          <p:cNvPr id="7" name="Rectangle 7"/>
+          <p:cNvSpPr>
+            <a:spLocks noGrp="1" noChangeArrowheads="1"/>
+          </p:cNvSpPr>
+          <p:nvPr>
+            <p:ph type="sldNum" sz="quarter" idx="5"/>
+          </p:nvPr>
+        </p:nvSpPr>
+        <p:spPr>
+          <a:ln/>
+        </p:spPr>
+        <p:txBody>
+          <a:bodyPr/>
+          <a:lstStyle/>
+          <a:p>
+            <a:fld id="{0A3D9CB9-3A48-4BB0-A01C-8270696DC00B}" type="slidenum">
+              <a:rPr lang="en-US"/>
+              <a:pPr/>
+              <a:t>54</a:t>
+            </a:fld>
+            <a:endParaRPr lang="en-US"/>
+          </a:p>
+        </p:txBody>
+      </p:sp>
+      <p:sp>
+        <p:nvSpPr>
+          <p:cNvPr id="206850" name="Rectangle 2"/>
+          <p:cNvSpPr>
+            <a:spLocks noGrp="1" noRot="1" noChangeAspect="1" noChangeArrowheads="1" noTextEdit="1"/>
+          </p:cNvSpPr>
+          <p:nvPr>
+            <p:ph type="sldImg"/>
+          </p:nvPr>
+        </p:nvSpPr>
+        <p:spPr>
+          <a:ln/>
+        </p:spPr>
+      </p:sp>
+      <p:sp>
+        <p:nvSpPr>
+          <p:cNvPr id="206851" name="Rectangle 3"/>
+          <p:cNvSpPr>
+            <a:spLocks noGrp="1" noChangeArrowheads="1"/>
+          </p:cNvSpPr>
+          <p:nvPr>
+            <p:ph type="body" idx="1"/>
+          </p:nvPr>
+        </p:nvSpPr>
+        <p:spPr/>
+        <p:txBody>
+          <a:bodyPr/>
+          <a:lstStyle/>
+          <a:p>
+            <a:endParaRPr lang="en-US"/>
+          </a:p>
+        </p:txBody>
+      </p:sp>
+    </p:spTree>
+  </p:cSld>
+  <p:clrMapOvr>
+    <a:masterClrMapping/>
+  </p:clrMapOvr>
+</p:notes>
+</file>
+
+<file path=ppt/notesSlides/notesSlide52.xml><?xml version="1.0" encoding="utf-8"?>
+<p:notes xmlns:a="http://schemas.openxmlformats.org/drawingml/2006/main" xmlns:r="http://schemas.openxmlformats.org/officeDocument/2006/relationships" xmlns:p="http://schemas.openxmlformats.org/presentationml/2006/main">
+  <p:cSld>
+    <p:spTree>
+      <p:nvGrpSpPr>
+        <p:cNvPr id="1" name=""/>
+        <p:cNvGrpSpPr/>
+        <p:nvPr/>
+      </p:nvGrpSpPr>
+      <p:grpSpPr>
+        <a:xfrm>
+          <a:off x="0" y="0"/>
+          <a:ext cx="0" cy="0"/>
+          <a:chOff x="0" y="0"/>
+          <a:chExt cx="0" cy="0"/>
+        </a:xfrm>
+      </p:grpSpPr>
+      <p:sp>
+        <p:nvSpPr>
+          <p:cNvPr id="7" name="Rectangle 7"/>
+          <p:cNvSpPr>
+            <a:spLocks noGrp="1" noChangeArrowheads="1"/>
+          </p:cNvSpPr>
+          <p:nvPr>
+            <p:ph type="sldNum" sz="quarter" idx="5"/>
+          </p:nvPr>
+        </p:nvSpPr>
+        <p:spPr>
+          <a:ln/>
+        </p:spPr>
+        <p:txBody>
+          <a:bodyPr/>
+          <a:lstStyle/>
+          <a:p>
+            <a:fld id="{1240EC72-EB67-4546-B7C3-5744BDE3AD4D}" type="slidenum">
+              <a:rPr lang="en-US"/>
+              <a:pPr/>
+              <a:t>55</a:t>
+            </a:fld>
+            <a:endParaRPr lang="en-US"/>
+          </a:p>
+        </p:txBody>
+      </p:sp>
+      <p:sp>
+        <p:nvSpPr>
+          <p:cNvPr id="203778" name="Rectangle 2"/>
+          <p:cNvSpPr>
+            <a:spLocks noGrp="1" noRot="1" noChangeAspect="1" noChangeArrowheads="1" noTextEdit="1"/>
+          </p:cNvSpPr>
+          <p:nvPr>
+            <p:ph type="sldImg"/>
+          </p:nvPr>
+        </p:nvSpPr>
+        <p:spPr>
+          <a:ln/>
+        </p:spPr>
+      </p:sp>
+      <p:sp>
+        <p:nvSpPr>
+          <p:cNvPr id="203779" name="Rectangle 3"/>
+          <p:cNvSpPr>
+            <a:spLocks noGrp="1" noChangeArrowheads="1"/>
+          </p:cNvSpPr>
+          <p:nvPr>
+            <p:ph type="body" idx="1"/>
+          </p:nvPr>
+        </p:nvSpPr>
+        <p:spPr/>
+        <p:txBody>
+          <a:bodyPr/>
+          <a:lstStyle/>
+          <a:p>
+            <a:endParaRPr lang="en-US"/>
+          </a:p>
+        </p:txBody>
+      </p:sp>
+    </p:spTree>
+  </p:cSld>
+  <p:clrMapOvr>
+    <a:masterClrMapping/>
+  </p:clrMapOvr>
+</p:notes>
+</file>
+
+<file path=ppt/notesSlides/notesSlide53.xml><?xml version="1.0" encoding="utf-8"?>
+<p:notes xmlns:a="http://schemas.openxmlformats.org/drawingml/2006/main" xmlns:r="http://schemas.openxmlformats.org/officeDocument/2006/relationships" xmlns:p="http://schemas.openxmlformats.org/presentationml/2006/main">
+  <p:cSld>
+    <p:spTree>
+      <p:nvGrpSpPr>
+        <p:cNvPr id="1" name=""/>
+        <p:cNvGrpSpPr/>
+        <p:nvPr/>
+      </p:nvGrpSpPr>
+      <p:grpSpPr>
+        <a:xfrm>
+          <a:off x="0" y="0"/>
+          <a:ext cx="0" cy="0"/>
+          <a:chOff x="0" y="0"/>
+          <a:chExt cx="0" cy="0"/>
+        </a:xfrm>
+      </p:grpSpPr>
+      <p:sp>
+        <p:nvSpPr>
+          <p:cNvPr id="7" name="Rectangle 7"/>
+          <p:cNvSpPr>
+            <a:spLocks noGrp="1" noChangeArrowheads="1"/>
+          </p:cNvSpPr>
+          <p:nvPr>
+            <p:ph type="sldNum" sz="quarter" idx="5"/>
+          </p:nvPr>
+        </p:nvSpPr>
+        <p:spPr>
+          <a:ln/>
+        </p:spPr>
+        <p:txBody>
+          <a:bodyPr/>
+          <a:lstStyle/>
+          <a:p>
+            <a:fld id="{1240EC72-EB67-4546-B7C3-5744BDE3AD4D}" type="slidenum">
+              <a:rPr lang="en-US"/>
+              <a:pPr/>
+              <a:t>56</a:t>
+            </a:fld>
+            <a:endParaRPr lang="en-US"/>
+          </a:p>
+        </p:txBody>
+      </p:sp>
+      <p:sp>
+        <p:nvSpPr>
+          <p:cNvPr id="203778" name="Rectangle 2"/>
+          <p:cNvSpPr>
+            <a:spLocks noGrp="1" noRot="1" noChangeAspect="1" noChangeArrowheads="1" noTextEdit="1"/>
+          </p:cNvSpPr>
+          <p:nvPr>
+            <p:ph type="sldImg"/>
+          </p:nvPr>
+        </p:nvSpPr>
+        <p:spPr>
+          <a:ln/>
+        </p:spPr>
+      </p:sp>
+      <p:sp>
+        <p:nvSpPr>
+          <p:cNvPr id="203779" name="Rectangle 3"/>
           <p:cNvSpPr>
             <a:spLocks noGrp="1" noChangeArrowheads="1"/>
           </p:cNvSpPr>
@@ -3225,49 +5007,21 @@
       </p:grpSpPr>
       <p:sp>
         <p:nvSpPr>
-          <p:cNvPr id="7" name="Rectangle 7"/>
+          <p:cNvPr id="2" name="Slide Image Placeholder 1"/>
           <p:cNvSpPr>
-            <a:spLocks noGrp="1" noChangeArrowheads="1"/>
-          </p:cNvSpPr>
-          <p:nvPr>
-            <p:ph type="sldNum" sz="quarter" idx="5"/>
-          </p:nvPr>
-        </p:nvSpPr>
-        <p:spPr>
-          <a:ln/>
-        </p:spPr>
-        <p:txBody>
-          <a:bodyPr/>
-          <a:lstStyle/>
-          <a:p>
-            <a:fld id="{0FC7384A-F489-4586-B03E-486116E88A31}" type="slidenum">
-              <a:rPr lang="en-US"/>
-              <a:pPr/>
-              <a:t>12</a:t>
-            </a:fld>
-            <a:endParaRPr lang="en-US"/>
-          </a:p>
-        </p:txBody>
-      </p:sp>
-      <p:sp>
-        <p:nvSpPr>
-          <p:cNvPr id="688130" name="Rectangle 2"/>
-          <p:cNvSpPr>
-            <a:spLocks noGrp="1" noRot="1" noChangeAspect="1" noChangeArrowheads="1" noTextEdit="1"/>
+            <a:spLocks noGrp="1" noRot="1" noChangeAspect="1"/>
           </p:cNvSpPr>
           <p:nvPr>
             <p:ph type="sldImg"/>
           </p:nvPr>
         </p:nvSpPr>
-        <p:spPr>
-          <a:ln/>
-        </p:spPr>
-      </p:sp>
-      <p:sp>
-        <p:nvSpPr>
-          <p:cNvPr id="688131" name="Rectangle 3"/>
+        <p:spPr/>
+      </p:sp>
+      <p:sp>
+        <p:nvSpPr>
+          <p:cNvPr id="3" name="Notes Placeholder 2"/>
           <p:cNvSpPr>
-            <a:spLocks noGrp="1" noChangeArrowheads="1"/>
+            <a:spLocks noGrp="1"/>
           </p:cNvSpPr>
           <p:nvPr>
             <p:ph type="body" idx="1"/>
@@ -3282,7 +5036,36 @@
           </a:p>
         </p:txBody>
       </p:sp>
+      <p:sp>
+        <p:nvSpPr>
+          <p:cNvPr id="4" name="Slide Number Placeholder 3"/>
+          <p:cNvSpPr>
+            <a:spLocks noGrp="1"/>
+          </p:cNvSpPr>
+          <p:nvPr>
+            <p:ph type="sldNum" sz="quarter" idx="10"/>
+          </p:nvPr>
+        </p:nvSpPr>
+        <p:spPr/>
+        <p:txBody>
+          <a:bodyPr/>
+          <a:lstStyle/>
+          <a:p>
+            <a:fld id="{A02B9F3F-3042-489F-AF35-1A733968F079}" type="slidenum">
+              <a:rPr lang="en-US" smtClean="0"/>
+              <a:pPr/>
+              <a:t>6</a:t>
+            </a:fld>
+            <a:endParaRPr lang="en-US"/>
+          </a:p>
+        </p:txBody>
+      </p:sp>
     </p:spTree>
+    <p:extLst>
+      <p:ext uri="{BB962C8B-B14F-4D97-AF65-F5344CB8AC3E}">
+        <p14:creationId xmlns:p14="http://schemas.microsoft.com/office/powerpoint/2010/main" val="2739599021"/>
+      </p:ext>
+    </p:extLst>
   </p:cSld>
   <p:clrMapOvr>
     <a:masterClrMapping/>
@@ -3327,7 +5110,7 @@
             <a:fld id="{0FC7384A-F489-4586-B03E-486116E88A31}" type="slidenum">
               <a:rPr lang="en-US"/>
               <a:pPr/>
-              <a:t>15</a:t>
+              <a:t>7</a:t>
             </a:fld>
             <a:endParaRPr lang="en-US"/>
           </a:p>
@@ -3393,49 +5176,21 @@
       </p:grpSpPr>
       <p:sp>
         <p:nvSpPr>
-          <p:cNvPr id="7" name="Rectangle 7"/>
+          <p:cNvPr id="2" name="Slide Image Placeholder 1"/>
           <p:cNvSpPr>
-            <a:spLocks noGrp="1" noChangeArrowheads="1"/>
-          </p:cNvSpPr>
-          <p:nvPr>
-            <p:ph type="sldNum" sz="quarter" idx="5"/>
-          </p:nvPr>
-        </p:nvSpPr>
-        <p:spPr>
-          <a:ln/>
-        </p:spPr>
-        <p:txBody>
-          <a:bodyPr/>
-          <a:lstStyle/>
-          <a:p>
-            <a:fld id="{0FC7384A-F489-4586-B03E-486116E88A31}" type="slidenum">
-              <a:rPr lang="en-US"/>
-              <a:pPr/>
-              <a:t>16</a:t>
-            </a:fld>
-            <a:endParaRPr lang="en-US"/>
-          </a:p>
-        </p:txBody>
-      </p:sp>
-      <p:sp>
-        <p:nvSpPr>
-          <p:cNvPr id="688130" name="Rectangle 2"/>
-          <p:cNvSpPr>
-            <a:spLocks noGrp="1" noRot="1" noChangeAspect="1" noChangeArrowheads="1" noTextEdit="1"/>
+            <a:spLocks noGrp="1" noRot="1" noChangeAspect="1"/>
           </p:cNvSpPr>
           <p:nvPr>
             <p:ph type="sldImg"/>
           </p:nvPr>
         </p:nvSpPr>
-        <p:spPr>
-          <a:ln/>
-        </p:spPr>
-      </p:sp>
-      <p:sp>
-        <p:nvSpPr>
-          <p:cNvPr id="688131" name="Rectangle 3"/>
+        <p:spPr/>
+      </p:sp>
+      <p:sp>
+        <p:nvSpPr>
+          <p:cNvPr id="3" name="Notes Placeholder 2"/>
           <p:cNvSpPr>
-            <a:spLocks noGrp="1" noChangeArrowheads="1"/>
+            <a:spLocks noGrp="1"/>
           </p:cNvSpPr>
           <p:nvPr>
             <p:ph type="body" idx="1"/>
@@ -3450,7 +5205,36 @@
           </a:p>
         </p:txBody>
       </p:sp>
+      <p:sp>
+        <p:nvSpPr>
+          <p:cNvPr id="4" name="Slide Number Placeholder 3"/>
+          <p:cNvSpPr>
+            <a:spLocks noGrp="1"/>
+          </p:cNvSpPr>
+          <p:nvPr>
+            <p:ph type="sldNum" sz="quarter" idx="10"/>
+          </p:nvPr>
+        </p:nvSpPr>
+        <p:spPr/>
+        <p:txBody>
+          <a:bodyPr/>
+          <a:lstStyle/>
+          <a:p>
+            <a:fld id="{A02B9F3F-3042-489F-AF35-1A733968F079}" type="slidenum">
+              <a:rPr lang="en-US" smtClean="0"/>
+              <a:pPr/>
+              <a:t>8</a:t>
+            </a:fld>
+            <a:endParaRPr lang="en-US"/>
+          </a:p>
+        </p:txBody>
+      </p:sp>
     </p:spTree>
+    <p:extLst>
+      <p:ext uri="{BB962C8B-B14F-4D97-AF65-F5344CB8AC3E}">
+        <p14:creationId xmlns:p14="http://schemas.microsoft.com/office/powerpoint/2010/main" val="2327905467"/>
+      </p:ext>
+    </p:extLst>
   </p:cSld>
   <p:clrMapOvr>
     <a:masterClrMapping/>
@@ -3477,49 +5261,21 @@
       </p:grpSpPr>
       <p:sp>
         <p:nvSpPr>
-          <p:cNvPr id="7" name="Rectangle 7"/>
+          <p:cNvPr id="2" name="Slide Image Placeholder 1"/>
           <p:cNvSpPr>
-            <a:spLocks noGrp="1" noChangeArrowheads="1"/>
-          </p:cNvSpPr>
-          <p:nvPr>
-            <p:ph type="sldNum" sz="quarter" idx="5"/>
-          </p:nvPr>
-        </p:nvSpPr>
-        <p:spPr>
-          <a:ln/>
-        </p:spPr>
-        <p:txBody>
-          <a:bodyPr/>
-          <a:lstStyle/>
-          <a:p>
-            <a:fld id="{0FC7384A-F489-4586-B03E-486116E88A31}" type="slidenum">
-              <a:rPr lang="en-US"/>
-              <a:pPr/>
-              <a:t>18</a:t>
-            </a:fld>
-            <a:endParaRPr lang="en-US"/>
-          </a:p>
-        </p:txBody>
-      </p:sp>
-      <p:sp>
-        <p:nvSpPr>
-          <p:cNvPr id="688130" name="Rectangle 2"/>
-          <p:cNvSpPr>
-            <a:spLocks noGrp="1" noRot="1" noChangeAspect="1" noChangeArrowheads="1" noTextEdit="1"/>
+            <a:spLocks noGrp="1" noRot="1" noChangeAspect="1"/>
           </p:cNvSpPr>
           <p:nvPr>
             <p:ph type="sldImg"/>
           </p:nvPr>
         </p:nvSpPr>
-        <p:spPr>
-          <a:ln/>
-        </p:spPr>
-      </p:sp>
-      <p:sp>
-        <p:nvSpPr>
-          <p:cNvPr id="688131" name="Rectangle 3"/>
+        <p:spPr/>
+      </p:sp>
+      <p:sp>
+        <p:nvSpPr>
+          <p:cNvPr id="3" name="Notes Placeholder 2"/>
           <p:cNvSpPr>
-            <a:spLocks noGrp="1" noChangeArrowheads="1"/>
+            <a:spLocks noGrp="1"/>
           </p:cNvSpPr>
           <p:nvPr>
             <p:ph type="body" idx="1"/>
@@ -3534,7 +5290,36 @@
           </a:p>
         </p:txBody>
       </p:sp>
+      <p:sp>
+        <p:nvSpPr>
+          <p:cNvPr id="4" name="Slide Number Placeholder 3"/>
+          <p:cNvSpPr>
+            <a:spLocks noGrp="1"/>
+          </p:cNvSpPr>
+          <p:nvPr>
+            <p:ph type="sldNum" sz="quarter" idx="10"/>
+          </p:nvPr>
+        </p:nvSpPr>
+        <p:spPr/>
+        <p:txBody>
+          <a:bodyPr/>
+          <a:lstStyle/>
+          <a:p>
+            <a:fld id="{A02B9F3F-3042-489F-AF35-1A733968F079}" type="slidenum">
+              <a:rPr lang="en-US" smtClean="0"/>
+              <a:pPr/>
+              <a:t>9</a:t>
+            </a:fld>
+            <a:endParaRPr lang="en-US"/>
+          </a:p>
+        </p:txBody>
+      </p:sp>
     </p:spTree>
+    <p:extLst>
+      <p:ext uri="{BB962C8B-B14F-4D97-AF65-F5344CB8AC3E}">
+        <p14:creationId xmlns:p14="http://schemas.microsoft.com/office/powerpoint/2010/main" val="1946633432"/>
+      </p:ext>
+    </p:extLst>
   </p:cSld>
   <p:clrMapOvr>
     <a:masterClrMapping/>
@@ -5456,12 +7241,12 @@
   <p:clrMapOvr>
     <a:masterClrMapping/>
   </p:clrMapOvr>
-  <mc:AlternateContent xmlns:mc="http://schemas.openxmlformats.org/markup-compatibility/2006" xmlns:p14="http://schemas.microsoft.com/office/powerpoint/2010/main">
-    <mc:Choice Requires="p14">
-      <p:transition spd="slow" p14:dur="2000" advTm="22684"/>
+  <mc:AlternateContent xmlns:mc="http://schemas.openxmlformats.org/markup-compatibility/2006">
+    <mc:Choice xmlns:p14="http://schemas.microsoft.com/office/powerpoint/2010/main" Requires="p14">
+      <p:transition spd="slow" p14:dur="2000"/>
     </mc:Choice>
-    <mc:Fallback xmlns="">
-      <p:transition xmlns:p14="http://schemas.microsoft.com/office/powerpoint/2010/main" spd="slow" advTm="22684"/>
+    <mc:Fallback>
+      <p:transition xmlns:p14="http://schemas.microsoft.com/office/powerpoint/2010/main" spd="slow"/>
     </mc:Fallback>
   </mc:AlternateContent>
   <p:timing>
@@ -6823,14 +8608,14 @@
   <p:clrMapOvr>
     <a:masterClrMapping/>
   </p:clrMapOvr>
-  <mc:AlternateContent xmlns:mc="http://schemas.openxmlformats.org/markup-compatibility/2006" xmlns:p14="http://schemas.microsoft.com/office/powerpoint/2010/main">
-    <mc:Choice Requires="p14">
-      <p:transition spd="med" p14:dur="700" advTm="38987">
+  <mc:AlternateContent xmlns:mc="http://schemas.openxmlformats.org/markup-compatibility/2006">
+    <mc:Choice xmlns:p14="http://schemas.microsoft.com/office/powerpoint/2010/main" Requires="p14">
+      <p:transition spd="med" p14:dur="700">
         <p:fade/>
       </p:transition>
     </mc:Choice>
-    <mc:Fallback xmlns="">
-      <p:transition xmlns:p14="http://schemas.microsoft.com/office/powerpoint/2010/main" spd="med" advTm="38987">
+    <mc:Fallback>
+      <p:transition xmlns:p14="http://schemas.microsoft.com/office/powerpoint/2010/main" spd="med">
         <p:fade/>
       </p:transition>
     </mc:Fallback>
@@ -7474,12 +9259,12 @@
           <a:graphicData uri="http://schemas.openxmlformats.org/presentationml/2006/ole">
             <mc:AlternateContent xmlns:mc="http://schemas.openxmlformats.org/markup-compatibility/2006">
               <mc:Choice xmlns:v="urn:schemas-microsoft-com:vml" Requires="v">
-                <p:oleObj spid="_x0000_s642062" name="Equation" r:id="rId3" imgW="1066800" imgH="495300" progId="Equation.3">
+                <p:oleObj spid="_x0000_s642066" name="Equation" r:id="rId4" imgW="1066800" imgH="495300" progId="Equation.3">
                   <p:embed/>
                 </p:oleObj>
               </mc:Choice>
               <mc:Fallback>
-                <p:oleObj name="Equation" r:id="rId3" imgW="1066800" imgH="495300" progId="Equation.3">
+                <p:oleObj name="Equation" r:id="rId4" imgW="1066800" imgH="495300" progId="Equation.3">
                   <p:embed/>
                   <p:pic>
                     <p:nvPicPr>
@@ -7488,7 +9273,7 @@
                       <p:nvPr/>
                     </p:nvPicPr>
                     <p:blipFill>
-                      <a:blip r:embed="rId4"/>
+                      <a:blip r:embed="rId5"/>
                       <a:stretch>
                         <a:fillRect/>
                       </a:stretch>
@@ -8856,7 +10641,7 @@
   <p:clrMapOvr>
     <a:masterClrMapping/>
   </p:clrMapOvr>
-  <p:transition xmlns:p14="http://schemas.microsoft.com/office/powerpoint/2010/main" advTm="38987">
+  <p:transition xmlns:p14="http://schemas.microsoft.com/office/powerpoint/2010/main">
     <p:fade thruBlk="1"/>
   </p:transition>
   <p:timing>
@@ -9659,7 +11444,7 @@
           <a:graphicData uri="http://schemas.openxmlformats.org/presentationml/2006/ole">
             <mc:AlternateContent xmlns:mc="http://schemas.openxmlformats.org/markup-compatibility/2006">
               <mc:Choice xmlns:v="urn:schemas-microsoft-com:vml" Requires="v">
-                <p:oleObj spid="_x0000_s657415" name="Equation" r:id="rId5" imgW="1320800" imgH="266700" progId="Equation.DSMT4">
+                <p:oleObj spid="_x0000_s657419" name="Equation" r:id="rId5" imgW="1320800" imgH="266700" progId="Equation.DSMT4">
                   <p:embed/>
                 </p:oleObj>
               </mc:Choice>
@@ -9707,7 +11492,7 @@
   <p:clrMapOvr>
     <a:masterClrMapping/>
   </p:clrMapOvr>
-  <p:transition xmlns:p14="http://schemas.microsoft.com/office/powerpoint/2010/main" advTm="38987">
+  <p:transition xmlns:p14="http://schemas.microsoft.com/office/powerpoint/2010/main">
     <p:fade thruBlk="1"/>
   </p:transition>
   <p:timing>
@@ -10881,7 +12666,7 @@
   <p:clrMapOvr>
     <a:masterClrMapping/>
   </p:clrMapOvr>
-  <p:transition xmlns:p14="http://schemas.microsoft.com/office/powerpoint/2010/main" advTm="38987">
+  <p:transition xmlns:p14="http://schemas.microsoft.com/office/powerpoint/2010/main">
     <p:fade thruBlk="1"/>
   </p:transition>
   <p:timing>
@@ -11129,13 +12914,13 @@
   <p:clrMapOvr>
     <a:masterClrMapping/>
   </p:clrMapOvr>
-  <mc:AlternateContent xmlns:mc="http://schemas.openxmlformats.org/markup-compatibility/2006">
-    <mc:Choice xmlns:p14="http://schemas.microsoft.com/office/powerpoint/2010/main" Requires="p14">
+  <mc:AlternateContent xmlns:mc="http://schemas.openxmlformats.org/markup-compatibility/2006" xmlns:p14="http://schemas.microsoft.com/office/powerpoint/2010/main">
+    <mc:Choice Requires="p14">
       <p:transition spd="med" p14:dur="700">
         <p:fade/>
       </p:transition>
     </mc:Choice>
-    <mc:Fallback>
+    <mc:Fallback xmlns="">
       <p:transition xmlns:p14="http://schemas.microsoft.com/office/powerpoint/2010/main" spd="med">
         <p:fade/>
       </p:transition>
@@ -11333,14 +13118,14 @@
   <p:clrMapOvr>
     <a:masterClrMapping/>
   </p:clrMapOvr>
-  <mc:AlternateContent xmlns:mc="http://schemas.openxmlformats.org/markup-compatibility/2006" xmlns:p14="http://schemas.microsoft.com/office/powerpoint/2010/main">
-    <mc:Choice Requires="p14">
-      <p:transition spd="med" p14:dur="700" advTm="20709">
+  <mc:AlternateContent xmlns:mc="http://schemas.openxmlformats.org/markup-compatibility/2006">
+    <mc:Choice xmlns:p14="http://schemas.microsoft.com/office/powerpoint/2010/main" Requires="p14">
+      <p:transition spd="med" p14:dur="700">
         <p:fade/>
       </p:transition>
     </mc:Choice>
-    <mc:Fallback xmlns="">
-      <p:transition xmlns:p14="http://schemas.microsoft.com/office/powerpoint/2010/main" spd="med" advTm="20709">
+    <mc:Fallback>
+      <p:transition xmlns:p14="http://schemas.microsoft.com/office/powerpoint/2010/main" spd="med">
         <p:fade/>
       </p:transition>
     </mc:Fallback>
@@ -11637,13 +13422,13 @@
   <p:clrMapOvr>
     <a:masterClrMapping/>
   </p:clrMapOvr>
-  <mc:AlternateContent xmlns:mc="http://schemas.openxmlformats.org/markup-compatibility/2006">
-    <mc:Choice xmlns:p14="http://schemas.microsoft.com/office/powerpoint/2010/main" Requires="p14">
+  <mc:AlternateContent xmlns:mc="http://schemas.openxmlformats.org/markup-compatibility/2006" xmlns:p14="http://schemas.microsoft.com/office/powerpoint/2010/main">
+    <mc:Choice Requires="p14">
       <p:transition spd="med" p14:dur="700">
         <p:fade/>
       </p:transition>
     </mc:Choice>
-    <mc:Fallback>
+    <mc:Fallback xmlns="">
       <p:transition xmlns:p14="http://schemas.microsoft.com/office/powerpoint/2010/main" spd="med">
         <p:fade/>
       </p:transition>
@@ -12597,12 +14382,12 @@
   </p:clrMapOvr>
   <mc:AlternateContent xmlns:mc="http://schemas.openxmlformats.org/markup-compatibility/2006">
     <mc:Choice xmlns:p14="http://schemas.microsoft.com/office/powerpoint/2010/main" Requires="p14">
-      <p:transition spd="med" p14:dur="700" advTm="38987">
+      <p:transition spd="med" p14:dur="700">
         <p:fade/>
       </p:transition>
     </mc:Choice>
     <mc:Fallback>
-      <p:transition xmlns:p14="http://schemas.microsoft.com/office/powerpoint/2010/main" spd="med" advTm="38987">
+      <p:transition xmlns:p14="http://schemas.microsoft.com/office/powerpoint/2010/main" spd="med">
         <p:fade/>
       </p:transition>
     </mc:Fallback>
@@ -13069,13 +14854,13 @@
   <p:clrMapOvr>
     <a:masterClrMapping/>
   </p:clrMapOvr>
-  <mc:AlternateContent xmlns:mc="http://schemas.openxmlformats.org/markup-compatibility/2006">
-    <mc:Choice xmlns:p14="http://schemas.microsoft.com/office/powerpoint/2010/main" Requires="p14">
+  <mc:AlternateContent xmlns:mc="http://schemas.openxmlformats.org/markup-compatibility/2006" xmlns:p14="http://schemas.microsoft.com/office/powerpoint/2010/main">
+    <mc:Choice Requires="p14">
       <p:transition spd="med" p14:dur="700">
         <p:fade/>
       </p:transition>
     </mc:Choice>
-    <mc:Fallback>
+    <mc:Fallback xmlns="">
       <p:transition xmlns:p14="http://schemas.microsoft.com/office/powerpoint/2010/main" spd="med">
         <p:fade/>
       </p:transition>
@@ -13474,12 +15259,12 @@
           <a:graphicData uri="http://schemas.openxmlformats.org/presentationml/2006/ole">
             <mc:AlternateContent xmlns:mc="http://schemas.openxmlformats.org/markup-compatibility/2006">
               <mc:Choice xmlns:v="urn:schemas-microsoft-com:vml" Requires="v">
-                <p:oleObj spid="_x0000_s1083" name="Equation" r:id="rId3" imgW="2527300" imgH="457200" progId="Equation.DSMT4">
+                <p:oleObj spid="_x0000_s1090" name="Equation" r:id="rId4" imgW="2527300" imgH="457200" progId="Equation.DSMT4">
                   <p:embed/>
                 </p:oleObj>
               </mc:Choice>
               <mc:Fallback>
-                <p:oleObj name="Equation" r:id="rId3" imgW="2527300" imgH="457200" progId="Equation.DSMT4">
+                <p:oleObj name="Equation" r:id="rId4" imgW="2527300" imgH="457200" progId="Equation.DSMT4">
                   <p:embed/>
                   <p:pic>
                     <p:nvPicPr>
@@ -13488,7 +15273,7 @@
                       <p:nvPr/>
                     </p:nvPicPr>
                     <p:blipFill>
-                      <a:blip r:embed="rId4"/>
+                      <a:blip r:embed="rId5"/>
                       <a:stretch>
                         <a:fillRect/>
                       </a:stretch>
@@ -13531,12 +15316,12 @@
           <a:graphicData uri="http://schemas.openxmlformats.org/presentationml/2006/ole">
             <mc:AlternateContent xmlns:mc="http://schemas.openxmlformats.org/markup-compatibility/2006">
               <mc:Choice xmlns:v="urn:schemas-microsoft-com:vml" Requires="v">
-                <p:oleObj spid="_x0000_s1084" name="Equation" r:id="rId5" imgW="749300" imgH="254000" progId="Equation.DSMT4">
+                <p:oleObj spid="_x0000_s1091" name="Equation" r:id="rId6" imgW="749300" imgH="254000" progId="Equation.DSMT4">
                   <p:embed/>
                 </p:oleObj>
               </mc:Choice>
               <mc:Fallback>
-                <p:oleObj name="Equation" r:id="rId5" imgW="749300" imgH="254000" progId="Equation.DSMT4">
+                <p:oleObj name="Equation" r:id="rId6" imgW="749300" imgH="254000" progId="Equation.DSMT4">
                   <p:embed/>
                   <p:pic>
                     <p:nvPicPr>
@@ -13545,7 +15330,7 @@
                       <p:nvPr/>
                     </p:nvPicPr>
                     <p:blipFill>
-                      <a:blip r:embed="rId6"/>
+                      <a:blip r:embed="rId7"/>
                       <a:stretch>
                         <a:fillRect/>
                       </a:stretch>
@@ -14794,7 +16579,7 @@
   <p:clrMapOvr>
     <a:masterClrMapping/>
   </p:clrMapOvr>
-  <p:transition xmlns:p14="http://schemas.microsoft.com/office/powerpoint/2010/main" advTm="38987">
+  <p:transition xmlns:p14="http://schemas.microsoft.com/office/powerpoint/2010/main">
     <p:fade thruBlk="1"/>
   </p:transition>
   <p:timing>
@@ -15945,7 +17730,7 @@
   <p:clrMapOvr>
     <a:masterClrMapping/>
   </p:clrMapOvr>
-  <p:transition xmlns:p14="http://schemas.microsoft.com/office/powerpoint/2010/main" advTm="38987">
+  <p:transition xmlns:p14="http://schemas.microsoft.com/office/powerpoint/2010/main">
     <p:fade/>
   </p:transition>
   <p:timing>
@@ -16247,7 +18032,7 @@
           <a:graphicData uri="http://schemas.openxmlformats.org/presentationml/2006/ole">
             <mc:AlternateContent xmlns:mc="http://schemas.openxmlformats.org/markup-compatibility/2006">
               <mc:Choice xmlns:v="urn:schemas-microsoft-com:vml" Requires="v">
-                <p:oleObj spid="_x0000_s608326" name="Equation" r:id="rId3" imgW="2044700" imgH="457200" progId="Equation.DSMT4">
+                <p:oleObj spid="_x0000_s608333" name="Equation" r:id="rId3" imgW="2044700" imgH="457200" progId="Equation.DSMT4">
                   <p:embed/>
                 </p:oleObj>
               </mc:Choice>
@@ -16304,7 +18089,7 @@
           <a:graphicData uri="http://schemas.openxmlformats.org/presentationml/2006/ole">
             <mc:AlternateContent xmlns:mc="http://schemas.openxmlformats.org/markup-compatibility/2006">
               <mc:Choice xmlns:v="urn:schemas-microsoft-com:vml" Requires="v">
-                <p:oleObj spid="_x0000_s608327" name="Equation" r:id="rId5" imgW="622300" imgH="215900" progId="Equation.DSMT4">
+                <p:oleObj spid="_x0000_s608334" name="Equation" r:id="rId5" imgW="622300" imgH="215900" progId="Equation.DSMT4">
                   <p:embed/>
                 </p:oleObj>
               </mc:Choice>
@@ -16596,7 +18381,7 @@
           <a:graphicData uri="http://schemas.openxmlformats.org/presentationml/2006/ole">
             <mc:AlternateContent xmlns:mc="http://schemas.openxmlformats.org/markup-compatibility/2006">
               <mc:Choice xmlns:v="urn:schemas-microsoft-com:vml" Requires="v">
-                <p:oleObj spid="_x0000_s612417" name="Equation" r:id="rId4" imgW="2692400" imgH="355600" progId="Equation.DSMT4">
+                <p:oleObj spid="_x0000_s612424" name="Equation" r:id="rId4" imgW="2692400" imgH="355600" progId="Equation.DSMT4">
                   <p:embed/>
                 </p:oleObj>
               </mc:Choice>
@@ -16653,7 +18438,7 @@
           <a:graphicData uri="http://schemas.openxmlformats.org/presentationml/2006/ole">
             <mc:AlternateContent xmlns:mc="http://schemas.openxmlformats.org/markup-compatibility/2006">
               <mc:Choice xmlns:v="urn:schemas-microsoft-com:vml" Requires="v">
-                <p:oleObj spid="_x0000_s612418" name="Equation" r:id="rId6" imgW="2971800" imgH="381000" progId="Equation.DSMT4">
+                <p:oleObj spid="_x0000_s612425" name="Equation" r:id="rId6" imgW="2971800" imgH="381000" progId="Equation.DSMT4">
                   <p:embed/>
                 </p:oleObj>
               </mc:Choice>
@@ -16698,13 +18483,13 @@
   <p:clrMapOvr>
     <a:masterClrMapping/>
   </p:clrMapOvr>
-  <mc:AlternateContent xmlns:mc="http://schemas.openxmlformats.org/markup-compatibility/2006">
-    <mc:Choice xmlns:p14="http://schemas.microsoft.com/office/powerpoint/2010/main" Requires="p14">
+  <mc:AlternateContent xmlns:mc="http://schemas.openxmlformats.org/markup-compatibility/2006" xmlns:p14="http://schemas.microsoft.com/office/powerpoint/2010/main">
+    <mc:Choice Requires="p14">
       <p:transition spd="med" p14:dur="600">
         <p:fade/>
       </p:transition>
     </mc:Choice>
-    <mc:Fallback>
+    <mc:Fallback xmlns="">
       <p:transition xmlns:p14="http://schemas.microsoft.com/office/powerpoint/2010/main" spd="med">
         <p:fade/>
       </p:transition>
@@ -16926,12 +18711,12 @@
           <a:graphicData uri="http://schemas.openxmlformats.org/presentationml/2006/ole">
             <mc:AlternateContent xmlns:mc="http://schemas.openxmlformats.org/markup-compatibility/2006">
               <mc:Choice xmlns:v="urn:schemas-microsoft-com:vml" Requires="v">
-                <p:oleObj spid="_x0000_s659470" name="Equation" r:id="rId3" imgW="2768600" imgH="584200" progId="Equation.DSMT4">
+                <p:oleObj spid="_x0000_s659477" name="Equation" r:id="rId4" imgW="2768600" imgH="584200" progId="Equation.DSMT4">
                   <p:embed/>
                 </p:oleObj>
               </mc:Choice>
               <mc:Fallback>
-                <p:oleObj name="Equation" r:id="rId3" imgW="2768600" imgH="584200" progId="Equation.DSMT4">
+                <p:oleObj name="Equation" r:id="rId4" imgW="2768600" imgH="584200" progId="Equation.DSMT4">
                   <p:embed/>
                   <p:pic>
                     <p:nvPicPr>
@@ -16940,7 +18725,7 @@
                       <p:nvPr/>
                     </p:nvPicPr>
                     <p:blipFill>
-                      <a:blip r:embed="rId4"/>
+                      <a:blip r:embed="rId5"/>
                       <a:stretch>
                         <a:fillRect/>
                       </a:stretch>
@@ -17045,12 +18830,12 @@
           <a:graphicData uri="http://schemas.openxmlformats.org/presentationml/2006/ole">
             <mc:AlternateContent xmlns:mc="http://schemas.openxmlformats.org/markup-compatibility/2006">
               <mc:Choice xmlns:v="urn:schemas-microsoft-com:vml" Requires="v">
-                <p:oleObj spid="_x0000_s659471" name="Equation" r:id="rId5" imgW="2959100" imgH="685800" progId="Equation.3">
+                <p:oleObj spid="_x0000_s659478" name="Equation" r:id="rId6" imgW="2959100" imgH="685800" progId="Equation.3">
                   <p:embed/>
                 </p:oleObj>
               </mc:Choice>
               <mc:Fallback>
-                <p:oleObj name="Equation" r:id="rId5" imgW="2959100" imgH="685800" progId="Equation.3">
+                <p:oleObj name="Equation" r:id="rId6" imgW="2959100" imgH="685800" progId="Equation.3">
                   <p:embed/>
                   <p:pic>
                     <p:nvPicPr>
@@ -17059,7 +18844,7 @@
                       <p:nvPr/>
                     </p:nvPicPr>
                     <p:blipFill>
-                      <a:blip r:embed="rId6"/>
+                      <a:blip r:embed="rId7"/>
                       <a:stretch>
                         <a:fillRect/>
                       </a:stretch>
@@ -17090,13 +18875,13 @@
   <p:clrMapOvr>
     <a:masterClrMapping/>
   </p:clrMapOvr>
-  <mc:AlternateContent xmlns:mc="http://schemas.openxmlformats.org/markup-compatibility/2006">
-    <mc:Choice xmlns:p14="http://schemas.microsoft.com/office/powerpoint/2010/main" Requires="p14">
+  <mc:AlternateContent xmlns:mc="http://schemas.openxmlformats.org/markup-compatibility/2006" xmlns:p14="http://schemas.microsoft.com/office/powerpoint/2010/main">
+    <mc:Choice Requires="p14">
       <p:transition spd="med" p14:dur="600">
         <p:fade/>
       </p:transition>
     </mc:Choice>
-    <mc:Fallback>
+    <mc:Fallback xmlns="">
       <p:transition xmlns:p14="http://schemas.microsoft.com/office/powerpoint/2010/main" spd="med">
         <p:fade/>
       </p:transition>
@@ -17289,12 +19074,12 @@
           <a:graphicData uri="http://schemas.openxmlformats.org/presentationml/2006/ole">
             <mc:AlternateContent xmlns:mc="http://schemas.openxmlformats.org/markup-compatibility/2006">
               <mc:Choice xmlns:v="urn:schemas-microsoft-com:vml" Requires="v">
-                <p:oleObj spid="_x0000_s613430" name="Equation" r:id="rId3" imgW="1473200" imgH="355600" progId="Equation.DSMT4">
+                <p:oleObj spid="_x0000_s613437" name="Equation" r:id="rId4" imgW="1473200" imgH="355600" progId="Equation.DSMT4">
                   <p:embed/>
                 </p:oleObj>
               </mc:Choice>
               <mc:Fallback>
-                <p:oleObj name="Equation" r:id="rId3" imgW="1473200" imgH="355600" progId="Equation.DSMT4">
+                <p:oleObj name="Equation" r:id="rId4" imgW="1473200" imgH="355600" progId="Equation.DSMT4">
                   <p:embed/>
                   <p:pic>
                     <p:nvPicPr>
@@ -17303,7 +19088,7 @@
                       <p:nvPr/>
                     </p:nvPicPr>
                     <p:blipFill>
-                      <a:blip r:embed="rId4"/>
+                      <a:blip r:embed="rId5"/>
                       <a:stretch>
                         <a:fillRect/>
                       </a:stretch>
@@ -17346,12 +19131,12 @@
           <a:graphicData uri="http://schemas.openxmlformats.org/presentationml/2006/ole">
             <mc:AlternateContent xmlns:mc="http://schemas.openxmlformats.org/markup-compatibility/2006">
               <mc:Choice xmlns:v="urn:schemas-microsoft-com:vml" Requires="v">
-                <p:oleObj spid="_x0000_s613431" name="Equation" r:id="rId5" imgW="355600" imgH="177800" progId="Equation.DSMT4">
+                <p:oleObj spid="_x0000_s613438" name="Equation" r:id="rId6" imgW="355600" imgH="177800" progId="Equation.DSMT4">
                   <p:embed/>
                 </p:oleObj>
               </mc:Choice>
               <mc:Fallback>
-                <p:oleObj name="Equation" r:id="rId5" imgW="355600" imgH="177800" progId="Equation.DSMT4">
+                <p:oleObj name="Equation" r:id="rId6" imgW="355600" imgH="177800" progId="Equation.DSMT4">
                   <p:embed/>
                   <p:pic>
                     <p:nvPicPr>
@@ -17360,7 +19145,7 @@
                       <p:nvPr/>
                     </p:nvPicPr>
                     <p:blipFill>
-                      <a:blip r:embed="rId6"/>
+                      <a:blip r:embed="rId7"/>
                       <a:stretch>
                         <a:fillRect/>
                       </a:stretch>
@@ -18420,7 +20205,7 @@
   <p:clrMapOvr>
     <a:masterClrMapping/>
   </p:clrMapOvr>
-  <p:transition xmlns:p14="http://schemas.microsoft.com/office/powerpoint/2010/main" advTm="38987">
+  <p:transition xmlns:p14="http://schemas.microsoft.com/office/powerpoint/2010/main">
     <p:fade thruBlk="1"/>
   </p:transition>
   <p:timing>
@@ -18822,12 +20607,12 @@
             <a:graphicData uri="http://schemas.openxmlformats.org/presentationml/2006/ole">
               <mc:AlternateContent xmlns:mc="http://schemas.openxmlformats.org/markup-compatibility/2006">
                 <mc:Choice xmlns:v="urn:schemas-microsoft-com:vml" Requires="v">
-                  <p:oleObj spid="_x0000_s614459" name="Equation" r:id="rId3" imgW="342900" imgH="177800" progId="Equation.DSMT4">
+                  <p:oleObj spid="_x0000_s614466" name="Equation" r:id="rId4" imgW="342900" imgH="177800" progId="Equation.DSMT4">
                     <p:embed/>
                   </p:oleObj>
                 </mc:Choice>
                 <mc:Fallback>
-                  <p:oleObj name="Equation" r:id="rId3" imgW="342900" imgH="177800" progId="Equation.DSMT4">
+                  <p:oleObj name="Equation" r:id="rId4" imgW="342900" imgH="177800" progId="Equation.DSMT4">
                     <p:embed/>
                     <p:pic>
                       <p:nvPicPr>
@@ -18836,7 +20621,7 @@
                         <p:nvPr/>
                       </p:nvPicPr>
                       <p:blipFill>
-                        <a:blip r:embed="rId4"/>
+                        <a:blip r:embed="rId5"/>
                         <a:stretch>
                           <a:fillRect/>
                         </a:stretch>
@@ -18931,12 +20716,12 @@
           <a:graphicData uri="http://schemas.openxmlformats.org/presentationml/2006/ole">
             <mc:AlternateContent xmlns:mc="http://schemas.openxmlformats.org/markup-compatibility/2006">
               <mc:Choice xmlns:v="urn:schemas-microsoft-com:vml" Requires="v">
-                <p:oleObj spid="_x0000_s614460" name="Equation" r:id="rId5" imgW="2565400" imgH="457200" progId="Equation.DSMT4">
+                <p:oleObj spid="_x0000_s614467" name="Equation" r:id="rId6" imgW="2565400" imgH="457200" progId="Equation.DSMT4">
                   <p:embed/>
                 </p:oleObj>
               </mc:Choice>
               <mc:Fallback>
-                <p:oleObj name="Equation" r:id="rId5" imgW="2565400" imgH="457200" progId="Equation.DSMT4">
+                <p:oleObj name="Equation" r:id="rId6" imgW="2565400" imgH="457200" progId="Equation.DSMT4">
                   <p:embed/>
                   <p:pic>
                     <p:nvPicPr>
@@ -18945,7 +20730,7 @@
                       <p:nvPr/>
                     </p:nvPicPr>
                     <p:blipFill>
-                      <a:blip r:embed="rId6"/>
+                      <a:blip r:embed="rId7"/>
                       <a:stretch>
                         <a:fillRect/>
                       </a:stretch>
@@ -20336,12 +22121,12 @@
   </p:clrMapOvr>
   <mc:AlternateContent xmlns:mc="http://schemas.openxmlformats.org/markup-compatibility/2006">
     <mc:Choice xmlns:p14="http://schemas.microsoft.com/office/powerpoint/2010/main" Requires="p14">
-      <p:transition spd="med" p14:dur="700" advTm="38987">
+      <p:transition spd="med" p14:dur="700">
         <p:fade/>
       </p:transition>
     </mc:Choice>
     <mc:Fallback>
-      <p:transition xmlns:p14="http://schemas.microsoft.com/office/powerpoint/2010/main" spd="med" advTm="38987">
+      <p:transition xmlns:p14="http://schemas.microsoft.com/office/powerpoint/2010/main" spd="med">
         <p:fade/>
       </p:transition>
     </mc:Fallback>
@@ -21603,12 +23388,12 @@
   </p:clrMapOvr>
   <mc:AlternateContent xmlns:mc="http://schemas.openxmlformats.org/markup-compatibility/2006">
     <mc:Choice xmlns:p14="http://schemas.microsoft.com/office/powerpoint/2010/main" Requires="p14">
-      <p:transition spd="med" p14:dur="700" advTm="38987">
+      <p:transition spd="med" p14:dur="700">
         <p:fade/>
       </p:transition>
     </mc:Choice>
     <mc:Fallback>
-      <p:transition xmlns:p14="http://schemas.microsoft.com/office/powerpoint/2010/main" spd="med" advTm="38987">
+      <p:transition xmlns:p14="http://schemas.microsoft.com/office/powerpoint/2010/main" spd="med">
         <p:fade/>
       </p:transition>
     </mc:Fallback>
@@ -22870,12 +24655,12 @@
   </p:clrMapOvr>
   <mc:AlternateContent xmlns:mc="http://schemas.openxmlformats.org/markup-compatibility/2006">
     <mc:Choice xmlns:p14="http://schemas.microsoft.com/office/powerpoint/2010/main" Requires="p14">
-      <p:transition spd="med" p14:dur="700" advTm="38987">
+      <p:transition spd="med" p14:dur="700">
         <p:fade/>
       </p:transition>
     </mc:Choice>
     <mc:Fallback>
-      <p:transition xmlns:p14="http://schemas.microsoft.com/office/powerpoint/2010/main" spd="med" advTm="38987">
+      <p:transition xmlns:p14="http://schemas.microsoft.com/office/powerpoint/2010/main" spd="med">
         <p:fade/>
       </p:transition>
     </mc:Fallback>
@@ -22991,12 +24776,12 @@
           <a:graphicData uri="http://schemas.openxmlformats.org/presentationml/2006/ole">
             <mc:AlternateContent xmlns:mc="http://schemas.openxmlformats.org/markup-compatibility/2006">
               <mc:Choice xmlns:v="urn:schemas-microsoft-com:vml" Requires="v">
-                <p:oleObj spid="_x0000_s627825" name="Equation" r:id="rId3" imgW="1346200" imgH="228600" progId="Equation.3">
+                <p:oleObj spid="_x0000_s627848" name="Equation" r:id="rId4" imgW="1346200" imgH="228600" progId="Equation.3">
                   <p:embed/>
                 </p:oleObj>
               </mc:Choice>
               <mc:Fallback>
-                <p:oleObj name="Equation" r:id="rId3" imgW="1346200" imgH="228600" progId="Equation.3">
+                <p:oleObj name="Equation" r:id="rId4" imgW="1346200" imgH="228600" progId="Equation.3">
                   <p:embed/>
                   <p:pic>
                     <p:nvPicPr>
@@ -23005,7 +24790,7 @@
                       <p:nvPr/>
                     </p:nvPicPr>
                     <p:blipFill>
-                      <a:blip r:embed="rId4"/>
+                      <a:blip r:embed="rId5"/>
                       <a:stretch>
                         <a:fillRect/>
                       </a:stretch>
@@ -23035,25 +24820,25 @@
           <p:nvPr>
             <p:extLst>
               <p:ext uri="{D42A27DB-BD31-4B8C-83A1-F6EECF244321}">
-                <p14:modId xmlns:p14="http://schemas.microsoft.com/office/powerpoint/2010/main" val="2276661768"/>
+                <p14:modId xmlns:p14="http://schemas.microsoft.com/office/powerpoint/2010/main" val="4170411615"/>
               </p:ext>
             </p:extLst>
           </p:nvPr>
         </p:nvGraphicFramePr>
         <p:xfrm>
-          <a:off x="101604" y="2508968"/>
-          <a:ext cx="8957733" cy="910507"/>
+          <a:off x="177800" y="2508250"/>
+          <a:ext cx="8805863" cy="911225"/>
         </p:xfrm>
         <a:graphic>
           <a:graphicData uri="http://schemas.openxmlformats.org/presentationml/2006/ole">
             <mc:AlternateContent xmlns:mc="http://schemas.openxmlformats.org/markup-compatibility/2006">
               <mc:Choice xmlns:v="urn:schemas-microsoft-com:vml" Requires="v">
-                <p:oleObj spid="_x0000_s627826" name="Equation" r:id="rId5" imgW="2247900" imgH="228600" progId="Equation.3">
+                <p:oleObj spid="_x0000_s627849" name="Equation" r:id="rId6" imgW="2209800" imgH="228600" progId="Equation.DSMT4">
                   <p:embed/>
                 </p:oleObj>
               </mc:Choice>
               <mc:Fallback>
-                <p:oleObj name="Equation" r:id="rId5" imgW="2247900" imgH="228600" progId="Equation.3">
+                <p:oleObj name="Equation" r:id="rId6" imgW="2209800" imgH="228600" progId="Equation.DSMT4">
                   <p:embed/>
                   <p:pic>
                     <p:nvPicPr>
@@ -23062,15 +24847,15 @@
                       <p:nvPr/>
                     </p:nvPicPr>
                     <p:blipFill>
-                      <a:blip r:embed="rId6"/>
+                      <a:blip r:embed="rId7"/>
                       <a:stretch>
                         <a:fillRect/>
                       </a:stretch>
                     </p:blipFill>
                     <p:spPr>
                       <a:xfrm>
-                        <a:off x="101604" y="2508968"/>
-                        <a:ext cx="8957733" cy="910507"/>
+                        <a:off x="177800" y="2508250"/>
+                        <a:ext cx="8805863" cy="911225"/>
                       </a:xfrm>
                       <a:prstGeom prst="rect">
                         <a:avLst/>
@@ -23123,25 +24908,25 @@
           <p:nvPr>
             <p:extLst>
               <p:ext uri="{D42A27DB-BD31-4B8C-83A1-F6EECF244321}">
-                <p14:modId xmlns:p14="http://schemas.microsoft.com/office/powerpoint/2010/main" val="4247028765"/>
+                <p14:modId xmlns:p14="http://schemas.microsoft.com/office/powerpoint/2010/main" val="1741961759"/>
               </p:ext>
             </p:extLst>
           </p:nvPr>
         </p:nvGraphicFramePr>
         <p:xfrm>
-          <a:off x="643459" y="3579813"/>
-          <a:ext cx="7821874" cy="2329920"/>
+          <a:off x="703792" y="3245912"/>
+          <a:ext cx="4214812" cy="1000125"/>
         </p:xfrm>
         <a:graphic>
           <a:graphicData uri="http://schemas.openxmlformats.org/presentationml/2006/ole">
             <mc:AlternateContent xmlns:mc="http://schemas.openxmlformats.org/markup-compatibility/2006">
               <mc:Choice xmlns:v="urn:schemas-microsoft-com:vml" Requires="v">
-                <p:oleObj spid="_x0000_s627827" name="Equation" r:id="rId7" imgW="1790700" imgH="533400" progId="Equation.DSMT4">
+                <p:oleObj spid="_x0000_s627850" name="Equation" r:id="rId8" imgW="965200" imgH="228600" progId="Equation.3">
                   <p:embed/>
                 </p:oleObj>
               </mc:Choice>
               <mc:Fallback>
-                <p:oleObj name="Equation" r:id="rId7" imgW="1790700" imgH="533400" progId="Equation.DSMT4">
+                <p:oleObj name="Equation" r:id="rId8" imgW="965200" imgH="228600" progId="Equation.3">
                   <p:embed/>
                   <p:pic>
                     <p:nvPicPr>
@@ -23150,15 +24935,15 @@
                       <p:nvPr/>
                     </p:nvPicPr>
                     <p:blipFill>
-                      <a:blip r:embed="rId8"/>
+                      <a:blip r:embed="rId9"/>
                       <a:stretch>
                         <a:fillRect/>
                       </a:stretch>
                     </p:blipFill>
                     <p:spPr>
                       <a:xfrm>
-                        <a:off x="643459" y="3579813"/>
-                        <a:ext cx="7821874" cy="2329920"/>
+                        <a:off x="703792" y="3245912"/>
+                        <a:ext cx="4214812" cy="1000125"/>
                       </a:xfrm>
                       <a:prstGeom prst="rect">
                         <a:avLst/>
@@ -23180,25 +24965,25 @@
           <p:nvPr>
             <p:extLst>
               <p:ext uri="{D42A27DB-BD31-4B8C-83A1-F6EECF244321}">
-                <p14:modId xmlns:p14="http://schemas.microsoft.com/office/powerpoint/2010/main" val="753635955"/>
+                <p14:modId xmlns:p14="http://schemas.microsoft.com/office/powerpoint/2010/main" val="2716735446"/>
               </p:ext>
             </p:extLst>
           </p:nvPr>
         </p:nvGraphicFramePr>
         <p:xfrm>
-          <a:off x="3488265" y="4216398"/>
+          <a:off x="3598331" y="3843865"/>
           <a:ext cx="5271073" cy="2294467"/>
         </p:xfrm>
         <a:graphic>
           <a:graphicData uri="http://schemas.openxmlformats.org/presentationml/2006/ole">
             <mc:AlternateContent xmlns:mc="http://schemas.openxmlformats.org/markup-compatibility/2006">
               <mc:Choice xmlns:v="urn:schemas-microsoft-com:vml" Requires="v">
-                <p:oleObj spid="_x0000_s627828" name="Equation" r:id="rId9" imgW="1079500" imgH="469900" progId="Equation.DSMT4">
+                <p:oleObj spid="_x0000_s627851" name="Equation" r:id="rId10" imgW="1079500" imgH="469900" progId="Equation.DSMT4">
                   <p:embed/>
                 </p:oleObj>
               </mc:Choice>
               <mc:Fallback>
-                <p:oleObj name="Equation" r:id="rId9" imgW="1079500" imgH="469900" progId="Equation.DSMT4">
+                <p:oleObj name="Equation" r:id="rId10" imgW="1079500" imgH="469900" progId="Equation.DSMT4">
                   <p:embed/>
                   <p:pic>
                     <p:nvPicPr>
@@ -23207,15 +24992,72 @@
                       <p:nvPr/>
                     </p:nvPicPr>
                     <p:blipFill>
-                      <a:blip r:embed="rId10"/>
+                      <a:blip r:embed="rId11"/>
                       <a:stretch>
                         <a:fillRect/>
                       </a:stretch>
                     </p:blipFill>
                     <p:spPr>
                       <a:xfrm>
-                        <a:off x="3488265" y="4216398"/>
+                        <a:off x="3598331" y="3843865"/>
                         <a:ext cx="5271073" cy="2294467"/>
+                      </a:xfrm>
+                      <a:prstGeom prst="rect">
+                        <a:avLst/>
+                      </a:prstGeom>
+                    </p:spPr>
+                  </p:pic>
+                </p:oleObj>
+              </mc:Fallback>
+            </mc:AlternateContent>
+          </a:graphicData>
+        </a:graphic>
+      </p:graphicFrame>
+      <p:graphicFrame>
+        <p:nvGraphicFramePr>
+          <p:cNvPr id="6" name="Object 5"/>
+          <p:cNvGraphicFramePr>
+            <a:graphicFrameLocks noChangeAspect="1"/>
+          </p:cNvGraphicFramePr>
+          <p:nvPr>
+            <p:extLst>
+              <p:ext uri="{D42A27DB-BD31-4B8C-83A1-F6EECF244321}">
+                <p14:modId xmlns:p14="http://schemas.microsoft.com/office/powerpoint/2010/main" val="2607339083"/>
+              </p:ext>
+            </p:extLst>
+          </p:nvPr>
+        </p:nvGraphicFramePr>
+        <p:xfrm>
+          <a:off x="1240674" y="3867680"/>
+          <a:ext cx="7606992" cy="1557337"/>
+        </p:xfrm>
+        <a:graphic>
+          <a:graphicData uri="http://schemas.openxmlformats.org/presentationml/2006/ole">
+            <mc:AlternateContent xmlns:mc="http://schemas.openxmlformats.org/markup-compatibility/2006">
+              <mc:Choice xmlns:v="urn:schemas-microsoft-com:vml" Requires="v">
+                <p:oleObj spid="_x0000_s627852" name="Equation" r:id="rId12" imgW="1612900" imgH="330200" progId="Equation.DSMT4">
+                  <p:embed/>
+                </p:oleObj>
+              </mc:Choice>
+              <mc:Fallback>
+                <p:oleObj name="Equation" r:id="rId12" imgW="1612900" imgH="330200" progId="Equation.DSMT4">
+                  <p:embed/>
+                  <p:pic>
+                    <p:nvPicPr>
+                      <p:cNvPr id="0" name=""/>
+                      <p:cNvPicPr/>
+                      <p:nvPr/>
+                    </p:nvPicPr>
+                    <p:blipFill>
+                      <a:blip r:embed="rId13"/>
+                      <a:stretch>
+                        <a:fillRect/>
+                      </a:stretch>
+                    </p:blipFill>
+                    <p:spPr>
+                      <a:xfrm>
+                        <a:off x="1240674" y="3867680"/>
+                        <a:ext cx="7606992" cy="1557337"/>
                       </a:xfrm>
                       <a:prstGeom prst="rect">
                         <a:avLst/>
@@ -23237,25 +25079,25 @@
           <p:nvPr>
             <p:extLst>
               <p:ext uri="{D42A27DB-BD31-4B8C-83A1-F6EECF244321}">
-                <p14:modId xmlns:p14="http://schemas.microsoft.com/office/powerpoint/2010/main" val="1321245109"/>
+                <p14:modId xmlns:p14="http://schemas.microsoft.com/office/powerpoint/2010/main" val="2592119374"/>
               </p:ext>
             </p:extLst>
           </p:nvPr>
         </p:nvGraphicFramePr>
         <p:xfrm>
-          <a:off x="1234011" y="3507839"/>
+          <a:off x="1284811" y="3169172"/>
           <a:ext cx="1407585" cy="1495560"/>
         </p:xfrm>
         <a:graphic>
           <a:graphicData uri="http://schemas.openxmlformats.org/presentationml/2006/ole">
             <mc:AlternateContent xmlns:mc="http://schemas.openxmlformats.org/markup-compatibility/2006">
               <mc:Choice xmlns:v="urn:schemas-microsoft-com:vml" Requires="v">
-                <p:oleObj spid="_x0000_s627829" name="Equation" r:id="rId11" imgW="406400" imgH="431800" progId="Equation.DSMT4">
+                <p:oleObj spid="_x0000_s627853" name="Equation" r:id="rId14" imgW="406400" imgH="431800" progId="Equation.DSMT4">
                   <p:embed/>
                 </p:oleObj>
               </mc:Choice>
               <mc:Fallback>
-                <p:oleObj name="Equation" r:id="rId11" imgW="406400" imgH="431800" progId="Equation.DSMT4">
+                <p:oleObj name="Equation" r:id="rId14" imgW="406400" imgH="431800" progId="Equation.DSMT4">
                   <p:embed/>
                   <p:pic>
                     <p:nvPicPr>
@@ -23264,14 +25106,14 @@
                       <p:nvPr/>
                     </p:nvPicPr>
                     <p:blipFill>
-                      <a:blip r:embed="rId12"/>
+                      <a:blip r:embed="rId15"/>
                       <a:stretch>
                         <a:fillRect/>
                       </a:stretch>
                     </p:blipFill>
                     <p:spPr>
                       <a:xfrm>
-                        <a:off x="1234011" y="3507839"/>
+                        <a:off x="1284811" y="3169172"/>
                         <a:ext cx="1407585" cy="1495560"/>
                       </a:xfrm>
                       <a:prstGeom prst="rect">
@@ -23381,7 +25223,7 @@
                             </p:stCondLst>
                             <p:childTnLst>
                               <p:par>
-                                <p:cTn id="10" presetID="22" presetClass="entr" presetSubtype="4" fill="hold" nodeType="clickEffect">
+                                <p:cTn id="10" presetID="22" presetClass="entr" presetSubtype="8" fill="hold" nodeType="clickEffect">
                                   <p:stCondLst>
                                     <p:cond delay="0"/>
                                   </p:stCondLst>
@@ -23389,6 +25231,112 @@
                                     <p:set>
                                       <p:cBhvr>
                                         <p:cTn id="11" dur="1" fill="hold">
+                                          <p:stCondLst>
+                                            <p:cond delay="0"/>
+                                          </p:stCondLst>
+                                        </p:cTn>
+                                        <p:tgtEl>
+                                          <p:spTgt spid="4"/>
+                                        </p:tgtEl>
+                                        <p:attrNameLst>
+                                          <p:attrName>style.visibility</p:attrName>
+                                        </p:attrNameLst>
+                                      </p:cBhvr>
+                                      <p:to>
+                                        <p:strVal val="visible"/>
+                                      </p:to>
+                                    </p:set>
+                                    <p:animEffect transition="in" filter="wipe(left)">
+                                      <p:cBhvr>
+                                        <p:cTn id="12" dur="500"/>
+                                        <p:tgtEl>
+                                          <p:spTgt spid="4"/>
+                                        </p:tgtEl>
+                                      </p:cBhvr>
+                                    </p:animEffect>
+                                  </p:childTnLst>
+                                </p:cTn>
+                              </p:par>
+                            </p:childTnLst>
+                          </p:cTn>
+                        </p:par>
+                      </p:childTnLst>
+                    </p:cTn>
+                  </p:par>
+                  <p:par>
+                    <p:cTn id="13" fill="hold">
+                      <p:stCondLst>
+                        <p:cond delay="indefinite"/>
+                      </p:stCondLst>
+                      <p:childTnLst>
+                        <p:par>
+                          <p:cTn id="14" fill="hold">
+                            <p:stCondLst>
+                              <p:cond delay="0"/>
+                            </p:stCondLst>
+                            <p:childTnLst>
+                              <p:par>
+                                <p:cTn id="15" presetID="22" presetClass="entr" presetSubtype="8" fill="hold" nodeType="clickEffect">
+                                  <p:stCondLst>
+                                    <p:cond delay="0"/>
+                                  </p:stCondLst>
+                                  <p:childTnLst>
+                                    <p:set>
+                                      <p:cBhvr>
+                                        <p:cTn id="16" dur="1" fill="hold">
+                                          <p:stCondLst>
+                                            <p:cond delay="0"/>
+                                          </p:stCondLst>
+                                        </p:cTn>
+                                        <p:tgtEl>
+                                          <p:spTgt spid="6"/>
+                                        </p:tgtEl>
+                                        <p:attrNameLst>
+                                          <p:attrName>style.visibility</p:attrName>
+                                        </p:attrNameLst>
+                                      </p:cBhvr>
+                                      <p:to>
+                                        <p:strVal val="visible"/>
+                                      </p:to>
+                                    </p:set>
+                                    <p:animEffect transition="in" filter="wipe(left)">
+                                      <p:cBhvr>
+                                        <p:cTn id="17" dur="1000"/>
+                                        <p:tgtEl>
+                                          <p:spTgt spid="6"/>
+                                        </p:tgtEl>
+                                      </p:cBhvr>
+                                    </p:animEffect>
+                                  </p:childTnLst>
+                                </p:cTn>
+                              </p:par>
+                            </p:childTnLst>
+                          </p:cTn>
+                        </p:par>
+                      </p:childTnLst>
+                    </p:cTn>
+                  </p:par>
+                  <p:par>
+                    <p:cTn id="18" fill="hold">
+                      <p:stCondLst>
+                        <p:cond delay="indefinite"/>
+                      </p:stCondLst>
+                      <p:childTnLst>
+                        <p:par>
+                          <p:cTn id="19" fill="hold">
+                            <p:stCondLst>
+                              <p:cond delay="0"/>
+                            </p:stCondLst>
+                            <p:childTnLst>
+                              <p:par>
+                                <p:cTn id="20" presetID="22" presetClass="entr" presetSubtype="8" fill="hold" nodeType="clickEffect">
+                                  <p:stCondLst>
+                                    <p:cond delay="0"/>
+                                  </p:stCondLst>
+                                  <p:childTnLst>
+                                    <p:set>
+                                      <p:cBhvr>
+                                        <p:cTn id="21" dur="1" fill="hold">
                                           <p:stCondLst>
                                             <p:cond delay="0"/>
                                           </p:stCondLst>
@@ -23404,9 +25352,9 @@
                                         <p:strVal val="visible"/>
                                       </p:to>
                                     </p:set>
-                                    <p:animEffect transition="in" filter="wipe(down)">
+                                    <p:animEffect transition="in" filter="wipe(left)">
                                       <p:cBhvr>
-                                        <p:cTn id="12" dur="1000"/>
+                                        <p:cTn id="22" dur="1000"/>
                                         <p:tgtEl>
                                           <p:spTgt spid="7"/>
                                         </p:tgtEl>
@@ -23416,14 +25364,14 @@
                                 </p:cTn>
                               </p:par>
                               <p:par>
-                                <p:cTn id="13" presetID="22" presetClass="entr" presetSubtype="4" fill="hold" nodeType="withEffect">
+                                <p:cTn id="23" presetID="22" presetClass="entr" presetSubtype="4" fill="hold" nodeType="withEffect">
                                   <p:stCondLst>
                                     <p:cond delay="0"/>
                                   </p:stCondLst>
                                   <p:childTnLst>
                                     <p:set>
                                       <p:cBhvr>
-                                        <p:cTn id="14" dur="1" fill="hold">
+                                        <p:cTn id="24" dur="1" fill="hold">
                                           <p:stCondLst>
                                             <p:cond delay="0"/>
                                           </p:stCondLst>
@@ -23441,7 +25389,7 @@
                                     </p:set>
                                     <p:animEffect transition="in" filter="wipe(down)">
                                       <p:cBhvr>
-                                        <p:cTn id="15" dur="1000"/>
+                                        <p:cTn id="25" dur="1000"/>
                                         <p:tgtEl>
                                           <p:spTgt spid="5"/>
                                         </p:tgtEl>
@@ -24350,7 +26298,7 @@
   <p:clrMapOvr>
     <a:masterClrMapping/>
   </p:clrMapOvr>
-  <p:transition xmlns:p14="http://schemas.microsoft.com/office/powerpoint/2010/main" advTm="38987">
+  <p:transition xmlns:p14="http://schemas.microsoft.com/office/powerpoint/2010/main">
     <p:fade thruBlk="1"/>
   </p:transition>
   <p:timing>
@@ -24727,12 +26675,12 @@
           <a:graphicData uri="http://schemas.openxmlformats.org/presentationml/2006/ole">
             <mc:AlternateContent xmlns:mc="http://schemas.openxmlformats.org/markup-compatibility/2006">
               <mc:Choice xmlns:v="urn:schemas-microsoft-com:vml" Requires="v">
-                <p:oleObj spid="_x0000_s607328" name="Equation" r:id="rId3" imgW="1016000" imgH="215900" progId="Equation.DSMT4">
+                <p:oleObj spid="_x0000_s607337" name="Equation" r:id="rId4" imgW="1016000" imgH="215900" progId="Equation.DSMT4">
                   <p:embed/>
                 </p:oleObj>
               </mc:Choice>
               <mc:Fallback>
-                <p:oleObj name="Equation" r:id="rId3" imgW="1016000" imgH="215900" progId="Equation.DSMT4">
+                <p:oleObj name="Equation" r:id="rId4" imgW="1016000" imgH="215900" progId="Equation.DSMT4">
                   <p:embed/>
                   <p:pic>
                     <p:nvPicPr>
@@ -24741,7 +26689,7 @@
                       <p:nvPr/>
                     </p:nvPicPr>
                     <p:blipFill>
-                      <a:blip r:embed="rId4"/>
+                      <a:blip r:embed="rId5"/>
                       <a:stretch>
                         <a:fillRect/>
                       </a:stretch>
@@ -24784,12 +26732,12 @@
           <a:graphicData uri="http://schemas.openxmlformats.org/presentationml/2006/ole">
             <mc:AlternateContent xmlns:mc="http://schemas.openxmlformats.org/markup-compatibility/2006">
               <mc:Choice xmlns:v="urn:schemas-microsoft-com:vml" Requires="v">
-                <p:oleObj spid="_x0000_s607329" name="Equation" r:id="rId5" imgW="2095500" imgH="355600" progId="Equation.3">
+                <p:oleObj spid="_x0000_s607338" name="Equation" r:id="rId6" imgW="2095500" imgH="355600" progId="Equation.3">
                   <p:embed/>
                 </p:oleObj>
               </mc:Choice>
               <mc:Fallback>
-                <p:oleObj name="Equation" r:id="rId5" imgW="2095500" imgH="355600" progId="Equation.3">
+                <p:oleObj name="Equation" r:id="rId6" imgW="2095500" imgH="355600" progId="Equation.3">
                   <p:embed/>
                   <p:pic>
                     <p:nvPicPr>
@@ -24798,7 +26746,7 @@
                       <p:nvPr/>
                     </p:nvPicPr>
                     <p:blipFill>
-                      <a:blip r:embed="rId6"/>
+                      <a:blip r:embed="rId7"/>
                       <a:stretch>
                         <a:fillRect/>
                       </a:stretch>
@@ -25241,12 +27189,12 @@
           <a:graphicData uri="http://schemas.openxmlformats.org/presentationml/2006/ole">
             <mc:AlternateContent xmlns:mc="http://schemas.openxmlformats.org/markup-compatibility/2006">
               <mc:Choice xmlns:v="urn:schemas-microsoft-com:vml" Requires="v">
-                <p:oleObj spid="_x0000_s658447" name="Equation" r:id="rId3" imgW="2095500" imgH="355600" progId="Equation.3">
+                <p:oleObj spid="_x0000_s658456" name="Equation" r:id="rId4" imgW="2095500" imgH="355600" progId="Equation.3">
                   <p:embed/>
                 </p:oleObj>
               </mc:Choice>
               <mc:Fallback>
-                <p:oleObj name="Equation" r:id="rId3" imgW="2095500" imgH="355600" progId="Equation.3">
+                <p:oleObj name="Equation" r:id="rId4" imgW="2095500" imgH="355600" progId="Equation.3">
                   <p:embed/>
                   <p:pic>
                     <p:nvPicPr>
@@ -25255,7 +27203,7 @@
                       <p:nvPr/>
                     </p:nvPicPr>
                     <p:blipFill>
-                      <a:blip r:embed="rId4"/>
+                      <a:blip r:embed="rId5"/>
                       <a:stretch>
                         <a:fillRect/>
                       </a:stretch>
@@ -25298,12 +27246,12 @@
           <a:graphicData uri="http://schemas.openxmlformats.org/presentationml/2006/ole">
             <mc:AlternateContent xmlns:mc="http://schemas.openxmlformats.org/markup-compatibility/2006">
               <mc:Choice xmlns:v="urn:schemas-microsoft-com:vml" Requires="v">
-                <p:oleObj spid="_x0000_s658448" name="Equation" r:id="rId5" imgW="635000" imgH="279400" progId="Equation.DSMT4">
+                <p:oleObj spid="_x0000_s658457" name="Equation" r:id="rId6" imgW="635000" imgH="279400" progId="Equation.DSMT4">
                   <p:embed/>
                 </p:oleObj>
               </mc:Choice>
               <mc:Fallback>
-                <p:oleObj name="Equation" r:id="rId5" imgW="635000" imgH="279400" progId="Equation.DSMT4">
+                <p:oleObj name="Equation" r:id="rId6" imgW="635000" imgH="279400" progId="Equation.DSMT4">
                   <p:embed/>
                   <p:pic>
                     <p:nvPicPr>
@@ -25312,7 +27260,7 @@
                       <p:nvPr/>
                     </p:nvPicPr>
                     <p:blipFill>
-                      <a:blip r:embed="rId6"/>
+                      <a:blip r:embed="rId7"/>
                       <a:stretch>
                         <a:fillRect/>
                       </a:stretch>
@@ -25471,11 +27419,7 @@
             </a:r>
             <a:r>
               <a:rPr lang="en-US" sz="4400" dirty="0" smtClean="0"/>
-              <a:t> </a:t>
-            </a:r>
-            <a:r>
-              <a:rPr lang="en-US" sz="4400" dirty="0" smtClean="0"/>
-              <a:t>elements of</a:t>
+              <a:t> elements of</a:t>
             </a:r>
           </a:p>
           <a:p>
@@ -25565,14 +27509,14 @@
   <p:clrMapOvr>
     <a:masterClrMapping/>
   </p:clrMapOvr>
-  <mc:AlternateContent xmlns:mc="http://schemas.openxmlformats.org/markup-compatibility/2006" xmlns:p14="http://schemas.microsoft.com/office/powerpoint/2010/main">
-    <mc:Choice Requires="p14">
-      <p:transition spd="slow" p14:dur="1200" advTm="20709">
+  <mc:AlternateContent xmlns:mc="http://schemas.openxmlformats.org/markup-compatibility/2006">
+    <mc:Choice xmlns:p14="http://schemas.microsoft.com/office/powerpoint/2010/main" Requires="p14">
+      <p:transition spd="slow" p14:dur="1200">
         <p:fade thruBlk="1"/>
       </p:transition>
     </mc:Choice>
-    <mc:Fallback xmlns="">
-      <p:transition xmlns:p14="http://schemas.microsoft.com/office/powerpoint/2010/main" spd="slow" advTm="20709">
+    <mc:Fallback>
+      <p:transition xmlns:p14="http://schemas.microsoft.com/office/powerpoint/2010/main" spd="slow">
         <p:fade thruBlk="1"/>
       </p:transition>
     </mc:Fallback>
@@ -27012,12 +28956,12 @@
   </p:clrMapOvr>
   <mc:AlternateContent xmlns:mc="http://schemas.openxmlformats.org/markup-compatibility/2006">
     <mc:Choice xmlns:p14="http://schemas.microsoft.com/office/powerpoint/2010/main" Requires="p14">
-      <p:transition spd="med" p14:dur="700" advTm="44090">
+      <p:transition spd="med" p14:dur="700">
         <p:fade/>
       </p:transition>
     </mc:Choice>
     <mc:Fallback>
-      <p:transition xmlns:p14="http://schemas.microsoft.com/office/powerpoint/2010/main" spd="med" advTm="44090">
+      <p:transition xmlns:p14="http://schemas.microsoft.com/office/powerpoint/2010/main" spd="med">
         <p:fade/>
       </p:transition>
     </mc:Fallback>
@@ -28104,14 +30048,14 @@
   <p:clrMapOvr>
     <a:masterClrMapping/>
   </p:clrMapOvr>
-  <mc:AlternateContent xmlns:mc="http://schemas.openxmlformats.org/markup-compatibility/2006" xmlns:p14="http://schemas.microsoft.com/office/powerpoint/2010/main">
-    <mc:Choice Requires="p14">
-      <p:transition spd="med" p14:dur="700" advTm="38987">
+  <mc:AlternateContent xmlns:mc="http://schemas.openxmlformats.org/markup-compatibility/2006">
+    <mc:Choice xmlns:p14="http://schemas.microsoft.com/office/powerpoint/2010/main" Requires="p14">
+      <p:transition spd="med" p14:dur="700">
         <p:fade/>
       </p:transition>
     </mc:Choice>
-    <mc:Fallback xmlns="">
-      <p:transition xmlns:p14="http://schemas.microsoft.com/office/powerpoint/2010/main" spd="med" advTm="38987">
+    <mc:Fallback>
+      <p:transition xmlns:p14="http://schemas.microsoft.com/office/powerpoint/2010/main" spd="med">
         <p:fade/>
       </p:transition>
     </mc:Fallback>
@@ -29342,7 +31286,7 @@
   <p:clrMapOvr>
     <a:masterClrMapping/>
   </p:clrMapOvr>
-  <p:transition xmlns:p14="http://schemas.microsoft.com/office/powerpoint/2010/main" advTm="8083">
+  <p:transition xmlns:p14="http://schemas.microsoft.com/office/powerpoint/2010/main">
     <p:fade/>
   </p:transition>
   <p:timing>
@@ -30546,7 +32490,7 @@
   <p:clrMapOvr>
     <a:masterClrMapping/>
   </p:clrMapOvr>
-  <p:transition xmlns:p14="http://schemas.microsoft.com/office/powerpoint/2010/main" advTm="43195">
+  <p:transition xmlns:p14="http://schemas.microsoft.com/office/powerpoint/2010/main">
     <p:fade/>
   </p:transition>
   <p:timing>
@@ -31965,7 +33909,7 @@
   <p:clrMapOvr>
     <a:masterClrMapping/>
   </p:clrMapOvr>
-  <p:transition xmlns:p14="http://schemas.microsoft.com/office/powerpoint/2010/main" advTm="43195">
+  <p:transition xmlns:p14="http://schemas.microsoft.com/office/powerpoint/2010/main">
     <p:fade/>
   </p:transition>
   <p:timing>
@@ -35137,7 +37081,7 @@
           <a:graphicData uri="http://schemas.openxmlformats.org/presentationml/2006/ole">
             <mc:AlternateContent xmlns:mc="http://schemas.openxmlformats.org/markup-compatibility/2006">
               <mc:Choice xmlns:v="urn:schemas-microsoft-com:vml" Requires="v">
-                <p:oleObj spid="_x0000_s599106" name="Equation" r:id="rId3" imgW="1422400" imgH="457200" progId="Equation.3">
+                <p:oleObj spid="_x0000_s599113" name="Equation" r:id="rId3" imgW="1422400" imgH="457200" progId="Equation.3">
                   <p:embed/>
                 </p:oleObj>
               </mc:Choice>
@@ -35232,7 +37176,7 @@
           <a:graphicData uri="http://schemas.openxmlformats.org/presentationml/2006/ole">
             <mc:AlternateContent xmlns:mc="http://schemas.openxmlformats.org/markup-compatibility/2006">
               <mc:Choice xmlns:v="urn:schemas-microsoft-com:vml" Requires="v">
-                <p:oleObj spid="_x0000_s599107" name="Equation" r:id="rId5" imgW="1422400" imgH="457200" progId="Equation.3">
+                <p:oleObj spid="_x0000_s599114" name="Equation" r:id="rId5" imgW="1422400" imgH="457200" progId="Equation.3">
                   <p:embed/>
                 </p:oleObj>
               </mc:Choice>
@@ -36474,7 +38418,7 @@
   <p:clrMapOvr>
     <a:masterClrMapping/>
   </p:clrMapOvr>
-  <p:transition xmlns:p14="http://schemas.microsoft.com/office/powerpoint/2010/main" advTm="35558">
+  <p:transition xmlns:p14="http://schemas.microsoft.com/office/powerpoint/2010/main">
     <p:fade thruBlk="1"/>
   </p:transition>
   <p:timing>
@@ -37686,14 +39630,14 @@
   <p:clrMapOvr>
     <a:masterClrMapping/>
   </p:clrMapOvr>
-  <mc:AlternateContent xmlns:mc="http://schemas.openxmlformats.org/markup-compatibility/2006" xmlns:p14="http://schemas.microsoft.com/office/powerpoint/2010/main">
-    <mc:Choice Requires="p14">
-      <p:transition spd="med" p14:dur="700" advTm="24686">
+  <mc:AlternateContent xmlns:mc="http://schemas.openxmlformats.org/markup-compatibility/2006">
+    <mc:Choice xmlns:p14="http://schemas.microsoft.com/office/powerpoint/2010/main" Requires="p14">
+      <p:transition spd="med" p14:dur="700">
         <p:fade/>
       </p:transition>
     </mc:Choice>
-    <mc:Fallback xmlns="">
-      <p:transition xmlns:p14="http://schemas.microsoft.com/office/powerpoint/2010/main" spd="med" advTm="24686">
+    <mc:Fallback>
+      <p:transition xmlns:p14="http://schemas.microsoft.com/office/powerpoint/2010/main" spd="med">
         <p:fade/>
       </p:transition>
     </mc:Fallback>
@@ -38837,7 +40781,7 @@
   <p:clrMapOvr>
     <a:masterClrMapping/>
   </p:clrMapOvr>
-  <p:transition xmlns:p14="http://schemas.microsoft.com/office/powerpoint/2010/main" advTm="3840">
+  <p:transition xmlns:p14="http://schemas.microsoft.com/office/powerpoint/2010/main">
     <p:fade/>
   </p:transition>
   <p:timing>
@@ -40075,7 +42019,7 @@
   <p:clrMapOvr>
     <a:masterClrMapping/>
   </p:clrMapOvr>
-  <p:transition xmlns:p14="http://schemas.microsoft.com/office/powerpoint/2010/main" advTm="23737">
+  <p:transition xmlns:p14="http://schemas.microsoft.com/office/powerpoint/2010/main">
     <p:fade/>
   </p:transition>
   <p:timing>
@@ -41119,12 +43063,12 @@
           <a:graphicData uri="http://schemas.openxmlformats.org/presentationml/2006/ole">
             <mc:AlternateContent xmlns:mc="http://schemas.openxmlformats.org/markup-compatibility/2006">
               <mc:Choice xmlns:v="urn:schemas-microsoft-com:vml" Requires="v">
-                <p:oleObj spid="_x0000_s640030" name="Equation" r:id="rId3" imgW="1016000" imgH="355600" progId="Equation.DSMT4">
+                <p:oleObj spid="_x0000_s640039" name="Equation" r:id="rId4" imgW="1016000" imgH="355600" progId="Equation.DSMT4">
                   <p:embed/>
                 </p:oleObj>
               </mc:Choice>
               <mc:Fallback>
-                <p:oleObj name="Equation" r:id="rId3" imgW="1016000" imgH="355600" progId="Equation.DSMT4">
+                <p:oleObj name="Equation" r:id="rId4" imgW="1016000" imgH="355600" progId="Equation.DSMT4">
                   <p:embed/>
                   <p:pic>
                     <p:nvPicPr>
@@ -41133,7 +43077,7 @@
                       <p:nvPr/>
                     </p:nvPicPr>
                     <p:blipFill>
-                      <a:blip r:embed="rId4"/>
+                      <a:blip r:embed="rId5"/>
                       <a:stretch>
                         <a:fillRect/>
                       </a:stretch>
@@ -41176,12 +43120,12 @@
           <a:graphicData uri="http://schemas.openxmlformats.org/presentationml/2006/ole">
             <mc:AlternateContent xmlns:mc="http://schemas.openxmlformats.org/markup-compatibility/2006">
               <mc:Choice xmlns:v="urn:schemas-microsoft-com:vml" Requires="v">
-                <p:oleObj spid="_x0000_s640031" name="Equation" r:id="rId5" imgW="2349500" imgH="508000" progId="Equation.DSMT4">
+                <p:oleObj spid="_x0000_s640040" name="Equation" r:id="rId6" imgW="2349500" imgH="508000" progId="Equation.DSMT4">
                   <p:embed/>
                 </p:oleObj>
               </mc:Choice>
               <mc:Fallback>
-                <p:oleObj name="Equation" r:id="rId5" imgW="2349500" imgH="508000" progId="Equation.DSMT4">
+                <p:oleObj name="Equation" r:id="rId6" imgW="2349500" imgH="508000" progId="Equation.DSMT4">
                   <p:embed/>
                   <p:pic>
                     <p:nvPicPr>
@@ -41190,7 +43134,7 @@
                       <p:nvPr/>
                     </p:nvPicPr>
                     <p:blipFill>
-                      <a:blip r:embed="rId6"/>
+                      <a:blip r:embed="rId7"/>
                       <a:stretch>
                         <a:fillRect/>
                       </a:stretch>
@@ -42487,7 +44431,7 @@
   <p:clrMapOvr>
     <a:masterClrMapping/>
   </p:clrMapOvr>
-  <p:transition xmlns:p14="http://schemas.microsoft.com/office/powerpoint/2010/main" advTm="51681">
+  <p:transition xmlns:p14="http://schemas.microsoft.com/office/powerpoint/2010/main">
     <p:fade/>
   </p:transition>
   <p:timing>
@@ -43630,7 +45574,7 @@
   <p:clrMapOvr>
     <a:masterClrMapping/>
   </p:clrMapOvr>
-  <p:transition xmlns:p14="http://schemas.microsoft.com/office/powerpoint/2010/main" advTm="3241">
+  <p:transition xmlns:p14="http://schemas.microsoft.com/office/powerpoint/2010/main">
     <p:fade/>
   </p:transition>
   <p:timing>
@@ -44697,7 +46641,7 @@
   <p:clrMapOvr>
     <a:masterClrMapping/>
   </p:clrMapOvr>
-  <p:transition xmlns:p14="http://schemas.microsoft.com/office/powerpoint/2010/main" advTm="12394">
+  <p:transition xmlns:p14="http://schemas.microsoft.com/office/powerpoint/2010/main">
     <p:fade/>
   </p:transition>
   <p:timing>
@@ -45922,7 +47866,7 @@
   <p:clrMapOvr>
     <a:masterClrMapping/>
   </p:clrMapOvr>
-  <p:transition xmlns:p14="http://schemas.microsoft.com/office/powerpoint/2010/main" advTm="34756">
+  <p:transition xmlns:p14="http://schemas.microsoft.com/office/powerpoint/2010/main">
     <p:fade thruBlk="1"/>
   </p:transition>
   <p:timing>
@@ -46278,7 +48222,7 @@
           <a:graphicData uri="http://schemas.openxmlformats.org/presentationml/2006/ole">
             <mc:AlternateContent xmlns:mc="http://schemas.openxmlformats.org/markup-compatibility/2006">
               <mc:Choice xmlns:v="urn:schemas-microsoft-com:vml" Requires="v">
-                <p:oleObj spid="_x0000_s578674" name="Equation" r:id="rId5" imgW="1104900" imgH="508000" progId="Equation.DSMT4">
+                <p:oleObj spid="_x0000_s578681" name="Equation" r:id="rId5" imgW="1104900" imgH="508000" progId="Equation.DSMT4">
                   <p:embed/>
                 </p:oleObj>
               </mc:Choice>
@@ -46335,7 +48279,7 @@
           <a:graphicData uri="http://schemas.openxmlformats.org/presentationml/2006/ole">
             <mc:AlternateContent xmlns:mc="http://schemas.openxmlformats.org/markup-compatibility/2006">
               <mc:Choice xmlns:v="urn:schemas-microsoft-com:vml" Requires="v">
-                <p:oleObj spid="_x0000_s578675" name="Equation" r:id="rId7" imgW="939800" imgH="215900" progId="Equation.3">
+                <p:oleObj spid="_x0000_s578682" name="Equation" r:id="rId7" imgW="939800" imgH="215900" progId="Equation.3">
                   <p:embed/>
                 </p:oleObj>
               </mc:Choice>
@@ -46378,7 +48322,7 @@
   <p:clrMapOvr>
     <a:masterClrMapping/>
   </p:clrMapOvr>
-  <p:transition xmlns:p14="http://schemas.microsoft.com/office/powerpoint/2010/main" advTm="86666"/>
+  <p:transition xmlns:p14="http://schemas.microsoft.com/office/powerpoint/2010/main"/>
   <p:timing>
     <p:tnLst>
       <p:par>
@@ -46855,7 +48799,7 @@
           <a:graphicData uri="http://schemas.openxmlformats.org/presentationml/2006/ole">
             <mc:AlternateContent xmlns:mc="http://schemas.openxmlformats.org/markup-compatibility/2006">
               <mc:Choice xmlns:v="urn:schemas-microsoft-com:vml" Requires="v">
-                <p:oleObj spid="_x0000_s611414" name="Equation" r:id="rId5" imgW="1181100" imgH="508000" progId="Equation.DSMT4">
+                <p:oleObj spid="_x0000_s611424" name="Equation" r:id="rId5" imgW="1181100" imgH="508000" progId="Equation.DSMT4">
                   <p:embed/>
                 </p:oleObj>
               </mc:Choice>
@@ -46912,7 +48856,7 @@
           <a:graphicData uri="http://schemas.openxmlformats.org/presentationml/2006/ole">
             <mc:AlternateContent xmlns:mc="http://schemas.openxmlformats.org/markup-compatibility/2006">
               <mc:Choice xmlns:v="urn:schemas-microsoft-com:vml" Requires="v">
-                <p:oleObj spid="_x0000_s611415" name="Equation" r:id="rId7" imgW="749300" imgH="292100" progId="Equation.DSMT4">
+                <p:oleObj spid="_x0000_s611425" name="Equation" r:id="rId7" imgW="749300" imgH="292100" progId="Equation.DSMT4">
                   <p:embed/>
                 </p:oleObj>
               </mc:Choice>
@@ -46969,7 +48913,7 @@
           <a:graphicData uri="http://schemas.openxmlformats.org/presentationml/2006/ole">
             <mc:AlternateContent xmlns:mc="http://schemas.openxmlformats.org/markup-compatibility/2006">
               <mc:Choice xmlns:v="urn:schemas-microsoft-com:vml" Requires="v">
-                <p:oleObj spid="_x0000_s611416" name="Equation" r:id="rId9" imgW="1689100" imgH="330200" progId="Equation.DSMT4">
+                <p:oleObj spid="_x0000_s611426" name="Equation" r:id="rId9" imgW="1689100" imgH="330200" progId="Equation.DSMT4">
                   <p:embed/>
                 </p:oleObj>
               </mc:Choice>
@@ -47017,14 +48961,14 @@
   <p:clrMapOvr>
     <a:masterClrMapping/>
   </p:clrMapOvr>
-  <mc:AlternateContent xmlns:mc="http://schemas.openxmlformats.org/markup-compatibility/2006" xmlns:p14="http://schemas.microsoft.com/office/powerpoint/2010/main">
-    <mc:Choice Requires="p14">
-      <p:transition spd="med" p14:dur="700" advTm="86666">
+  <mc:AlternateContent xmlns:mc="http://schemas.openxmlformats.org/markup-compatibility/2006">
+    <mc:Choice xmlns:p14="http://schemas.microsoft.com/office/powerpoint/2010/main" Requires="p14">
+      <p:transition spd="med" p14:dur="700">
         <p:fade/>
       </p:transition>
     </mc:Choice>
-    <mc:Fallback xmlns="">
-      <p:transition xmlns:p14="http://schemas.microsoft.com/office/powerpoint/2010/main" spd="med" advTm="86666">
+    <mc:Fallback>
+      <p:transition xmlns:p14="http://schemas.microsoft.com/office/powerpoint/2010/main" spd="med">
         <p:fade/>
       </p:transition>
     </mc:Fallback>
@@ -47535,7 +49479,7 @@
           <a:graphicData uri="http://schemas.openxmlformats.org/presentationml/2006/ole">
             <mc:AlternateContent xmlns:mc="http://schemas.openxmlformats.org/markup-compatibility/2006">
               <mc:Choice xmlns:v="urn:schemas-microsoft-com:vml" Requires="v">
-                <p:oleObj spid="_x0000_s602205" name="Equation" r:id="rId3" imgW="660400" imgH="203200" progId="Equation.3">
+                <p:oleObj spid="_x0000_s602215" name="Equation" r:id="rId3" imgW="660400" imgH="203200" progId="Equation.3">
                   <p:embed/>
                 </p:oleObj>
               </mc:Choice>
@@ -47630,7 +49574,7 @@
           <a:graphicData uri="http://schemas.openxmlformats.org/presentationml/2006/ole">
             <mc:AlternateContent xmlns:mc="http://schemas.openxmlformats.org/markup-compatibility/2006">
               <mc:Choice xmlns:v="urn:schemas-microsoft-com:vml" Requires="v">
-                <p:oleObj spid="_x0000_s602206" name="Equation" r:id="rId5" imgW="583947" imgH="203112" progId="Equation.DSMT4">
+                <p:oleObj spid="_x0000_s602216" name="Equation" r:id="rId5" imgW="583947" imgH="203112" progId="Equation.DSMT4">
                   <p:embed/>
                 </p:oleObj>
               </mc:Choice>
@@ -47731,7 +49675,7 @@
           <a:graphicData uri="http://schemas.openxmlformats.org/presentationml/2006/ole">
             <mc:AlternateContent xmlns:mc="http://schemas.openxmlformats.org/markup-compatibility/2006">
               <mc:Choice xmlns:v="urn:schemas-microsoft-com:vml" Requires="v">
-                <p:oleObj spid="_x0000_s602207" name="Equation" r:id="rId7" imgW="393359" imgH="177646" progId="Equation.3">
+                <p:oleObj spid="_x0000_s602217" name="Equation" r:id="rId7" imgW="393359" imgH="177646" progId="Equation.3">
                   <p:embed/>
                 </p:oleObj>
               </mc:Choice>
@@ -48143,7 +50087,7 @@
           <a:graphicData uri="http://schemas.openxmlformats.org/presentationml/2006/ole">
             <mc:AlternateContent xmlns:mc="http://schemas.openxmlformats.org/markup-compatibility/2006">
               <mc:Choice xmlns:v="urn:schemas-microsoft-com:vml" Requires="v">
-                <p:oleObj spid="_x0000_s603202" name="Equation" r:id="rId3" imgW="609600" imgH="190500" progId="Equation.3">
+                <p:oleObj spid="_x0000_s603209" name="Equation" r:id="rId3" imgW="609600" imgH="190500" progId="Equation.3">
                   <p:embed/>
                 </p:oleObj>
               </mc:Choice>
@@ -48238,7 +50182,7 @@
           <a:graphicData uri="http://schemas.openxmlformats.org/presentationml/2006/ole">
             <mc:AlternateContent xmlns:mc="http://schemas.openxmlformats.org/markup-compatibility/2006">
               <mc:Choice xmlns:v="urn:schemas-microsoft-com:vml" Requires="v">
-                <p:oleObj spid="_x0000_s603203" name="Equation" r:id="rId5" imgW="165100" imgH="165100" progId="Equation.DSMT4">
+                <p:oleObj spid="_x0000_s603210" name="Equation" r:id="rId5" imgW="165100" imgH="165100" progId="Equation.DSMT4">
                   <p:embed/>
                 </p:oleObj>
               </mc:Choice>
@@ -48665,7 +50609,7 @@
           <a:graphicData uri="http://schemas.openxmlformats.org/presentationml/2006/ole">
             <mc:AlternateContent xmlns:mc="http://schemas.openxmlformats.org/markup-compatibility/2006">
               <mc:Choice xmlns:v="urn:schemas-microsoft-com:vml" Requires="v">
-                <p:oleObj spid="_x0000_s606270" name="Equation" r:id="rId3" imgW="660113" imgH="203112" progId="Equation.DSMT4">
+                <p:oleObj spid="_x0000_s606277" name="Equation" r:id="rId3" imgW="660113" imgH="203112" progId="Equation.DSMT4">
                   <p:embed/>
                 </p:oleObj>
               </mc:Choice>
@@ -48760,7 +50704,7 @@
           <a:graphicData uri="http://schemas.openxmlformats.org/presentationml/2006/ole">
             <mc:AlternateContent xmlns:mc="http://schemas.openxmlformats.org/markup-compatibility/2006">
               <mc:Choice xmlns:v="urn:schemas-microsoft-com:vml" Requires="v">
-                <p:oleObj spid="_x0000_s606271" name="Equation" r:id="rId5" imgW="1485900" imgH="203200" progId="Equation.3">
+                <p:oleObj spid="_x0000_s606278" name="Equation" r:id="rId5" imgW="1485900" imgH="203200" progId="Equation.3">
                   <p:embed/>
                 </p:oleObj>
               </mc:Choice>
@@ -49987,14 +51931,14 @@
   <p:clrMapOvr>
     <a:masterClrMapping/>
   </p:clrMapOvr>
-  <mc:AlternateContent xmlns:mc="http://schemas.openxmlformats.org/markup-compatibility/2006" xmlns:p14="http://schemas.microsoft.com/office/powerpoint/2010/main">
-    <mc:Choice Requires="p14">
-      <p:transition spd="med" p14:dur="700" advTm="38987">
+  <mc:AlternateContent xmlns:mc="http://schemas.openxmlformats.org/markup-compatibility/2006">
+    <mc:Choice xmlns:p14="http://schemas.microsoft.com/office/powerpoint/2010/main" Requires="p14">
+      <p:transition spd="med" p14:dur="700">
         <p:fade/>
       </p:transition>
     </mc:Choice>
-    <mc:Fallback xmlns="">
-      <p:transition xmlns:p14="http://schemas.microsoft.com/office/powerpoint/2010/main" spd="med" advTm="38987">
+    <mc:Fallback>
+      <p:transition xmlns:p14="http://schemas.microsoft.com/office/powerpoint/2010/main" spd="med">
         <p:fade/>
       </p:transition>
     </mc:Fallback>

</xml_diff>